<commit_message>
fixing buku dan ppt
</commit_message>
<xml_diff>
--- a/05111540000007-Faiq-Presentasi.pptx
+++ b/05111540000007-Faiq-Presentasi.pptx
@@ -1873,6 +1873,13 @@
         </dgm:presLayoutVars>
       </dgm:prSet>
       <dgm:spPr/>
+      <dgm:t>
+        <a:bodyPr/>
+        <a:lstStyle/>
+        <a:p>
+          <a:endParaRPr lang="en-US"/>
+        </a:p>
+      </dgm:t>
     </dgm:pt>
     <dgm:pt modelId="{40AD3799-C167-4D3B-BD05-3BAEC85C844F}" type="pres">
       <dgm:prSet presAssocID="{6BE82A5F-C0FD-471D-A8CD-69238D0143CD}" presName="node" presStyleLbl="node1" presStyleIdx="0" presStyleCnt="5">
@@ -1892,10 +1899,24 @@
     <dgm:pt modelId="{AC0006F9-2FA8-434E-9C3E-8AAE8FBF33DC}" type="pres">
       <dgm:prSet presAssocID="{F67CCD67-E934-42B1-B08A-D74E16816CA9}" presName="sibTrans" presStyleLbl="sibTrans2D1" presStyleIdx="0" presStyleCnt="4"/>
       <dgm:spPr/>
+      <dgm:t>
+        <a:bodyPr/>
+        <a:lstStyle/>
+        <a:p>
+          <a:endParaRPr lang="en-US"/>
+        </a:p>
+      </dgm:t>
     </dgm:pt>
     <dgm:pt modelId="{985CDA60-2680-43A3-A845-91423150B064}" type="pres">
       <dgm:prSet presAssocID="{F67CCD67-E934-42B1-B08A-D74E16816CA9}" presName="connectorText" presStyleLbl="sibTrans2D1" presStyleIdx="0" presStyleCnt="4"/>
       <dgm:spPr/>
+      <dgm:t>
+        <a:bodyPr/>
+        <a:lstStyle/>
+        <a:p>
+          <a:endParaRPr lang="en-US"/>
+        </a:p>
+      </dgm:t>
     </dgm:pt>
     <dgm:pt modelId="{E73E5B6E-70C9-4D6A-9A48-04BCF1BB6746}" type="pres">
       <dgm:prSet presAssocID="{FAE4D10D-4B3F-476F-A1AD-02897F6339C4}" presName="node" presStyleLbl="node1" presStyleIdx="1" presStyleCnt="5">
@@ -1915,10 +1936,24 @@
     <dgm:pt modelId="{8A1C7D42-2690-49D3-8662-9F1F6D78CD12}" type="pres">
       <dgm:prSet presAssocID="{E30FB7B4-F040-4C5C-8425-FC61D16ADBB4}" presName="sibTrans" presStyleLbl="sibTrans2D1" presStyleIdx="1" presStyleCnt="4"/>
       <dgm:spPr/>
+      <dgm:t>
+        <a:bodyPr/>
+        <a:lstStyle/>
+        <a:p>
+          <a:endParaRPr lang="en-US"/>
+        </a:p>
+      </dgm:t>
     </dgm:pt>
     <dgm:pt modelId="{B2C651BC-D9C5-48A7-B3E6-E4A21F416EDF}" type="pres">
       <dgm:prSet presAssocID="{E30FB7B4-F040-4C5C-8425-FC61D16ADBB4}" presName="connectorText" presStyleLbl="sibTrans2D1" presStyleIdx="1" presStyleCnt="4"/>
       <dgm:spPr/>
+      <dgm:t>
+        <a:bodyPr/>
+        <a:lstStyle/>
+        <a:p>
+          <a:endParaRPr lang="en-US"/>
+        </a:p>
+      </dgm:t>
     </dgm:pt>
     <dgm:pt modelId="{429D9C87-E07D-462D-BFE4-100D443F346E}" type="pres">
       <dgm:prSet presAssocID="{3EBF19CE-D50B-4660-B547-94311C92E5DC}" presName="node" presStyleLbl="node1" presStyleIdx="2" presStyleCnt="5">
@@ -1938,10 +1973,24 @@
     <dgm:pt modelId="{4C8F4061-453C-4E1A-8E10-5F5884D8BA6B}" type="pres">
       <dgm:prSet presAssocID="{3909BCBE-FD30-4D12-BA1D-13F2FD6FD5EA}" presName="sibTrans" presStyleLbl="sibTrans2D1" presStyleIdx="2" presStyleCnt="4"/>
       <dgm:spPr/>
+      <dgm:t>
+        <a:bodyPr/>
+        <a:lstStyle/>
+        <a:p>
+          <a:endParaRPr lang="en-US"/>
+        </a:p>
+      </dgm:t>
     </dgm:pt>
     <dgm:pt modelId="{AFD34ACB-DCF2-4602-8B6A-ABFB02FE142F}" type="pres">
       <dgm:prSet presAssocID="{3909BCBE-FD30-4D12-BA1D-13F2FD6FD5EA}" presName="connectorText" presStyleLbl="sibTrans2D1" presStyleIdx="2" presStyleCnt="4"/>
       <dgm:spPr/>
+      <dgm:t>
+        <a:bodyPr/>
+        <a:lstStyle/>
+        <a:p>
+          <a:endParaRPr lang="en-US"/>
+        </a:p>
+      </dgm:t>
     </dgm:pt>
     <dgm:pt modelId="{C70EF33C-E069-4530-8080-C2321E05A449}" type="pres">
       <dgm:prSet presAssocID="{D1348A1F-BB4F-4E59-8066-B1464318271A}" presName="node" presStyleLbl="node1" presStyleIdx="3" presStyleCnt="5">
@@ -1961,10 +2010,24 @@
     <dgm:pt modelId="{B5EC5973-7E95-417E-BA33-C450CF622691}" type="pres">
       <dgm:prSet presAssocID="{80D00223-CEDC-42CC-95CC-56DD02C20D93}" presName="sibTrans" presStyleLbl="sibTrans2D1" presStyleIdx="3" presStyleCnt="4"/>
       <dgm:spPr/>
+      <dgm:t>
+        <a:bodyPr/>
+        <a:lstStyle/>
+        <a:p>
+          <a:endParaRPr lang="en-US"/>
+        </a:p>
+      </dgm:t>
     </dgm:pt>
     <dgm:pt modelId="{02E750F5-F8B5-45FF-B512-A437B25DF263}" type="pres">
       <dgm:prSet presAssocID="{80D00223-CEDC-42CC-95CC-56DD02C20D93}" presName="connectorText" presStyleLbl="sibTrans2D1" presStyleIdx="3" presStyleCnt="4"/>
       <dgm:spPr/>
+      <dgm:t>
+        <a:bodyPr/>
+        <a:lstStyle/>
+        <a:p>
+          <a:endParaRPr lang="en-US"/>
+        </a:p>
+      </dgm:t>
     </dgm:pt>
     <dgm:pt modelId="{43744F74-5A04-409E-86C9-0A9A2C6EF963}" type="pres">
       <dgm:prSet presAssocID="{C8B20502-CEF7-487D-9B0D-CD2BFBCF6D02}" presName="node" presStyleLbl="node1" presStyleIdx="4" presStyleCnt="5">
@@ -1993,8 +2056,8 @@
     <dgm:cxn modelId="{05942CC8-600B-429A-BD31-6663324DF56F}" type="presOf" srcId="{8E07D336-402E-4A49-8DDA-351AE046336F}" destId="{9708B531-A104-4AE2-84A4-2CC2774DA208}" srcOrd="0" destOrd="0" presId="urn:microsoft.com/office/officeart/2005/8/layout/process5"/>
     <dgm:cxn modelId="{69817DA5-DC53-45EB-AF0A-61FD300CA9D7}" type="presOf" srcId="{F67CCD67-E934-42B1-B08A-D74E16816CA9}" destId="{985CDA60-2680-43A3-A845-91423150B064}" srcOrd="1" destOrd="0" presId="urn:microsoft.com/office/officeart/2005/8/layout/process5"/>
     <dgm:cxn modelId="{D7917AF5-A44E-4B11-B6B3-3A491FB311AD}" srcId="{8E07D336-402E-4A49-8DDA-351AE046336F}" destId="{3EBF19CE-D50B-4660-B547-94311C92E5DC}" srcOrd="2" destOrd="0" parTransId="{B7535C26-CE45-4FD1-9DE4-4CD0893C84D2}" sibTransId="{3909BCBE-FD30-4D12-BA1D-13F2FD6FD5EA}"/>
+    <dgm:cxn modelId="{6823F6DC-0582-43BA-84AB-D8A4B7FF64B0}" type="presOf" srcId="{80D00223-CEDC-42CC-95CC-56DD02C20D93}" destId="{B5EC5973-7E95-417E-BA33-C450CF622691}" srcOrd="0" destOrd="0" presId="urn:microsoft.com/office/officeart/2005/8/layout/process5"/>
     <dgm:cxn modelId="{2C0C63B7-3B4C-470E-AAE4-77CAF3A81095}" type="presOf" srcId="{E30FB7B4-F040-4C5C-8425-FC61D16ADBB4}" destId="{B2C651BC-D9C5-48A7-B3E6-E4A21F416EDF}" srcOrd="1" destOrd="0" presId="urn:microsoft.com/office/officeart/2005/8/layout/process5"/>
-    <dgm:cxn modelId="{6823F6DC-0582-43BA-84AB-D8A4B7FF64B0}" type="presOf" srcId="{80D00223-CEDC-42CC-95CC-56DD02C20D93}" destId="{B5EC5973-7E95-417E-BA33-C450CF622691}" srcOrd="0" destOrd="0" presId="urn:microsoft.com/office/officeart/2005/8/layout/process5"/>
     <dgm:cxn modelId="{2C868DD4-1B78-47F3-BDEE-393FEF500038}" type="presOf" srcId="{3909BCBE-FD30-4D12-BA1D-13F2FD6FD5EA}" destId="{AFD34ACB-DCF2-4602-8B6A-ABFB02FE142F}" srcOrd="1" destOrd="0" presId="urn:microsoft.com/office/officeart/2005/8/layout/process5"/>
     <dgm:cxn modelId="{D1C8F4BE-530A-4EFA-95FD-2B1FBAAE404A}" type="presOf" srcId="{D1348A1F-BB4F-4E59-8066-B1464318271A}" destId="{C70EF33C-E069-4530-8080-C2321E05A449}" srcOrd="0" destOrd="0" presId="urn:microsoft.com/office/officeart/2005/8/layout/process5"/>
     <dgm:cxn modelId="{FEAF88B2-BEB7-4958-AE09-52B3AFB463D5}" type="presOf" srcId="{3909BCBE-FD30-4D12-BA1D-13F2FD6FD5EA}" destId="{4C8F4061-453C-4E1A-8E10-5F5884D8BA6B}" srcOrd="0" destOrd="0" presId="urn:microsoft.com/office/officeart/2005/8/layout/process5"/>
@@ -2159,6 +2222,13 @@
         </dgm:presLayoutVars>
       </dgm:prSet>
       <dgm:spPr/>
+      <dgm:t>
+        <a:bodyPr/>
+        <a:lstStyle/>
+        <a:p>
+          <a:endParaRPr lang="en-US"/>
+        </a:p>
+      </dgm:t>
     </dgm:pt>
     <dgm:pt modelId="{CB39116F-EB91-404F-85AA-B1CB5796507D}" type="pres">
       <dgm:prSet presAssocID="{9EE0AAEE-961F-4B50-A7B2-42EF52E0E470}" presName="node" presStyleLbl="node1" presStyleIdx="0" presStyleCnt="3">
@@ -2178,10 +2248,24 @@
     <dgm:pt modelId="{AF1C5D5E-39F3-4096-8D54-97716BD884B5}" type="pres">
       <dgm:prSet presAssocID="{5D0F2067-FFC5-4DE3-8C59-925F93FC22FA}" presName="sibTrans" presStyleLbl="sibTrans2D1" presStyleIdx="0" presStyleCnt="2"/>
       <dgm:spPr/>
+      <dgm:t>
+        <a:bodyPr/>
+        <a:lstStyle/>
+        <a:p>
+          <a:endParaRPr lang="en-US"/>
+        </a:p>
+      </dgm:t>
     </dgm:pt>
     <dgm:pt modelId="{F12F5093-66BF-4D28-8FA3-EEC8992F8C5E}" type="pres">
       <dgm:prSet presAssocID="{5D0F2067-FFC5-4DE3-8C59-925F93FC22FA}" presName="connectorText" presStyleLbl="sibTrans2D1" presStyleIdx="0" presStyleCnt="2"/>
       <dgm:spPr/>
+      <dgm:t>
+        <a:bodyPr/>
+        <a:lstStyle/>
+        <a:p>
+          <a:endParaRPr lang="en-US"/>
+        </a:p>
+      </dgm:t>
     </dgm:pt>
     <dgm:pt modelId="{6FC43BBB-5A7D-4190-A831-ECD39838A64D}" type="pres">
       <dgm:prSet presAssocID="{4573322D-347E-43A5-B007-CD16404DB0CD}" presName="node" presStyleLbl="node1" presStyleIdx="1" presStyleCnt="3">
@@ -2201,10 +2285,24 @@
     <dgm:pt modelId="{18D28992-97C3-49BA-B5CB-BA5D346E6A6E}" type="pres">
       <dgm:prSet presAssocID="{6FF34F54-AF01-4EA8-BF1F-0E0E5FAFDD32}" presName="sibTrans" presStyleLbl="sibTrans2D1" presStyleIdx="1" presStyleCnt="2"/>
       <dgm:spPr/>
+      <dgm:t>
+        <a:bodyPr/>
+        <a:lstStyle/>
+        <a:p>
+          <a:endParaRPr lang="en-US"/>
+        </a:p>
+      </dgm:t>
     </dgm:pt>
     <dgm:pt modelId="{E56FEECC-B9B1-4A83-8D4F-FCF8F61DD66A}" type="pres">
       <dgm:prSet presAssocID="{6FF34F54-AF01-4EA8-BF1F-0E0E5FAFDD32}" presName="connectorText" presStyleLbl="sibTrans2D1" presStyleIdx="1" presStyleCnt="2"/>
       <dgm:spPr/>
+      <dgm:t>
+        <a:bodyPr/>
+        <a:lstStyle/>
+        <a:p>
+          <a:endParaRPr lang="en-US"/>
+        </a:p>
+      </dgm:t>
     </dgm:pt>
     <dgm:pt modelId="{CDC2BA57-16AE-4341-9248-3145FA7CD566}" type="pres">
       <dgm:prSet presAssocID="{EF683249-1610-4031-B1E7-0D653A4CFAAD}" presName="node" presStyleLbl="node1" presStyleIdx="2" presStyleCnt="3">
@@ -2223,17 +2321,17 @@
     </dgm:pt>
   </dgm:ptLst>
   <dgm:cxnLst>
+    <dgm:cxn modelId="{5BAD1B05-2BFA-41A1-A5B1-DF092E6C1177}" type="presOf" srcId="{6FF34F54-AF01-4EA8-BF1F-0E0E5FAFDD32}" destId="{E56FEECC-B9B1-4A83-8D4F-FCF8F61DD66A}" srcOrd="1" destOrd="0" presId="urn:microsoft.com/office/officeart/2005/8/layout/process5"/>
+    <dgm:cxn modelId="{99D011D7-2C6A-4315-AD2F-B0CEA8EF7D29}" type="presOf" srcId="{5D0F2067-FFC5-4DE3-8C59-925F93FC22FA}" destId="{AF1C5D5E-39F3-4096-8D54-97716BD884B5}" srcOrd="0" destOrd="0" presId="urn:microsoft.com/office/officeart/2005/8/layout/process5"/>
+    <dgm:cxn modelId="{A9A722F5-5C74-4610-98A7-496EF2147B7F}" type="presOf" srcId="{5D0F2067-FFC5-4DE3-8C59-925F93FC22FA}" destId="{F12F5093-66BF-4D28-8FA3-EEC8992F8C5E}" srcOrd="1" destOrd="0" presId="urn:microsoft.com/office/officeart/2005/8/layout/process5"/>
+    <dgm:cxn modelId="{58FD188C-42F7-4F7F-9A26-AE1ECFD996BC}" type="presOf" srcId="{9EE0AAEE-961F-4B50-A7B2-42EF52E0E470}" destId="{CB39116F-EB91-404F-85AA-B1CB5796507D}" srcOrd="0" destOrd="0" presId="urn:microsoft.com/office/officeart/2005/8/layout/process5"/>
     <dgm:cxn modelId="{CE62F992-0C33-4AE0-BD1D-89BB2F31E4BB}" srcId="{C2B57C17-F959-4652-B128-14DD613C9DDD}" destId="{EF683249-1610-4031-B1E7-0D653A4CFAAD}" srcOrd="2" destOrd="0" parTransId="{41F958F5-B9DB-4C38-8674-AAE5C57E9DD6}" sibTransId="{1BAB6B11-4974-4204-AEAE-7195F5A5E46D}"/>
-    <dgm:cxn modelId="{5BAD1B05-2BFA-41A1-A5B1-DF092E6C1177}" type="presOf" srcId="{6FF34F54-AF01-4EA8-BF1F-0E0E5FAFDD32}" destId="{E56FEECC-B9B1-4A83-8D4F-FCF8F61DD66A}" srcOrd="1" destOrd="0" presId="urn:microsoft.com/office/officeart/2005/8/layout/process5"/>
     <dgm:cxn modelId="{6D4F640B-C1FD-4E8D-A561-3CB92036D5AD}" type="presOf" srcId="{C2B57C17-F959-4652-B128-14DD613C9DDD}" destId="{F0E3462D-C0E4-417D-8A98-72530B42FC21}" srcOrd="0" destOrd="0" presId="urn:microsoft.com/office/officeart/2005/8/layout/process5"/>
+    <dgm:cxn modelId="{BE1AF255-B5DE-4655-936D-EB4946A093F3}" srcId="{C2B57C17-F959-4652-B128-14DD613C9DDD}" destId="{4573322D-347E-43A5-B007-CD16404DB0CD}" srcOrd="1" destOrd="0" parTransId="{70886BAC-A319-4407-97F2-CB8F2F510055}" sibTransId="{6FF34F54-AF01-4EA8-BF1F-0E0E5FAFDD32}"/>
+    <dgm:cxn modelId="{FDC21ADA-B533-437C-B82A-F18F1BA15DFA}" type="presOf" srcId="{4573322D-347E-43A5-B007-CD16404DB0CD}" destId="{6FC43BBB-5A7D-4190-A831-ECD39838A64D}" srcOrd="0" destOrd="0" presId="urn:microsoft.com/office/officeart/2005/8/layout/process5"/>
+    <dgm:cxn modelId="{55F36D86-81B0-4631-9FB0-2E624C5DCCDF}" type="presOf" srcId="{EF683249-1610-4031-B1E7-0D653A4CFAAD}" destId="{CDC2BA57-16AE-4341-9248-3145FA7CD566}" srcOrd="0" destOrd="0" presId="urn:microsoft.com/office/officeart/2005/8/layout/process5"/>
     <dgm:cxn modelId="{9D77F007-43EF-4F2B-91BC-1FBAD9801FAC}" type="presOf" srcId="{6FF34F54-AF01-4EA8-BF1F-0E0E5FAFDD32}" destId="{18D28992-97C3-49BA-B5CB-BA5D346E6A6E}" srcOrd="0" destOrd="0" presId="urn:microsoft.com/office/officeart/2005/8/layout/process5"/>
-    <dgm:cxn modelId="{BE1AF255-B5DE-4655-936D-EB4946A093F3}" srcId="{C2B57C17-F959-4652-B128-14DD613C9DDD}" destId="{4573322D-347E-43A5-B007-CD16404DB0CD}" srcOrd="1" destOrd="0" parTransId="{70886BAC-A319-4407-97F2-CB8F2F510055}" sibTransId="{6FF34F54-AF01-4EA8-BF1F-0E0E5FAFDD32}"/>
-    <dgm:cxn modelId="{58FD188C-42F7-4F7F-9A26-AE1ECFD996BC}" type="presOf" srcId="{9EE0AAEE-961F-4B50-A7B2-42EF52E0E470}" destId="{CB39116F-EB91-404F-85AA-B1CB5796507D}" srcOrd="0" destOrd="0" presId="urn:microsoft.com/office/officeart/2005/8/layout/process5"/>
-    <dgm:cxn modelId="{99D011D7-2C6A-4315-AD2F-B0CEA8EF7D29}" type="presOf" srcId="{5D0F2067-FFC5-4DE3-8C59-925F93FC22FA}" destId="{AF1C5D5E-39F3-4096-8D54-97716BD884B5}" srcOrd="0" destOrd="0" presId="urn:microsoft.com/office/officeart/2005/8/layout/process5"/>
     <dgm:cxn modelId="{221D08AB-3C41-497F-964E-A18AAF95903E}" srcId="{C2B57C17-F959-4652-B128-14DD613C9DDD}" destId="{9EE0AAEE-961F-4B50-A7B2-42EF52E0E470}" srcOrd="0" destOrd="0" parTransId="{F36E3AA1-DE99-452A-A482-6F3FDFDA1F13}" sibTransId="{5D0F2067-FFC5-4DE3-8C59-925F93FC22FA}"/>
-    <dgm:cxn modelId="{FDC21ADA-B533-437C-B82A-F18F1BA15DFA}" type="presOf" srcId="{4573322D-347E-43A5-B007-CD16404DB0CD}" destId="{6FC43BBB-5A7D-4190-A831-ECD39838A64D}" srcOrd="0" destOrd="0" presId="urn:microsoft.com/office/officeart/2005/8/layout/process5"/>
-    <dgm:cxn modelId="{A9A722F5-5C74-4610-98A7-496EF2147B7F}" type="presOf" srcId="{5D0F2067-FFC5-4DE3-8C59-925F93FC22FA}" destId="{F12F5093-66BF-4D28-8FA3-EEC8992F8C5E}" srcOrd="1" destOrd="0" presId="urn:microsoft.com/office/officeart/2005/8/layout/process5"/>
-    <dgm:cxn modelId="{55F36D86-81B0-4631-9FB0-2E624C5DCCDF}" type="presOf" srcId="{EF683249-1610-4031-B1E7-0D653A4CFAAD}" destId="{CDC2BA57-16AE-4341-9248-3145FA7CD566}" srcOrd="0" destOrd="0" presId="urn:microsoft.com/office/officeart/2005/8/layout/process5"/>
     <dgm:cxn modelId="{CE911BDB-8BD4-4481-967A-1E42223A82A1}" type="presParOf" srcId="{F0E3462D-C0E4-417D-8A98-72530B42FC21}" destId="{CB39116F-EB91-404F-85AA-B1CB5796507D}" srcOrd="0" destOrd="0" presId="urn:microsoft.com/office/officeart/2005/8/layout/process5"/>
     <dgm:cxn modelId="{020624DA-A9BE-41DC-A324-29FCA709D42C}" type="presParOf" srcId="{F0E3462D-C0E4-417D-8A98-72530B42FC21}" destId="{AF1C5D5E-39F3-4096-8D54-97716BD884B5}" srcOrd="1" destOrd="0" presId="urn:microsoft.com/office/officeart/2005/8/layout/process5"/>
     <dgm:cxn modelId="{98B07C55-73ED-4761-A044-D7A6EDF9858D}" type="presParOf" srcId="{AF1C5D5E-39F3-4096-8D54-97716BD884B5}" destId="{F12F5093-66BF-4D28-8FA3-EEC8992F8C5E}" srcOrd="0" destOrd="0" presId="urn:microsoft.com/office/officeart/2005/8/layout/process5"/>
@@ -2260,686 +2358,6 @@
       <dsp:cNvGrpSpPr/>
     </dsp:nvGrpSpPr>
     <dsp:grpSpPr/>
-    <dsp:sp modelId="{40AD3799-C167-4D3B-BD05-3BAEC85C844F}">
-      <dsp:nvSpPr>
-        <dsp:cNvPr id="0" name=""/>
-        <dsp:cNvSpPr/>
-      </dsp:nvSpPr>
-      <dsp:spPr>
-        <a:xfrm>
-          <a:off x="7143" y="1001183"/>
-          <a:ext cx="2135187" cy="1281112"/>
-        </a:xfrm>
-        <a:prstGeom prst="roundRect">
-          <a:avLst>
-            <a:gd name="adj" fmla="val 10000"/>
-          </a:avLst>
-        </a:prstGeom>
-        <a:solidFill>
-          <a:schemeClr val="accent1">
-            <a:hueOff val="0"/>
-            <a:satOff val="0"/>
-            <a:lumOff val="0"/>
-            <a:alphaOff val="0"/>
-          </a:schemeClr>
-        </a:solidFill>
-        <a:ln w="12700" cap="flat" cmpd="sng" algn="ctr">
-          <a:solidFill>
-            <a:schemeClr val="lt1">
-              <a:hueOff val="0"/>
-              <a:satOff val="0"/>
-              <a:lumOff val="0"/>
-              <a:alphaOff val="0"/>
-            </a:schemeClr>
-          </a:solidFill>
-          <a:prstDash val="solid"/>
-          <a:miter lim="800000"/>
-        </a:ln>
-        <a:effectLst/>
-      </dsp:spPr>
-      <dsp:style>
-        <a:lnRef idx="2">
-          <a:scrgbClr r="0" g="0" b="0"/>
-        </a:lnRef>
-        <a:fillRef idx="1">
-          <a:scrgbClr r="0" g="0" b="0"/>
-        </a:fillRef>
-        <a:effectRef idx="0">
-          <a:scrgbClr r="0" g="0" b="0"/>
-        </a:effectRef>
-        <a:fontRef idx="minor">
-          <a:schemeClr val="lt1"/>
-        </a:fontRef>
-      </dsp:style>
-      <dsp:txBody>
-        <a:bodyPr spcFirstLastPara="0" vert="horz" wrap="square" lIns="68580" tIns="68580" rIns="68580" bIns="68580" numCol="1" spcCol="1270" anchor="ctr" anchorCtr="0">
-          <a:noAutofit/>
-        </a:bodyPr>
-        <a:lstStyle/>
-        <a:p>
-          <a:pPr lvl="0" algn="ctr" defTabSz="800100">
-            <a:lnSpc>
-              <a:spcPct val="90000"/>
-            </a:lnSpc>
-            <a:spcBef>
-              <a:spcPct val="0"/>
-            </a:spcBef>
-            <a:spcAft>
-              <a:spcPct val="35000"/>
-            </a:spcAft>
-          </a:pPr>
-          <a:r>
-            <a:rPr lang="en-US" sz="1800" kern="1200" smtClean="0"/>
-            <a:t>Unduh file RDF tokoh DBpedia</a:t>
-          </a:r>
-          <a:endParaRPr lang="en-US" sz="1800" kern="1200"/>
-        </a:p>
-      </dsp:txBody>
-      <dsp:txXfrm>
-        <a:off x="44665" y="1038705"/>
-        <a:ext cx="2060143" cy="1206068"/>
-      </dsp:txXfrm>
-    </dsp:sp>
-    <dsp:sp modelId="{AC0006F9-2FA8-434E-9C3E-8AAE8FBF33DC}">
-      <dsp:nvSpPr>
-        <dsp:cNvPr id="0" name=""/>
-        <dsp:cNvSpPr/>
-      </dsp:nvSpPr>
-      <dsp:spPr>
-        <a:xfrm>
-          <a:off x="2330227" y="1376976"/>
-          <a:ext cx="452659" cy="529526"/>
-        </a:xfrm>
-        <a:prstGeom prst="rightArrow">
-          <a:avLst>
-            <a:gd name="adj1" fmla="val 60000"/>
-            <a:gd name="adj2" fmla="val 50000"/>
-          </a:avLst>
-        </a:prstGeom>
-        <a:solidFill>
-          <a:schemeClr val="accent1">
-            <a:tint val="60000"/>
-            <a:hueOff val="0"/>
-            <a:satOff val="0"/>
-            <a:lumOff val="0"/>
-            <a:alphaOff val="0"/>
-          </a:schemeClr>
-        </a:solidFill>
-        <a:ln>
-          <a:noFill/>
-        </a:ln>
-        <a:effectLst/>
-      </dsp:spPr>
-      <dsp:style>
-        <a:lnRef idx="0">
-          <a:scrgbClr r="0" g="0" b="0"/>
-        </a:lnRef>
-        <a:fillRef idx="1">
-          <a:scrgbClr r="0" g="0" b="0"/>
-        </a:fillRef>
-        <a:effectRef idx="0">
-          <a:scrgbClr r="0" g="0" b="0"/>
-        </a:effectRef>
-        <a:fontRef idx="minor">
-          <a:schemeClr val="lt1"/>
-        </a:fontRef>
-      </dsp:style>
-      <dsp:txBody>
-        <a:bodyPr spcFirstLastPara="0" vert="horz" wrap="square" lIns="0" tIns="0" rIns="0" bIns="0" numCol="1" spcCol="1270" anchor="ctr" anchorCtr="0">
-          <a:noAutofit/>
-        </a:bodyPr>
-        <a:lstStyle/>
-        <a:p>
-          <a:pPr lvl="0" algn="ctr" defTabSz="666750">
-            <a:lnSpc>
-              <a:spcPct val="90000"/>
-            </a:lnSpc>
-            <a:spcBef>
-              <a:spcPct val="0"/>
-            </a:spcBef>
-            <a:spcAft>
-              <a:spcPct val="35000"/>
-            </a:spcAft>
-          </a:pPr>
-          <a:endParaRPr lang="en-US" sz="1500" kern="1200"/>
-        </a:p>
-      </dsp:txBody>
-      <dsp:txXfrm>
-        <a:off x="2330227" y="1482881"/>
-        <a:ext cx="316861" cy="317716"/>
-      </dsp:txXfrm>
-    </dsp:sp>
-    <dsp:sp modelId="{E73E5B6E-70C9-4D6A-9A48-04BCF1BB6746}">
-      <dsp:nvSpPr>
-        <dsp:cNvPr id="0" name=""/>
-        <dsp:cNvSpPr/>
-      </dsp:nvSpPr>
-      <dsp:spPr>
-        <a:xfrm>
-          <a:off x="2996406" y="1001183"/>
-          <a:ext cx="2135187" cy="1281112"/>
-        </a:xfrm>
-        <a:prstGeom prst="roundRect">
-          <a:avLst>
-            <a:gd name="adj" fmla="val 10000"/>
-          </a:avLst>
-        </a:prstGeom>
-        <a:solidFill>
-          <a:schemeClr val="accent1">
-            <a:hueOff val="0"/>
-            <a:satOff val="0"/>
-            <a:lumOff val="0"/>
-            <a:alphaOff val="0"/>
-          </a:schemeClr>
-        </a:solidFill>
-        <a:ln w="12700" cap="flat" cmpd="sng" algn="ctr">
-          <a:solidFill>
-            <a:schemeClr val="lt1">
-              <a:hueOff val="0"/>
-              <a:satOff val="0"/>
-              <a:lumOff val="0"/>
-              <a:alphaOff val="0"/>
-            </a:schemeClr>
-          </a:solidFill>
-          <a:prstDash val="solid"/>
-          <a:miter lim="800000"/>
-        </a:ln>
-        <a:effectLst/>
-      </dsp:spPr>
-      <dsp:style>
-        <a:lnRef idx="2">
-          <a:scrgbClr r="0" g="0" b="0"/>
-        </a:lnRef>
-        <a:fillRef idx="1">
-          <a:scrgbClr r="0" g="0" b="0"/>
-        </a:fillRef>
-        <a:effectRef idx="0">
-          <a:scrgbClr r="0" g="0" b="0"/>
-        </a:effectRef>
-        <a:fontRef idx="minor">
-          <a:schemeClr val="lt1"/>
-        </a:fontRef>
-      </dsp:style>
-      <dsp:txBody>
-        <a:bodyPr spcFirstLastPara="0" vert="horz" wrap="square" lIns="68580" tIns="68580" rIns="68580" bIns="68580" numCol="1" spcCol="1270" anchor="ctr" anchorCtr="0">
-          <a:noAutofit/>
-        </a:bodyPr>
-        <a:lstStyle/>
-        <a:p>
-          <a:pPr lvl="0" algn="ctr" defTabSz="800100">
-            <a:lnSpc>
-              <a:spcPct val="90000"/>
-            </a:lnSpc>
-            <a:spcBef>
-              <a:spcPct val="0"/>
-            </a:spcBef>
-            <a:spcAft>
-              <a:spcPct val="35000"/>
-            </a:spcAft>
-          </a:pPr>
-          <a:r>
-            <a:rPr lang="en-US" sz="1800" kern="1200" smtClean="0"/>
-            <a:t>Pemodelan file RDF tokoh</a:t>
-          </a:r>
-          <a:endParaRPr lang="en-US" sz="1800" kern="1200"/>
-        </a:p>
-      </dsp:txBody>
-      <dsp:txXfrm>
-        <a:off x="3033928" y="1038705"/>
-        <a:ext cx="2060143" cy="1206068"/>
-      </dsp:txXfrm>
-    </dsp:sp>
-    <dsp:sp modelId="{8A1C7D42-2690-49D3-8662-9F1F6D78CD12}">
-      <dsp:nvSpPr>
-        <dsp:cNvPr id="0" name=""/>
-        <dsp:cNvSpPr/>
-      </dsp:nvSpPr>
-      <dsp:spPr>
-        <a:xfrm>
-          <a:off x="5319490" y="1376976"/>
-          <a:ext cx="452659" cy="529526"/>
-        </a:xfrm>
-        <a:prstGeom prst="rightArrow">
-          <a:avLst>
-            <a:gd name="adj1" fmla="val 60000"/>
-            <a:gd name="adj2" fmla="val 50000"/>
-          </a:avLst>
-        </a:prstGeom>
-        <a:solidFill>
-          <a:schemeClr val="accent1">
-            <a:tint val="60000"/>
-            <a:hueOff val="0"/>
-            <a:satOff val="0"/>
-            <a:lumOff val="0"/>
-            <a:alphaOff val="0"/>
-          </a:schemeClr>
-        </a:solidFill>
-        <a:ln>
-          <a:noFill/>
-        </a:ln>
-        <a:effectLst/>
-      </dsp:spPr>
-      <dsp:style>
-        <a:lnRef idx="0">
-          <a:scrgbClr r="0" g="0" b="0"/>
-        </a:lnRef>
-        <a:fillRef idx="1">
-          <a:scrgbClr r="0" g="0" b="0"/>
-        </a:fillRef>
-        <a:effectRef idx="0">
-          <a:scrgbClr r="0" g="0" b="0"/>
-        </a:effectRef>
-        <a:fontRef idx="minor">
-          <a:schemeClr val="lt1"/>
-        </a:fontRef>
-      </dsp:style>
-      <dsp:txBody>
-        <a:bodyPr spcFirstLastPara="0" vert="horz" wrap="square" lIns="0" tIns="0" rIns="0" bIns="0" numCol="1" spcCol="1270" anchor="ctr" anchorCtr="0">
-          <a:noAutofit/>
-        </a:bodyPr>
-        <a:lstStyle/>
-        <a:p>
-          <a:pPr lvl="0" algn="ctr" defTabSz="666750">
-            <a:lnSpc>
-              <a:spcPct val="90000"/>
-            </a:lnSpc>
-            <a:spcBef>
-              <a:spcPct val="0"/>
-            </a:spcBef>
-            <a:spcAft>
-              <a:spcPct val="35000"/>
-            </a:spcAft>
-          </a:pPr>
-          <a:endParaRPr lang="en-US" sz="1500" kern="1200"/>
-        </a:p>
-      </dsp:txBody>
-      <dsp:txXfrm>
-        <a:off x="5319490" y="1482881"/>
-        <a:ext cx="316861" cy="317716"/>
-      </dsp:txXfrm>
-    </dsp:sp>
-    <dsp:sp modelId="{429D9C87-E07D-462D-BFE4-100D443F346E}">
-      <dsp:nvSpPr>
-        <dsp:cNvPr id="0" name=""/>
-        <dsp:cNvSpPr/>
-      </dsp:nvSpPr>
-      <dsp:spPr>
-        <a:xfrm>
-          <a:off x="5985668" y="1001183"/>
-          <a:ext cx="2135187" cy="1281112"/>
-        </a:xfrm>
-        <a:prstGeom prst="roundRect">
-          <a:avLst>
-            <a:gd name="adj" fmla="val 10000"/>
-          </a:avLst>
-        </a:prstGeom>
-        <a:solidFill>
-          <a:schemeClr val="accent1">
-            <a:hueOff val="0"/>
-            <a:satOff val="0"/>
-            <a:lumOff val="0"/>
-            <a:alphaOff val="0"/>
-          </a:schemeClr>
-        </a:solidFill>
-        <a:ln w="12700" cap="flat" cmpd="sng" algn="ctr">
-          <a:solidFill>
-            <a:schemeClr val="lt1">
-              <a:hueOff val="0"/>
-              <a:satOff val="0"/>
-              <a:lumOff val="0"/>
-              <a:alphaOff val="0"/>
-            </a:schemeClr>
-          </a:solidFill>
-          <a:prstDash val="solid"/>
-          <a:miter lim="800000"/>
-        </a:ln>
-        <a:effectLst/>
-      </dsp:spPr>
-      <dsp:style>
-        <a:lnRef idx="2">
-          <a:scrgbClr r="0" g="0" b="0"/>
-        </a:lnRef>
-        <a:fillRef idx="1">
-          <a:scrgbClr r="0" g="0" b="0"/>
-        </a:fillRef>
-        <a:effectRef idx="0">
-          <a:scrgbClr r="0" g="0" b="0"/>
-        </a:effectRef>
-        <a:fontRef idx="minor">
-          <a:schemeClr val="lt1"/>
-        </a:fontRef>
-      </dsp:style>
-      <dsp:txBody>
-        <a:bodyPr spcFirstLastPara="0" vert="horz" wrap="square" lIns="68580" tIns="68580" rIns="68580" bIns="68580" numCol="1" spcCol="1270" anchor="ctr" anchorCtr="0">
-          <a:noAutofit/>
-        </a:bodyPr>
-        <a:lstStyle/>
-        <a:p>
-          <a:pPr lvl="0" algn="ctr" defTabSz="800100">
-            <a:lnSpc>
-              <a:spcPct val="90000"/>
-            </a:lnSpc>
-            <a:spcBef>
-              <a:spcPct val="0"/>
-            </a:spcBef>
-            <a:spcAft>
-              <a:spcPct val="35000"/>
-            </a:spcAft>
-          </a:pPr>
-          <a:r>
-            <a:rPr lang="en-US" sz="1800" kern="1200" smtClean="0"/>
-            <a:t>Penggabungan model tokoh dengan </a:t>
-          </a:r>
-          <a:r>
-            <a:rPr lang="en-US" sz="1800" i="1" kern="1200" smtClean="0"/>
-            <a:t>Family Relationship Ontology</a:t>
-          </a:r>
-          <a:endParaRPr lang="en-US" sz="1800" kern="1200"/>
-        </a:p>
-      </dsp:txBody>
-      <dsp:txXfrm>
-        <a:off x="6023190" y="1038705"/>
-        <a:ext cx="2060143" cy="1206068"/>
-      </dsp:txXfrm>
-    </dsp:sp>
-    <dsp:sp modelId="{4C8F4061-453C-4E1A-8E10-5F5884D8BA6B}">
-      <dsp:nvSpPr>
-        <dsp:cNvPr id="0" name=""/>
-        <dsp:cNvSpPr/>
-      </dsp:nvSpPr>
-      <dsp:spPr>
-        <a:xfrm rot="5400000">
-          <a:off x="6826932" y="2431759"/>
-          <a:ext cx="452659" cy="529526"/>
-        </a:xfrm>
-        <a:prstGeom prst="rightArrow">
-          <a:avLst>
-            <a:gd name="adj1" fmla="val 60000"/>
-            <a:gd name="adj2" fmla="val 50000"/>
-          </a:avLst>
-        </a:prstGeom>
-        <a:solidFill>
-          <a:schemeClr val="accent1">
-            <a:tint val="60000"/>
-            <a:hueOff val="0"/>
-            <a:satOff val="0"/>
-            <a:lumOff val="0"/>
-            <a:alphaOff val="0"/>
-          </a:schemeClr>
-        </a:solidFill>
-        <a:ln>
-          <a:noFill/>
-        </a:ln>
-        <a:effectLst/>
-      </dsp:spPr>
-      <dsp:style>
-        <a:lnRef idx="0">
-          <a:scrgbClr r="0" g="0" b="0"/>
-        </a:lnRef>
-        <a:fillRef idx="1">
-          <a:scrgbClr r="0" g="0" b="0"/>
-        </a:fillRef>
-        <a:effectRef idx="0">
-          <a:scrgbClr r="0" g="0" b="0"/>
-        </a:effectRef>
-        <a:fontRef idx="minor">
-          <a:schemeClr val="lt1"/>
-        </a:fontRef>
-      </dsp:style>
-      <dsp:txBody>
-        <a:bodyPr spcFirstLastPara="0" vert="horz" wrap="square" lIns="0" tIns="0" rIns="0" bIns="0" numCol="1" spcCol="1270" anchor="ctr" anchorCtr="0">
-          <a:noAutofit/>
-        </a:bodyPr>
-        <a:lstStyle/>
-        <a:p>
-          <a:pPr lvl="0" algn="ctr" defTabSz="666750">
-            <a:lnSpc>
-              <a:spcPct val="90000"/>
-            </a:lnSpc>
-            <a:spcBef>
-              <a:spcPct val="0"/>
-            </a:spcBef>
-            <a:spcAft>
-              <a:spcPct val="35000"/>
-            </a:spcAft>
-          </a:pPr>
-          <a:endParaRPr lang="en-US" sz="1500" kern="1200"/>
-        </a:p>
-      </dsp:txBody>
-      <dsp:txXfrm rot="-5400000">
-        <a:off x="6894404" y="2470192"/>
-        <a:ext cx="317716" cy="316861"/>
-      </dsp:txXfrm>
-    </dsp:sp>
-    <dsp:sp modelId="{C70EF33C-E069-4530-8080-C2321E05A449}">
-      <dsp:nvSpPr>
-        <dsp:cNvPr id="0" name=""/>
-        <dsp:cNvSpPr/>
-      </dsp:nvSpPr>
-      <dsp:spPr>
-        <a:xfrm>
-          <a:off x="5985668" y="3136371"/>
-          <a:ext cx="2135187" cy="1281112"/>
-        </a:xfrm>
-        <a:prstGeom prst="roundRect">
-          <a:avLst>
-            <a:gd name="adj" fmla="val 10000"/>
-          </a:avLst>
-        </a:prstGeom>
-        <a:solidFill>
-          <a:schemeClr val="accent1">
-            <a:hueOff val="0"/>
-            <a:satOff val="0"/>
-            <a:lumOff val="0"/>
-            <a:alphaOff val="0"/>
-          </a:schemeClr>
-        </a:solidFill>
-        <a:ln w="12700" cap="flat" cmpd="sng" algn="ctr">
-          <a:solidFill>
-            <a:schemeClr val="lt1">
-              <a:hueOff val="0"/>
-              <a:satOff val="0"/>
-              <a:lumOff val="0"/>
-              <a:alphaOff val="0"/>
-            </a:schemeClr>
-          </a:solidFill>
-          <a:prstDash val="solid"/>
-          <a:miter lim="800000"/>
-        </a:ln>
-        <a:effectLst/>
-      </dsp:spPr>
-      <dsp:style>
-        <a:lnRef idx="2">
-          <a:scrgbClr r="0" g="0" b="0"/>
-        </a:lnRef>
-        <a:fillRef idx="1">
-          <a:scrgbClr r="0" g="0" b="0"/>
-        </a:fillRef>
-        <a:effectRef idx="0">
-          <a:scrgbClr r="0" g="0" b="0"/>
-        </a:effectRef>
-        <a:fontRef idx="minor">
-          <a:schemeClr val="lt1"/>
-        </a:fontRef>
-      </dsp:style>
-      <dsp:txBody>
-        <a:bodyPr spcFirstLastPara="0" vert="horz" wrap="square" lIns="68580" tIns="68580" rIns="68580" bIns="68580" numCol="1" spcCol="1270" anchor="ctr" anchorCtr="0">
-          <a:noAutofit/>
-        </a:bodyPr>
-        <a:lstStyle/>
-        <a:p>
-          <a:pPr lvl="0" algn="ctr" defTabSz="800100">
-            <a:lnSpc>
-              <a:spcPct val="90000"/>
-            </a:lnSpc>
-            <a:spcBef>
-              <a:spcPct val="0"/>
-            </a:spcBef>
-            <a:spcAft>
-              <a:spcPct val="35000"/>
-            </a:spcAft>
-          </a:pPr>
-          <a:r>
-            <a:rPr lang="en-US" sz="1800" kern="1200" smtClean="0"/>
-            <a:t>Reasoning</a:t>
-          </a:r>
-          <a:endParaRPr lang="en-US" sz="1800" kern="1200"/>
-        </a:p>
-      </dsp:txBody>
-      <dsp:txXfrm>
-        <a:off x="6023190" y="3173893"/>
-        <a:ext cx="2060143" cy="1206068"/>
-      </dsp:txXfrm>
-    </dsp:sp>
-    <dsp:sp modelId="{B5EC5973-7E95-417E-BA33-C450CF622691}">
-      <dsp:nvSpPr>
-        <dsp:cNvPr id="0" name=""/>
-        <dsp:cNvSpPr/>
-      </dsp:nvSpPr>
-      <dsp:spPr>
-        <a:xfrm rot="10800000">
-          <a:off x="5345112" y="3512163"/>
-          <a:ext cx="452659" cy="529526"/>
-        </a:xfrm>
-        <a:prstGeom prst="rightArrow">
-          <a:avLst>
-            <a:gd name="adj1" fmla="val 60000"/>
-            <a:gd name="adj2" fmla="val 50000"/>
-          </a:avLst>
-        </a:prstGeom>
-        <a:solidFill>
-          <a:schemeClr val="accent1">
-            <a:tint val="60000"/>
-            <a:hueOff val="0"/>
-            <a:satOff val="0"/>
-            <a:lumOff val="0"/>
-            <a:alphaOff val="0"/>
-          </a:schemeClr>
-        </a:solidFill>
-        <a:ln>
-          <a:noFill/>
-        </a:ln>
-        <a:effectLst/>
-      </dsp:spPr>
-      <dsp:style>
-        <a:lnRef idx="0">
-          <a:scrgbClr r="0" g="0" b="0"/>
-        </a:lnRef>
-        <a:fillRef idx="1">
-          <a:scrgbClr r="0" g="0" b="0"/>
-        </a:fillRef>
-        <a:effectRef idx="0">
-          <a:scrgbClr r="0" g="0" b="0"/>
-        </a:effectRef>
-        <a:fontRef idx="minor">
-          <a:schemeClr val="lt1"/>
-        </a:fontRef>
-      </dsp:style>
-      <dsp:txBody>
-        <a:bodyPr spcFirstLastPara="0" vert="horz" wrap="square" lIns="0" tIns="0" rIns="0" bIns="0" numCol="1" spcCol="1270" anchor="ctr" anchorCtr="0">
-          <a:noAutofit/>
-        </a:bodyPr>
-        <a:lstStyle/>
-        <a:p>
-          <a:pPr lvl="0" algn="ctr" defTabSz="666750">
-            <a:lnSpc>
-              <a:spcPct val="90000"/>
-            </a:lnSpc>
-            <a:spcBef>
-              <a:spcPct val="0"/>
-            </a:spcBef>
-            <a:spcAft>
-              <a:spcPct val="35000"/>
-            </a:spcAft>
-          </a:pPr>
-          <a:endParaRPr lang="en-US" sz="1500" kern="1200"/>
-        </a:p>
-      </dsp:txBody>
-      <dsp:txXfrm rot="10800000">
-        <a:off x="5480910" y="3618068"/>
-        <a:ext cx="316861" cy="317716"/>
-      </dsp:txXfrm>
-    </dsp:sp>
-    <dsp:sp modelId="{43744F74-5A04-409E-86C9-0A9A2C6EF963}">
-      <dsp:nvSpPr>
-        <dsp:cNvPr id="0" name=""/>
-        <dsp:cNvSpPr/>
-      </dsp:nvSpPr>
-      <dsp:spPr>
-        <a:xfrm>
-          <a:off x="2996406" y="3136370"/>
-          <a:ext cx="2135187" cy="1281112"/>
-        </a:xfrm>
-        <a:prstGeom prst="roundRect">
-          <a:avLst>
-            <a:gd name="adj" fmla="val 10000"/>
-          </a:avLst>
-        </a:prstGeom>
-        <a:solidFill>
-          <a:schemeClr val="accent1">
-            <a:hueOff val="0"/>
-            <a:satOff val="0"/>
-            <a:lumOff val="0"/>
-            <a:alphaOff val="0"/>
-          </a:schemeClr>
-        </a:solidFill>
-        <a:ln w="12700" cap="flat" cmpd="sng" algn="ctr">
-          <a:solidFill>
-            <a:schemeClr val="lt1">
-              <a:hueOff val="0"/>
-              <a:satOff val="0"/>
-              <a:lumOff val="0"/>
-              <a:alphaOff val="0"/>
-            </a:schemeClr>
-          </a:solidFill>
-          <a:prstDash val="solid"/>
-          <a:miter lim="800000"/>
-        </a:ln>
-        <a:effectLst/>
-      </dsp:spPr>
-      <dsp:style>
-        <a:lnRef idx="2">
-          <a:scrgbClr r="0" g="0" b="0"/>
-        </a:lnRef>
-        <a:fillRef idx="1">
-          <a:scrgbClr r="0" g="0" b="0"/>
-        </a:fillRef>
-        <a:effectRef idx="0">
-          <a:scrgbClr r="0" g="0" b="0"/>
-        </a:effectRef>
-        <a:fontRef idx="minor">
-          <a:schemeClr val="lt1"/>
-        </a:fontRef>
-      </dsp:style>
-      <dsp:txBody>
-        <a:bodyPr spcFirstLastPara="0" vert="horz" wrap="square" lIns="68580" tIns="68580" rIns="68580" bIns="68580" numCol="1" spcCol="1270" anchor="ctr" anchorCtr="0">
-          <a:noAutofit/>
-        </a:bodyPr>
-        <a:lstStyle/>
-        <a:p>
-          <a:pPr lvl="0" algn="ctr" defTabSz="800100">
-            <a:lnSpc>
-              <a:spcPct val="90000"/>
-            </a:lnSpc>
-            <a:spcBef>
-              <a:spcPct val="0"/>
-            </a:spcBef>
-            <a:spcAft>
-              <a:spcPct val="35000"/>
-            </a:spcAft>
-          </a:pPr>
-          <a:r>
-            <a:rPr lang="en-US" sz="1800" kern="1200" smtClean="0"/>
-            <a:t>Mencetak model hasil reasoning</a:t>
-          </a:r>
-          <a:endParaRPr lang="en-US" sz="1800" kern="1200"/>
-        </a:p>
-      </dsp:txBody>
-      <dsp:txXfrm>
-        <a:off x="3033928" y="3173892"/>
-        <a:ext cx="2060143" cy="1206068"/>
-      </dsp:txXfrm>
-    </dsp:sp>
   </dsp:spTree>
 </dsp:drawing>
 </file>
@@ -2952,384 +2370,6 @@
       <dsp:cNvGrpSpPr/>
     </dsp:nvGrpSpPr>
     <dsp:grpSpPr/>
-    <dsp:sp modelId="{CB39116F-EB91-404F-85AA-B1CB5796507D}">
-      <dsp:nvSpPr>
-        <dsp:cNvPr id="0" name=""/>
-        <dsp:cNvSpPr/>
-      </dsp:nvSpPr>
-      <dsp:spPr>
-        <a:xfrm>
-          <a:off x="298748" y="2110"/>
-          <a:ext cx="2331327" cy="1398796"/>
-        </a:xfrm>
-        <a:prstGeom prst="roundRect">
-          <a:avLst>
-            <a:gd name="adj" fmla="val 10000"/>
-          </a:avLst>
-        </a:prstGeom>
-        <a:solidFill>
-          <a:schemeClr val="accent1">
-            <a:hueOff val="0"/>
-            <a:satOff val="0"/>
-            <a:lumOff val="0"/>
-            <a:alphaOff val="0"/>
-          </a:schemeClr>
-        </a:solidFill>
-        <a:ln w="12700" cap="flat" cmpd="sng" algn="ctr">
-          <a:solidFill>
-            <a:schemeClr val="lt1">
-              <a:hueOff val="0"/>
-              <a:satOff val="0"/>
-              <a:lumOff val="0"/>
-              <a:alphaOff val="0"/>
-            </a:schemeClr>
-          </a:solidFill>
-          <a:prstDash val="solid"/>
-          <a:miter lim="800000"/>
-        </a:ln>
-        <a:effectLst/>
-      </dsp:spPr>
-      <dsp:style>
-        <a:lnRef idx="2">
-          <a:scrgbClr r="0" g="0" b="0"/>
-        </a:lnRef>
-        <a:fillRef idx="1">
-          <a:scrgbClr r="0" g="0" b="0"/>
-        </a:fillRef>
-        <a:effectRef idx="0">
-          <a:scrgbClr r="0" g="0" b="0"/>
-        </a:effectRef>
-        <a:fontRef idx="minor">
-          <a:schemeClr val="lt1"/>
-        </a:fontRef>
-      </dsp:style>
-      <dsp:txBody>
-        <a:bodyPr spcFirstLastPara="0" vert="horz" wrap="square" lIns="76200" tIns="76200" rIns="76200" bIns="76200" numCol="1" spcCol="1270" anchor="ctr" anchorCtr="0">
-          <a:noAutofit/>
-        </a:bodyPr>
-        <a:lstStyle/>
-        <a:p>
-          <a:pPr lvl="0" algn="ctr" defTabSz="889000">
-            <a:lnSpc>
-              <a:spcPct val="90000"/>
-            </a:lnSpc>
-            <a:spcBef>
-              <a:spcPct val="0"/>
-            </a:spcBef>
-            <a:spcAft>
-              <a:spcPct val="35000"/>
-            </a:spcAft>
-          </a:pPr>
-          <a:r>
-            <a:rPr lang="en-US" sz="2000" kern="1200" smtClean="0"/>
-            <a:t>Unggah data hasil reasoning ke Apache Jena Fuseki</a:t>
-          </a:r>
-          <a:endParaRPr lang="en-US" sz="2000" kern="1200"/>
-        </a:p>
-      </dsp:txBody>
-      <dsp:txXfrm>
-        <a:off x="339717" y="43079"/>
-        <a:ext cx="2249389" cy="1316858"/>
-      </dsp:txXfrm>
-    </dsp:sp>
-    <dsp:sp modelId="{AF1C5D5E-39F3-4096-8D54-97716BD884B5}">
-      <dsp:nvSpPr>
-        <dsp:cNvPr id="0" name=""/>
-        <dsp:cNvSpPr/>
-      </dsp:nvSpPr>
-      <dsp:spPr>
-        <a:xfrm>
-          <a:off x="2835233" y="412424"/>
-          <a:ext cx="494241" cy="578169"/>
-        </a:xfrm>
-        <a:prstGeom prst="rightArrow">
-          <a:avLst>
-            <a:gd name="adj1" fmla="val 60000"/>
-            <a:gd name="adj2" fmla="val 50000"/>
-          </a:avLst>
-        </a:prstGeom>
-        <a:solidFill>
-          <a:schemeClr val="accent1">
-            <a:tint val="60000"/>
-            <a:hueOff val="0"/>
-            <a:satOff val="0"/>
-            <a:lumOff val="0"/>
-            <a:alphaOff val="0"/>
-          </a:schemeClr>
-        </a:solidFill>
-        <a:ln>
-          <a:noFill/>
-        </a:ln>
-        <a:effectLst/>
-      </dsp:spPr>
-      <dsp:style>
-        <a:lnRef idx="0">
-          <a:scrgbClr r="0" g="0" b="0"/>
-        </a:lnRef>
-        <a:fillRef idx="1">
-          <a:scrgbClr r="0" g="0" b="0"/>
-        </a:fillRef>
-        <a:effectRef idx="0">
-          <a:scrgbClr r="0" g="0" b="0"/>
-        </a:effectRef>
-        <a:fontRef idx="minor">
-          <a:schemeClr val="lt1"/>
-        </a:fontRef>
-      </dsp:style>
-      <dsp:txBody>
-        <a:bodyPr spcFirstLastPara="0" vert="horz" wrap="square" lIns="0" tIns="0" rIns="0" bIns="0" numCol="1" spcCol="1270" anchor="ctr" anchorCtr="0">
-          <a:noAutofit/>
-        </a:bodyPr>
-        <a:lstStyle/>
-        <a:p>
-          <a:pPr lvl="0" algn="ctr" defTabSz="711200">
-            <a:lnSpc>
-              <a:spcPct val="90000"/>
-            </a:lnSpc>
-            <a:spcBef>
-              <a:spcPct val="0"/>
-            </a:spcBef>
-            <a:spcAft>
-              <a:spcPct val="35000"/>
-            </a:spcAft>
-          </a:pPr>
-          <a:endParaRPr lang="en-US" sz="1600" kern="1200"/>
-        </a:p>
-      </dsp:txBody>
-      <dsp:txXfrm>
-        <a:off x="2835233" y="528058"/>
-        <a:ext cx="345969" cy="346901"/>
-      </dsp:txXfrm>
-    </dsp:sp>
-    <dsp:sp modelId="{6FC43BBB-5A7D-4190-A831-ECD39838A64D}">
-      <dsp:nvSpPr>
-        <dsp:cNvPr id="0" name=""/>
-        <dsp:cNvSpPr/>
-      </dsp:nvSpPr>
-      <dsp:spPr>
-        <a:xfrm>
-          <a:off x="3562607" y="2110"/>
-          <a:ext cx="2331327" cy="1398796"/>
-        </a:xfrm>
-        <a:prstGeom prst="roundRect">
-          <a:avLst>
-            <a:gd name="adj" fmla="val 10000"/>
-          </a:avLst>
-        </a:prstGeom>
-        <a:solidFill>
-          <a:schemeClr val="accent1">
-            <a:hueOff val="0"/>
-            <a:satOff val="0"/>
-            <a:lumOff val="0"/>
-            <a:alphaOff val="0"/>
-          </a:schemeClr>
-        </a:solidFill>
-        <a:ln w="12700" cap="flat" cmpd="sng" algn="ctr">
-          <a:solidFill>
-            <a:schemeClr val="lt1">
-              <a:hueOff val="0"/>
-              <a:satOff val="0"/>
-              <a:lumOff val="0"/>
-              <a:alphaOff val="0"/>
-            </a:schemeClr>
-          </a:solidFill>
-          <a:prstDash val="solid"/>
-          <a:miter lim="800000"/>
-        </a:ln>
-        <a:effectLst/>
-      </dsp:spPr>
-      <dsp:style>
-        <a:lnRef idx="2">
-          <a:scrgbClr r="0" g="0" b="0"/>
-        </a:lnRef>
-        <a:fillRef idx="1">
-          <a:scrgbClr r="0" g="0" b="0"/>
-        </a:fillRef>
-        <a:effectRef idx="0">
-          <a:scrgbClr r="0" g="0" b="0"/>
-        </a:effectRef>
-        <a:fontRef idx="minor">
-          <a:schemeClr val="lt1"/>
-        </a:fontRef>
-      </dsp:style>
-      <dsp:txBody>
-        <a:bodyPr spcFirstLastPara="0" vert="horz" wrap="square" lIns="76200" tIns="76200" rIns="76200" bIns="76200" numCol="1" spcCol="1270" anchor="ctr" anchorCtr="0">
-          <a:noAutofit/>
-        </a:bodyPr>
-        <a:lstStyle/>
-        <a:p>
-          <a:pPr lvl="0" algn="ctr" defTabSz="889000">
-            <a:lnSpc>
-              <a:spcPct val="90000"/>
-            </a:lnSpc>
-            <a:spcBef>
-              <a:spcPct val="0"/>
-            </a:spcBef>
-            <a:spcAft>
-              <a:spcPct val="35000"/>
-            </a:spcAft>
-          </a:pPr>
-          <a:r>
-            <a:rPr lang="en-US" sz="2000" kern="1200" smtClean="0"/>
-            <a:t>SPARQL Query</a:t>
-          </a:r>
-          <a:endParaRPr lang="en-US" sz="2000" kern="1200"/>
-        </a:p>
-      </dsp:txBody>
-      <dsp:txXfrm>
-        <a:off x="3603576" y="43079"/>
-        <a:ext cx="2249389" cy="1316858"/>
-      </dsp:txXfrm>
-    </dsp:sp>
-    <dsp:sp modelId="{18D28992-97C3-49BA-B5CB-BA5D346E6A6E}">
-      <dsp:nvSpPr>
-        <dsp:cNvPr id="0" name=""/>
-        <dsp:cNvSpPr/>
-      </dsp:nvSpPr>
-      <dsp:spPr>
-        <a:xfrm rot="5400000">
-          <a:off x="4481150" y="1564100"/>
-          <a:ext cx="494241" cy="578169"/>
-        </a:xfrm>
-        <a:prstGeom prst="rightArrow">
-          <a:avLst>
-            <a:gd name="adj1" fmla="val 60000"/>
-            <a:gd name="adj2" fmla="val 50000"/>
-          </a:avLst>
-        </a:prstGeom>
-        <a:solidFill>
-          <a:schemeClr val="accent1">
-            <a:tint val="60000"/>
-            <a:hueOff val="0"/>
-            <a:satOff val="0"/>
-            <a:lumOff val="0"/>
-            <a:alphaOff val="0"/>
-          </a:schemeClr>
-        </a:solidFill>
-        <a:ln>
-          <a:noFill/>
-        </a:ln>
-        <a:effectLst/>
-      </dsp:spPr>
-      <dsp:style>
-        <a:lnRef idx="0">
-          <a:scrgbClr r="0" g="0" b="0"/>
-        </a:lnRef>
-        <a:fillRef idx="1">
-          <a:scrgbClr r="0" g="0" b="0"/>
-        </a:fillRef>
-        <a:effectRef idx="0">
-          <a:scrgbClr r="0" g="0" b="0"/>
-        </a:effectRef>
-        <a:fontRef idx="minor">
-          <a:schemeClr val="lt1"/>
-        </a:fontRef>
-      </dsp:style>
-      <dsp:txBody>
-        <a:bodyPr spcFirstLastPara="0" vert="horz" wrap="square" lIns="0" tIns="0" rIns="0" bIns="0" numCol="1" spcCol="1270" anchor="ctr" anchorCtr="0">
-          <a:noAutofit/>
-        </a:bodyPr>
-        <a:lstStyle/>
-        <a:p>
-          <a:pPr lvl="0" algn="ctr" defTabSz="711200">
-            <a:lnSpc>
-              <a:spcPct val="90000"/>
-            </a:lnSpc>
-            <a:spcBef>
-              <a:spcPct val="0"/>
-            </a:spcBef>
-            <a:spcAft>
-              <a:spcPct val="35000"/>
-            </a:spcAft>
-          </a:pPr>
-          <a:endParaRPr lang="en-US" sz="1600" kern="1200"/>
-        </a:p>
-      </dsp:txBody>
-      <dsp:txXfrm rot="-5400000">
-        <a:off x="4554820" y="1606064"/>
-        <a:ext cx="346901" cy="345969"/>
-      </dsp:txXfrm>
-    </dsp:sp>
-    <dsp:sp modelId="{CDC2BA57-16AE-4341-9248-3145FA7CD566}">
-      <dsp:nvSpPr>
-        <dsp:cNvPr id="0" name=""/>
-        <dsp:cNvSpPr/>
-      </dsp:nvSpPr>
-      <dsp:spPr>
-        <a:xfrm>
-          <a:off x="3562607" y="2333438"/>
-          <a:ext cx="2331327" cy="1398796"/>
-        </a:xfrm>
-        <a:prstGeom prst="roundRect">
-          <a:avLst>
-            <a:gd name="adj" fmla="val 10000"/>
-          </a:avLst>
-        </a:prstGeom>
-        <a:solidFill>
-          <a:schemeClr val="accent1">
-            <a:hueOff val="0"/>
-            <a:satOff val="0"/>
-            <a:lumOff val="0"/>
-            <a:alphaOff val="0"/>
-          </a:schemeClr>
-        </a:solidFill>
-        <a:ln w="12700" cap="flat" cmpd="sng" algn="ctr">
-          <a:solidFill>
-            <a:schemeClr val="lt1">
-              <a:hueOff val="0"/>
-              <a:satOff val="0"/>
-              <a:lumOff val="0"/>
-              <a:alphaOff val="0"/>
-            </a:schemeClr>
-          </a:solidFill>
-          <a:prstDash val="solid"/>
-          <a:miter lim="800000"/>
-        </a:ln>
-        <a:effectLst/>
-      </dsp:spPr>
-      <dsp:style>
-        <a:lnRef idx="2">
-          <a:scrgbClr r="0" g="0" b="0"/>
-        </a:lnRef>
-        <a:fillRef idx="1">
-          <a:scrgbClr r="0" g="0" b="0"/>
-        </a:fillRef>
-        <a:effectRef idx="0">
-          <a:scrgbClr r="0" g="0" b="0"/>
-        </a:effectRef>
-        <a:fontRef idx="minor">
-          <a:schemeClr val="lt1"/>
-        </a:fontRef>
-      </dsp:style>
-      <dsp:txBody>
-        <a:bodyPr spcFirstLastPara="0" vert="horz" wrap="square" lIns="76200" tIns="76200" rIns="76200" bIns="76200" numCol="1" spcCol="1270" anchor="ctr" anchorCtr="0">
-          <a:noAutofit/>
-        </a:bodyPr>
-        <a:lstStyle/>
-        <a:p>
-          <a:pPr lvl="0" algn="ctr" defTabSz="889000">
-            <a:lnSpc>
-              <a:spcPct val="90000"/>
-            </a:lnSpc>
-            <a:spcBef>
-              <a:spcPct val="0"/>
-            </a:spcBef>
-            <a:spcAft>
-              <a:spcPct val="35000"/>
-            </a:spcAft>
-          </a:pPr>
-          <a:r>
-            <a:rPr lang="en-US" sz="2000" kern="1200" smtClean="0"/>
-            <a:t>Visualisasi struktur pohon keluarga</a:t>
-          </a:r>
-          <a:endParaRPr lang="en-US" sz="2000" kern="1200"/>
-        </a:p>
-      </dsp:txBody>
-      <dsp:txXfrm>
-        <a:off x="3603576" y="2374407"/>
-        <a:ext cx="2249389" cy="1316858"/>
-      </dsp:txXfrm>
-    </dsp:sp>
   </dsp:spTree>
 </dsp:drawing>
 </file>
@@ -5771,7 +4811,7 @@
           <p:cNvPr id="2" name="Header Placeholder 1">
             <a:extLst>
               <a:ext uri="{FF2B5EF4-FFF2-40B4-BE49-F238E27FC236}">
-                <a16:creationId xmlns="" xmlns:a16="http://schemas.microsoft.com/office/drawing/2014/main" id="{27243D74-B9C1-450A-B0F3-6C6DCB0CF20B}"/>
+                <a16:creationId xmlns:a16="http://schemas.microsoft.com/office/drawing/2014/main" xmlns="" id="{27243D74-B9C1-450A-B0F3-6C6DCB0CF20B}"/>
               </a:ext>
             </a:extLst>
           </p:cNvPr>
@@ -5808,7 +4848,7 @@
           <p:cNvPr id="3" name="Date Placeholder 2">
             <a:extLst>
               <a:ext uri="{FF2B5EF4-FFF2-40B4-BE49-F238E27FC236}">
-                <a16:creationId xmlns="" xmlns:a16="http://schemas.microsoft.com/office/drawing/2014/main" id="{32C27C33-9BB1-41D5-A236-12767E7E722F}"/>
+                <a16:creationId xmlns:a16="http://schemas.microsoft.com/office/drawing/2014/main" xmlns="" id="{32C27C33-9BB1-41D5-A236-12767E7E722F}"/>
               </a:ext>
             </a:extLst>
           </p:cNvPr>
@@ -5838,7 +4878,7 @@
           <a:p>
             <a:fld id="{97AB3EA8-A58D-4C92-A3AB-D271CCC294C7}" type="datetimeFigureOut">
               <a:rPr lang="en-US" smtClean="0"/>
-              <a:t>7/2/2019</a:t>
+              <a:t>7/5/2019</a:t>
             </a:fld>
             <a:endParaRPr lang="en-US" dirty="0"/>
           </a:p>
@@ -5849,7 +4889,7 @@
           <p:cNvPr id="4" name="Footer Placeholder 3">
             <a:extLst>
               <a:ext uri="{FF2B5EF4-FFF2-40B4-BE49-F238E27FC236}">
-                <a16:creationId xmlns="" xmlns:a16="http://schemas.microsoft.com/office/drawing/2014/main" id="{44A7EADB-04A4-4093-B238-438E2C7317A1}"/>
+                <a16:creationId xmlns:a16="http://schemas.microsoft.com/office/drawing/2014/main" xmlns="" id="{44A7EADB-04A4-4093-B238-438E2C7317A1}"/>
               </a:ext>
             </a:extLst>
           </p:cNvPr>
@@ -5886,7 +4926,7 @@
           <p:cNvPr id="5" name="Slide Number Placeholder 4">
             <a:extLst>
               <a:ext uri="{FF2B5EF4-FFF2-40B4-BE49-F238E27FC236}">
-                <a16:creationId xmlns="" xmlns:a16="http://schemas.microsoft.com/office/drawing/2014/main" id="{EDDD8696-706D-440E-AE04-4C644F0613E8}"/>
+                <a16:creationId xmlns:a16="http://schemas.microsoft.com/office/drawing/2014/main" xmlns="" id="{EDDD8696-706D-440E-AE04-4C644F0613E8}"/>
               </a:ext>
             </a:extLst>
           </p:cNvPr>
@@ -6015,7 +5055,7 @@
           <a:p>
             <a:fld id="{0AEFB4FA-E877-413E-B608-88789D806C57}" type="datetimeFigureOut">
               <a:rPr lang="en-US" noProof="0" smtClean="0"/>
-              <a:t>7/2/2019</a:t>
+              <a:t>7/5/2019</a:t>
             </a:fld>
             <a:endParaRPr lang="en-US" noProof="0" dirty="0"/>
           </a:p>
@@ -7308,7 +6348,7 @@
           <p:cNvPr id="2" name="Title 1">
             <a:extLst>
               <a:ext uri="{FF2B5EF4-FFF2-40B4-BE49-F238E27FC236}">
-                <a16:creationId xmlns="" xmlns:a16="http://schemas.microsoft.com/office/drawing/2014/main" id="{2456FD49-C258-4333-9422-358C976A341C}"/>
+                <a16:creationId xmlns:a16="http://schemas.microsoft.com/office/drawing/2014/main" xmlns="" id="{2456FD49-C258-4333-9422-358C976A341C}"/>
               </a:ext>
             </a:extLst>
           </p:cNvPr>
@@ -7352,7 +6392,7 @@
           <p:cNvPr id="3" name="Subtitle 2">
             <a:extLst>
               <a:ext uri="{FF2B5EF4-FFF2-40B4-BE49-F238E27FC236}">
-                <a16:creationId xmlns="" xmlns:a16="http://schemas.microsoft.com/office/drawing/2014/main" id="{59758E15-A93D-4FB9-843D-1490E27A151B}"/>
+                <a16:creationId xmlns:a16="http://schemas.microsoft.com/office/drawing/2014/main" xmlns="" id="{59758E15-A93D-4FB9-843D-1490E27A151B}"/>
               </a:ext>
             </a:extLst>
           </p:cNvPr>
@@ -7429,7 +6469,7 @@
           <p:cNvPr id="13" name="Picture Placeholder 12">
             <a:extLst>
               <a:ext uri="{FF2B5EF4-FFF2-40B4-BE49-F238E27FC236}">
-                <a16:creationId xmlns="" xmlns:a16="http://schemas.microsoft.com/office/drawing/2014/main" id="{BCCC559D-0EC3-432C-B397-6897B366DF36}"/>
+                <a16:creationId xmlns:a16="http://schemas.microsoft.com/office/drawing/2014/main" xmlns="" id="{BCCC559D-0EC3-432C-B397-6897B366DF36}"/>
               </a:ext>
             </a:extLst>
           </p:cNvPr>
@@ -7474,7 +6514,7 @@
           <p:cNvPr id="14" name="Group 13">
             <a:extLst>
               <a:ext uri="{FF2B5EF4-FFF2-40B4-BE49-F238E27FC236}">
-                <a16:creationId xmlns="" xmlns:a16="http://schemas.microsoft.com/office/drawing/2014/main" id="{0DC2055F-AE3F-46BE-B57E-A0F1A86D1C36}"/>
+                <a16:creationId xmlns:a16="http://schemas.microsoft.com/office/drawing/2014/main" xmlns="" id="{0DC2055F-AE3F-46BE-B57E-A0F1A86D1C36}"/>
               </a:ext>
             </a:extLst>
           </p:cNvPr>
@@ -7499,7 +6539,7 @@
             <p:cNvPr id="15" name="Freeform 5">
               <a:extLst>
                 <a:ext uri="{FF2B5EF4-FFF2-40B4-BE49-F238E27FC236}">
-                  <a16:creationId xmlns="" xmlns:a16="http://schemas.microsoft.com/office/drawing/2014/main" id="{C98EF042-A3B8-406D-BC16-153A989F571A}"/>
+                  <a16:creationId xmlns:a16="http://schemas.microsoft.com/office/drawing/2014/main" xmlns="" id="{C98EF042-A3B8-406D-BC16-153A989F571A}"/>
                 </a:ext>
               </a:extLst>
             </p:cNvPr>
@@ -7689,7 +6729,7 @@
             <p:cNvPr id="16" name="Freeform 6">
               <a:extLst>
                 <a:ext uri="{FF2B5EF4-FFF2-40B4-BE49-F238E27FC236}">
-                  <a16:creationId xmlns="" xmlns:a16="http://schemas.microsoft.com/office/drawing/2014/main" id="{68E5FAC9-A660-4D7A-AC84-0A7C8CC3BB65}"/>
+                  <a16:creationId xmlns:a16="http://schemas.microsoft.com/office/drawing/2014/main" xmlns="" id="{68E5FAC9-A660-4D7A-AC84-0A7C8CC3BB65}"/>
                 </a:ext>
               </a:extLst>
             </p:cNvPr>
@@ -7840,7 +6880,7 @@
           <p:cNvPr id="9" name="Picture 8">
             <a:extLst>
               <a:ext uri="{FF2B5EF4-FFF2-40B4-BE49-F238E27FC236}">
-                <a16:creationId xmlns="" xmlns:a16="http://schemas.microsoft.com/office/drawing/2014/main" id="{4FE28ACC-E44C-4381-B768-0310810E78D2}"/>
+                <a16:creationId xmlns:a16="http://schemas.microsoft.com/office/drawing/2014/main" xmlns="" id="{4FE28ACC-E44C-4381-B768-0310810E78D2}"/>
               </a:ext>
             </a:extLst>
           </p:cNvPr>
@@ -7876,7 +6916,7 @@
           <p:cNvPr id="5" name="Straight Connector 4">
             <a:extLst>
               <a:ext uri="{FF2B5EF4-FFF2-40B4-BE49-F238E27FC236}">
-                <a16:creationId xmlns="" xmlns:a16="http://schemas.microsoft.com/office/drawing/2014/main" id="{819AFA09-F4B1-493D-BCAD-FF30C20CD1AA}"/>
+                <a16:creationId xmlns:a16="http://schemas.microsoft.com/office/drawing/2014/main" xmlns="" id="{819AFA09-F4B1-493D-BCAD-FF30C20CD1AA}"/>
               </a:ext>
             </a:extLst>
           </p:cNvPr>
@@ -7942,7 +6982,7 @@
           <p:cNvPr id="3" name="Subtitle 2">
             <a:extLst>
               <a:ext uri="{FF2B5EF4-FFF2-40B4-BE49-F238E27FC236}">
-                <a16:creationId xmlns="" xmlns:a16="http://schemas.microsoft.com/office/drawing/2014/main" id="{59758E15-A93D-4FB9-843D-1490E27A151B}"/>
+                <a16:creationId xmlns:a16="http://schemas.microsoft.com/office/drawing/2014/main" xmlns="" id="{59758E15-A93D-4FB9-843D-1490E27A151B}"/>
               </a:ext>
             </a:extLst>
           </p:cNvPr>
@@ -8018,7 +7058,7 @@
           <p:cNvPr id="13" name="Picture Placeholder 12">
             <a:extLst>
               <a:ext uri="{FF2B5EF4-FFF2-40B4-BE49-F238E27FC236}">
-                <a16:creationId xmlns="" xmlns:a16="http://schemas.microsoft.com/office/drawing/2014/main" id="{BCCC559D-0EC3-432C-B397-6897B366DF36}"/>
+                <a16:creationId xmlns:a16="http://schemas.microsoft.com/office/drawing/2014/main" xmlns="" id="{BCCC559D-0EC3-432C-B397-6897B366DF36}"/>
               </a:ext>
             </a:extLst>
           </p:cNvPr>
@@ -8063,7 +7103,7 @@
           <p:cNvPr id="14" name="Group 13">
             <a:extLst>
               <a:ext uri="{FF2B5EF4-FFF2-40B4-BE49-F238E27FC236}">
-                <a16:creationId xmlns="" xmlns:a16="http://schemas.microsoft.com/office/drawing/2014/main" id="{0DC2055F-AE3F-46BE-B57E-A0F1A86D1C36}"/>
+                <a16:creationId xmlns:a16="http://schemas.microsoft.com/office/drawing/2014/main" xmlns="" id="{0DC2055F-AE3F-46BE-B57E-A0F1A86D1C36}"/>
               </a:ext>
             </a:extLst>
           </p:cNvPr>
@@ -8088,7 +7128,7 @@
             <p:cNvPr id="15" name="Freeform 5">
               <a:extLst>
                 <a:ext uri="{FF2B5EF4-FFF2-40B4-BE49-F238E27FC236}">
-                  <a16:creationId xmlns="" xmlns:a16="http://schemas.microsoft.com/office/drawing/2014/main" id="{C98EF042-A3B8-406D-BC16-153A989F571A}"/>
+                  <a16:creationId xmlns:a16="http://schemas.microsoft.com/office/drawing/2014/main" xmlns="" id="{C98EF042-A3B8-406D-BC16-153A989F571A}"/>
                 </a:ext>
               </a:extLst>
             </p:cNvPr>
@@ -8278,7 +7318,7 @@
             <p:cNvPr id="16" name="Freeform 6">
               <a:extLst>
                 <a:ext uri="{FF2B5EF4-FFF2-40B4-BE49-F238E27FC236}">
-                  <a16:creationId xmlns="" xmlns:a16="http://schemas.microsoft.com/office/drawing/2014/main" id="{68E5FAC9-A660-4D7A-AC84-0A7C8CC3BB65}"/>
+                  <a16:creationId xmlns:a16="http://schemas.microsoft.com/office/drawing/2014/main" xmlns="" id="{68E5FAC9-A660-4D7A-AC84-0A7C8CC3BB65}"/>
                 </a:ext>
               </a:extLst>
             </p:cNvPr>
@@ -8429,7 +7469,7 @@
           <p:cNvPr id="9" name="Picture 8">
             <a:extLst>
               <a:ext uri="{FF2B5EF4-FFF2-40B4-BE49-F238E27FC236}">
-                <a16:creationId xmlns="" xmlns:a16="http://schemas.microsoft.com/office/drawing/2014/main" id="{4FE28ACC-E44C-4381-B768-0310810E78D2}"/>
+                <a16:creationId xmlns:a16="http://schemas.microsoft.com/office/drawing/2014/main" xmlns="" id="{4FE28ACC-E44C-4381-B768-0310810E78D2}"/>
               </a:ext>
             </a:extLst>
           </p:cNvPr>
@@ -8465,7 +7505,7 @@
           <p:cNvPr id="5" name="Straight Connector 4">
             <a:extLst>
               <a:ext uri="{FF2B5EF4-FFF2-40B4-BE49-F238E27FC236}">
-                <a16:creationId xmlns="" xmlns:a16="http://schemas.microsoft.com/office/drawing/2014/main" id="{819AFA09-F4B1-493D-BCAD-FF30C20CD1AA}"/>
+                <a16:creationId xmlns:a16="http://schemas.microsoft.com/office/drawing/2014/main" xmlns="" id="{819AFA09-F4B1-493D-BCAD-FF30C20CD1AA}"/>
               </a:ext>
             </a:extLst>
           </p:cNvPr>
@@ -8501,7 +7541,7 @@
           <p:cNvPr id="7" name="Text Placeholder 6">
             <a:extLst>
               <a:ext uri="{FF2B5EF4-FFF2-40B4-BE49-F238E27FC236}">
-                <a16:creationId xmlns="" xmlns:a16="http://schemas.microsoft.com/office/drawing/2014/main" id="{4E0FBE0E-A6B0-483E-93DD-5C20DA069DBC}"/>
+                <a16:creationId xmlns:a16="http://schemas.microsoft.com/office/drawing/2014/main" xmlns="" id="{4E0FBE0E-A6B0-483E-93DD-5C20DA069DBC}"/>
               </a:ext>
             </a:extLst>
           </p:cNvPr>
@@ -8550,7 +7590,7 @@
           <p:cNvPr id="17" name="Graphic 16" descr="Envelope">
             <a:extLst>
               <a:ext uri="{FF2B5EF4-FFF2-40B4-BE49-F238E27FC236}">
-                <a16:creationId xmlns="" xmlns:a16="http://schemas.microsoft.com/office/drawing/2014/main" id="{E5B30B87-6C2E-48F1-9026-E4F6BEA1CFE7}"/>
+                <a16:creationId xmlns:a16="http://schemas.microsoft.com/office/drawing/2014/main" xmlns="" id="{E5B30B87-6C2E-48F1-9026-E4F6BEA1CFE7}"/>
               </a:ext>
             </a:extLst>
           </p:cNvPr>
@@ -8566,7 +7606,7 @@
                 <a14:useLocalDpi xmlns:a14="http://schemas.microsoft.com/office/drawing/2010/main"/>
               </a:ext>
               <a:ext uri="{96DAC541-7B7A-43D3-8B79-37D633B846F1}">
-                <asvg:svgBlip xmlns="" xmlns:asvg="http://schemas.microsoft.com/office/drawing/2016/SVG/main" r:embed="rId4"/>
+                <asvg:svgBlip xmlns:asvg="http://schemas.microsoft.com/office/drawing/2016/SVG/main" xmlns="" r:embed="rId4"/>
               </a:ext>
             </a:extLst>
           </a:blip>
@@ -8589,7 +7629,7 @@
           <p:cNvPr id="18" name="Graphic 17" descr="Network">
             <a:extLst>
               <a:ext uri="{FF2B5EF4-FFF2-40B4-BE49-F238E27FC236}">
-                <a16:creationId xmlns="" xmlns:a16="http://schemas.microsoft.com/office/drawing/2014/main" id="{2DA3CFE0-4ED8-4345-A158-94E70F463E99}"/>
+                <a16:creationId xmlns:a16="http://schemas.microsoft.com/office/drawing/2014/main" xmlns="" id="{2DA3CFE0-4ED8-4345-A158-94E70F463E99}"/>
               </a:ext>
             </a:extLst>
           </p:cNvPr>
@@ -8605,7 +7645,7 @@
                 <a14:useLocalDpi xmlns:a14="http://schemas.microsoft.com/office/drawing/2010/main"/>
               </a:ext>
               <a:ext uri="{96DAC541-7B7A-43D3-8B79-37D633B846F1}">
-                <asvg:svgBlip xmlns="" xmlns:asvg="http://schemas.microsoft.com/office/drawing/2016/SVG/main" r:embed="rId6"/>
+                <asvg:svgBlip xmlns:asvg="http://schemas.microsoft.com/office/drawing/2016/SVG/main" xmlns="" r:embed="rId6"/>
               </a:ext>
             </a:extLst>
           </a:blip>
@@ -8628,7 +7668,7 @@
           <p:cNvPr id="2" name="Title 1">
             <a:extLst>
               <a:ext uri="{FF2B5EF4-FFF2-40B4-BE49-F238E27FC236}">
-                <a16:creationId xmlns="" xmlns:a16="http://schemas.microsoft.com/office/drawing/2014/main" id="{2CE9908F-CF81-43F9-880A-401D0C0FB2ED}"/>
+                <a16:creationId xmlns:a16="http://schemas.microsoft.com/office/drawing/2014/main" xmlns="" id="{2CE9908F-CF81-43F9-880A-401D0C0FB2ED}"/>
               </a:ext>
             </a:extLst>
           </p:cNvPr>
@@ -8706,7 +7746,7 @@
           <p:cNvPr id="4" name="Rectangle 3">
             <a:extLst>
               <a:ext uri="{FF2B5EF4-FFF2-40B4-BE49-F238E27FC236}">
-                <a16:creationId xmlns="" xmlns:a16="http://schemas.microsoft.com/office/drawing/2014/main" id="{86299464-ED20-4919-8B3A-2CFAE8DA2347}"/>
+                <a16:creationId xmlns:a16="http://schemas.microsoft.com/office/drawing/2014/main" xmlns="" id="{86299464-ED20-4919-8B3A-2CFAE8DA2347}"/>
               </a:ext>
             </a:extLst>
           </p:cNvPr>
@@ -8758,7 +7798,7 @@
           <p:cNvPr id="13" name="Picture Placeholder 12">
             <a:extLst>
               <a:ext uri="{FF2B5EF4-FFF2-40B4-BE49-F238E27FC236}">
-                <a16:creationId xmlns="" xmlns:a16="http://schemas.microsoft.com/office/drawing/2014/main" id="{BCCC559D-0EC3-432C-B397-6897B366DF36}"/>
+                <a16:creationId xmlns:a16="http://schemas.microsoft.com/office/drawing/2014/main" xmlns="" id="{BCCC559D-0EC3-432C-B397-6897B366DF36}"/>
               </a:ext>
             </a:extLst>
           </p:cNvPr>
@@ -8803,7 +7843,7 @@
           <p:cNvPr id="14" name="Group 13">
             <a:extLst>
               <a:ext uri="{FF2B5EF4-FFF2-40B4-BE49-F238E27FC236}">
-                <a16:creationId xmlns="" xmlns:a16="http://schemas.microsoft.com/office/drawing/2014/main" id="{0DC2055F-AE3F-46BE-B57E-A0F1A86D1C36}"/>
+                <a16:creationId xmlns:a16="http://schemas.microsoft.com/office/drawing/2014/main" xmlns="" id="{0DC2055F-AE3F-46BE-B57E-A0F1A86D1C36}"/>
               </a:ext>
             </a:extLst>
           </p:cNvPr>
@@ -8828,7 +7868,7 @@
             <p:cNvPr id="15" name="Freeform 5">
               <a:extLst>
                 <a:ext uri="{FF2B5EF4-FFF2-40B4-BE49-F238E27FC236}">
-                  <a16:creationId xmlns="" xmlns:a16="http://schemas.microsoft.com/office/drawing/2014/main" id="{C98EF042-A3B8-406D-BC16-153A989F571A}"/>
+                  <a16:creationId xmlns:a16="http://schemas.microsoft.com/office/drawing/2014/main" xmlns="" id="{C98EF042-A3B8-406D-BC16-153A989F571A}"/>
                 </a:ext>
               </a:extLst>
             </p:cNvPr>
@@ -9018,7 +8058,7 @@
             <p:cNvPr id="16" name="Freeform 6">
               <a:extLst>
                 <a:ext uri="{FF2B5EF4-FFF2-40B4-BE49-F238E27FC236}">
-                  <a16:creationId xmlns="" xmlns:a16="http://schemas.microsoft.com/office/drawing/2014/main" id="{68E5FAC9-A660-4D7A-AC84-0A7C8CC3BB65}"/>
+                  <a16:creationId xmlns:a16="http://schemas.microsoft.com/office/drawing/2014/main" xmlns="" id="{68E5FAC9-A660-4D7A-AC84-0A7C8CC3BB65}"/>
                 </a:ext>
               </a:extLst>
             </p:cNvPr>
@@ -9169,7 +8209,7 @@
           <p:cNvPr id="9" name="Picture 8">
             <a:extLst>
               <a:ext uri="{FF2B5EF4-FFF2-40B4-BE49-F238E27FC236}">
-                <a16:creationId xmlns="" xmlns:a16="http://schemas.microsoft.com/office/drawing/2014/main" id="{4FE28ACC-E44C-4381-B768-0310810E78D2}"/>
+                <a16:creationId xmlns:a16="http://schemas.microsoft.com/office/drawing/2014/main" xmlns="" id="{4FE28ACC-E44C-4381-B768-0310810E78D2}"/>
               </a:ext>
             </a:extLst>
           </p:cNvPr>
@@ -9214,7 +8254,7 @@
           <p:cNvPr id="12" name="Straight Connector 11">
             <a:extLst>
               <a:ext uri="{FF2B5EF4-FFF2-40B4-BE49-F238E27FC236}">
-                <a16:creationId xmlns="" xmlns:a16="http://schemas.microsoft.com/office/drawing/2014/main" id="{77C312F4-62C2-4903-8C4B-423A8717E481}"/>
+                <a16:creationId xmlns:a16="http://schemas.microsoft.com/office/drawing/2014/main" xmlns="" id="{77C312F4-62C2-4903-8C4B-423A8717E481}"/>
               </a:ext>
             </a:extLst>
           </p:cNvPr>
@@ -9255,7 +8295,7 @@
           <p:cNvPr id="19" name="Graphic 18" descr="Envelope">
             <a:extLst>
               <a:ext uri="{FF2B5EF4-FFF2-40B4-BE49-F238E27FC236}">
-                <a16:creationId xmlns="" xmlns:a16="http://schemas.microsoft.com/office/drawing/2014/main" id="{A686352B-226C-4579-B831-0DC14EC3895E}"/>
+                <a16:creationId xmlns:a16="http://schemas.microsoft.com/office/drawing/2014/main" xmlns="" id="{A686352B-226C-4579-B831-0DC14EC3895E}"/>
               </a:ext>
             </a:extLst>
           </p:cNvPr>
@@ -9291,7 +8331,7 @@
           <p:cNvPr id="20" name="Graphic 19" descr="Network">
             <a:extLst>
               <a:ext uri="{FF2B5EF4-FFF2-40B4-BE49-F238E27FC236}">
-                <a16:creationId xmlns="" xmlns:a16="http://schemas.microsoft.com/office/drawing/2014/main" id="{460C8169-012B-451A-A6C2-6FEC0DC82AFC}"/>
+                <a16:creationId xmlns:a16="http://schemas.microsoft.com/office/drawing/2014/main" xmlns="" id="{460C8169-012B-451A-A6C2-6FEC0DC82AFC}"/>
               </a:ext>
             </a:extLst>
           </p:cNvPr>
@@ -9327,7 +8367,7 @@
           <p:cNvPr id="21" name="Subtitle 2">
             <a:extLst>
               <a:ext uri="{FF2B5EF4-FFF2-40B4-BE49-F238E27FC236}">
-                <a16:creationId xmlns="" xmlns:a16="http://schemas.microsoft.com/office/drawing/2014/main" id="{ADF17BC1-06CE-42EA-A970-31A7ED871AA4}"/>
+                <a16:creationId xmlns:a16="http://schemas.microsoft.com/office/drawing/2014/main" xmlns="" id="{ADF17BC1-06CE-42EA-A970-31A7ED871AA4}"/>
               </a:ext>
             </a:extLst>
           </p:cNvPr>
@@ -9403,7 +8443,7 @@
           <p:cNvPr id="22" name="Text Placeholder 6">
             <a:extLst>
               <a:ext uri="{FF2B5EF4-FFF2-40B4-BE49-F238E27FC236}">
-                <a16:creationId xmlns="" xmlns:a16="http://schemas.microsoft.com/office/drawing/2014/main" id="{7035F1B3-4E91-44FF-B4E7-E5D87C7A034C}"/>
+                <a16:creationId xmlns:a16="http://schemas.microsoft.com/office/drawing/2014/main" xmlns="" id="{7035F1B3-4E91-44FF-B4E7-E5D87C7A034C}"/>
               </a:ext>
             </a:extLst>
           </p:cNvPr>
@@ -9456,7 +8496,7 @@
           <p:cNvPr id="18" name="Title 1">
             <a:extLst>
               <a:ext uri="{FF2B5EF4-FFF2-40B4-BE49-F238E27FC236}">
-                <a16:creationId xmlns="" xmlns:a16="http://schemas.microsoft.com/office/drawing/2014/main" id="{525B5135-F466-4A63-A42C-3BB2BAA7D24D}"/>
+                <a16:creationId xmlns:a16="http://schemas.microsoft.com/office/drawing/2014/main" xmlns="" id="{525B5135-F466-4A63-A42C-3BB2BAA7D24D}"/>
               </a:ext>
             </a:extLst>
           </p:cNvPr>
@@ -9560,7 +8600,7 @@
           <p:cNvPr id="4" name="Rectangle 3">
             <a:extLst>
               <a:ext uri="{FF2B5EF4-FFF2-40B4-BE49-F238E27FC236}">
-                <a16:creationId xmlns="" xmlns:a16="http://schemas.microsoft.com/office/drawing/2014/main" id="{86299464-ED20-4919-8B3A-2CFAE8DA2347}"/>
+                <a16:creationId xmlns:a16="http://schemas.microsoft.com/office/drawing/2014/main" xmlns="" id="{86299464-ED20-4919-8B3A-2CFAE8DA2347}"/>
               </a:ext>
             </a:extLst>
           </p:cNvPr>
@@ -9612,7 +8652,7 @@
           <p:cNvPr id="6" name="Oval 5">
             <a:extLst>
               <a:ext uri="{FF2B5EF4-FFF2-40B4-BE49-F238E27FC236}">
-                <a16:creationId xmlns="" xmlns:a16="http://schemas.microsoft.com/office/drawing/2014/main" id="{1F54E98B-AC75-484D-9121-68498EB888AA}"/>
+                <a16:creationId xmlns:a16="http://schemas.microsoft.com/office/drawing/2014/main" xmlns="" id="{1F54E98B-AC75-484D-9121-68498EB888AA}"/>
               </a:ext>
             </a:extLst>
           </p:cNvPr>
@@ -9666,7 +8706,7 @@
           <p:cNvPr id="2" name="Title 1">
             <a:extLst>
               <a:ext uri="{FF2B5EF4-FFF2-40B4-BE49-F238E27FC236}">
-                <a16:creationId xmlns="" xmlns:a16="http://schemas.microsoft.com/office/drawing/2014/main" id="{2456FD49-C258-4333-9422-358C976A341C}"/>
+                <a16:creationId xmlns:a16="http://schemas.microsoft.com/office/drawing/2014/main" xmlns="" id="{2456FD49-C258-4333-9422-358C976A341C}"/>
               </a:ext>
             </a:extLst>
           </p:cNvPr>
@@ -9710,7 +8750,7 @@
           <p:cNvPr id="3" name="Subtitle 2">
             <a:extLst>
               <a:ext uri="{FF2B5EF4-FFF2-40B4-BE49-F238E27FC236}">
-                <a16:creationId xmlns="" xmlns:a16="http://schemas.microsoft.com/office/drawing/2014/main" id="{59758E15-A93D-4FB9-843D-1490E27A151B}"/>
+                <a16:creationId xmlns:a16="http://schemas.microsoft.com/office/drawing/2014/main" xmlns="" id="{59758E15-A93D-4FB9-843D-1490E27A151B}"/>
               </a:ext>
             </a:extLst>
           </p:cNvPr>
@@ -9787,7 +8827,7 @@
           <p:cNvPr id="14" name="Group 13">
             <a:extLst>
               <a:ext uri="{FF2B5EF4-FFF2-40B4-BE49-F238E27FC236}">
-                <a16:creationId xmlns="" xmlns:a16="http://schemas.microsoft.com/office/drawing/2014/main" id="{0DC2055F-AE3F-46BE-B57E-A0F1A86D1C36}"/>
+                <a16:creationId xmlns:a16="http://schemas.microsoft.com/office/drawing/2014/main" xmlns="" id="{0DC2055F-AE3F-46BE-B57E-A0F1A86D1C36}"/>
               </a:ext>
             </a:extLst>
           </p:cNvPr>
@@ -9812,7 +8852,7 @@
             <p:cNvPr id="15" name="Freeform 5">
               <a:extLst>
                 <a:ext uri="{FF2B5EF4-FFF2-40B4-BE49-F238E27FC236}">
-                  <a16:creationId xmlns="" xmlns:a16="http://schemas.microsoft.com/office/drawing/2014/main" id="{C98EF042-A3B8-406D-BC16-153A989F571A}"/>
+                  <a16:creationId xmlns:a16="http://schemas.microsoft.com/office/drawing/2014/main" xmlns="" id="{C98EF042-A3B8-406D-BC16-153A989F571A}"/>
                 </a:ext>
               </a:extLst>
             </p:cNvPr>
@@ -10002,7 +9042,7 @@
             <p:cNvPr id="16" name="Freeform 6">
               <a:extLst>
                 <a:ext uri="{FF2B5EF4-FFF2-40B4-BE49-F238E27FC236}">
-                  <a16:creationId xmlns="" xmlns:a16="http://schemas.microsoft.com/office/drawing/2014/main" id="{68E5FAC9-A660-4D7A-AC84-0A7C8CC3BB65}"/>
+                  <a16:creationId xmlns:a16="http://schemas.microsoft.com/office/drawing/2014/main" xmlns="" id="{68E5FAC9-A660-4D7A-AC84-0A7C8CC3BB65}"/>
                 </a:ext>
               </a:extLst>
             </p:cNvPr>
@@ -10153,7 +9193,7 @@
           <p:cNvPr id="9" name="Picture 8">
             <a:extLst>
               <a:ext uri="{FF2B5EF4-FFF2-40B4-BE49-F238E27FC236}">
-                <a16:creationId xmlns="" xmlns:a16="http://schemas.microsoft.com/office/drawing/2014/main" id="{4FE28ACC-E44C-4381-B768-0310810E78D2}"/>
+                <a16:creationId xmlns:a16="http://schemas.microsoft.com/office/drawing/2014/main" xmlns="" id="{4FE28ACC-E44C-4381-B768-0310810E78D2}"/>
               </a:ext>
             </a:extLst>
           </p:cNvPr>
@@ -10198,7 +9238,7 @@
           <p:cNvPr id="5" name="Straight Connector 4">
             <a:extLst>
               <a:ext uri="{FF2B5EF4-FFF2-40B4-BE49-F238E27FC236}">
-                <a16:creationId xmlns="" xmlns:a16="http://schemas.microsoft.com/office/drawing/2014/main" id="{819AFA09-F4B1-493D-BCAD-FF30C20CD1AA}"/>
+                <a16:creationId xmlns:a16="http://schemas.microsoft.com/office/drawing/2014/main" xmlns="" id="{819AFA09-F4B1-493D-BCAD-FF30C20CD1AA}"/>
               </a:ext>
             </a:extLst>
           </p:cNvPr>
@@ -10295,7 +9335,7 @@
           <p:cNvPr id="10" name="Rectangle 9">
             <a:extLst>
               <a:ext uri="{FF2B5EF4-FFF2-40B4-BE49-F238E27FC236}">
-                <a16:creationId xmlns="" xmlns:a16="http://schemas.microsoft.com/office/drawing/2014/main" id="{F9087E09-D75F-4E26-B01E-A1A09BA2EA70}"/>
+                <a16:creationId xmlns:a16="http://schemas.microsoft.com/office/drawing/2014/main" xmlns="" id="{F9087E09-D75F-4E26-B01E-A1A09BA2EA70}"/>
               </a:ext>
             </a:extLst>
           </p:cNvPr>
@@ -10347,7 +9387,7 @@
           <p:cNvPr id="2" name="Title 1">
             <a:extLst>
               <a:ext uri="{FF2B5EF4-FFF2-40B4-BE49-F238E27FC236}">
-                <a16:creationId xmlns="" xmlns:a16="http://schemas.microsoft.com/office/drawing/2014/main" id="{AF7A70B7-7ADE-4E0B-B956-363B0B1AA613}"/>
+                <a16:creationId xmlns:a16="http://schemas.microsoft.com/office/drawing/2014/main" xmlns="" id="{AF7A70B7-7ADE-4E0B-B956-363B0B1AA613}"/>
               </a:ext>
             </a:extLst>
           </p:cNvPr>
@@ -10391,7 +9431,7 @@
           <p:cNvPr id="8" name="Picture 7">
             <a:extLst>
               <a:ext uri="{FF2B5EF4-FFF2-40B4-BE49-F238E27FC236}">
-                <a16:creationId xmlns="" xmlns:a16="http://schemas.microsoft.com/office/drawing/2014/main" id="{25FC40B0-ED27-47E5-A3C2-32A8418567EE}"/>
+                <a16:creationId xmlns:a16="http://schemas.microsoft.com/office/drawing/2014/main" xmlns="" id="{25FC40B0-ED27-47E5-A3C2-32A8418567EE}"/>
               </a:ext>
             </a:extLst>
           </p:cNvPr>
@@ -10428,7 +9468,7 @@
           <p:cNvPr id="11" name="Oval 10">
             <a:extLst>
               <a:ext uri="{FF2B5EF4-FFF2-40B4-BE49-F238E27FC236}">
-                <a16:creationId xmlns="" xmlns:a16="http://schemas.microsoft.com/office/drawing/2014/main" id="{8931D2A9-0B92-4197-8802-80424C14EA7E}"/>
+                <a16:creationId xmlns:a16="http://schemas.microsoft.com/office/drawing/2014/main" xmlns="" id="{8931D2A9-0B92-4197-8802-80424C14EA7E}"/>
               </a:ext>
             </a:extLst>
           </p:cNvPr>
@@ -10480,7 +9520,7 @@
           <p:cNvPr id="6" name="Slide Number Placeholder 5">
             <a:extLst>
               <a:ext uri="{FF2B5EF4-FFF2-40B4-BE49-F238E27FC236}">
-                <a16:creationId xmlns="" xmlns:a16="http://schemas.microsoft.com/office/drawing/2014/main" id="{533B74B0-30B9-45C2-9AE6-45D1978AAFAE}"/>
+                <a16:creationId xmlns:a16="http://schemas.microsoft.com/office/drawing/2014/main" xmlns="" id="{533B74B0-30B9-45C2-9AE6-45D1978AAFAE}"/>
               </a:ext>
             </a:extLst>
           </p:cNvPr>
@@ -10524,7 +9564,7 @@
           <p:cNvPr id="4" name="Group 3">
             <a:extLst>
               <a:ext uri="{FF2B5EF4-FFF2-40B4-BE49-F238E27FC236}">
-                <a16:creationId xmlns="" xmlns:a16="http://schemas.microsoft.com/office/drawing/2014/main" id="{AD5251EA-F450-4DD1-995B-DC89513424C8}"/>
+                <a16:creationId xmlns:a16="http://schemas.microsoft.com/office/drawing/2014/main" xmlns="" id="{AD5251EA-F450-4DD1-995B-DC89513424C8}"/>
               </a:ext>
             </a:extLst>
           </p:cNvPr>
@@ -10544,7 +9584,7 @@
             <p:cNvPr id="17" name="Oval 16">
               <a:extLst>
                 <a:ext uri="{FF2B5EF4-FFF2-40B4-BE49-F238E27FC236}">
-                  <a16:creationId xmlns="" xmlns:a16="http://schemas.microsoft.com/office/drawing/2014/main" id="{44882F4E-E8C8-46FE-A9C8-7B79782767F6}"/>
+                  <a16:creationId xmlns:a16="http://schemas.microsoft.com/office/drawing/2014/main" xmlns="" id="{44882F4E-E8C8-46FE-A9C8-7B79782767F6}"/>
                 </a:ext>
               </a:extLst>
             </p:cNvPr>
@@ -10598,7 +9638,7 @@
             <p:cNvPr id="18" name="Group 17">
               <a:extLst>
                 <a:ext uri="{FF2B5EF4-FFF2-40B4-BE49-F238E27FC236}">
-                  <a16:creationId xmlns="" xmlns:a16="http://schemas.microsoft.com/office/drawing/2014/main" id="{965CD13B-04FB-40D5-AF62-2F43CF49BA9B}"/>
+                  <a16:creationId xmlns:a16="http://schemas.microsoft.com/office/drawing/2014/main" xmlns="" id="{965CD13B-04FB-40D5-AF62-2F43CF49BA9B}"/>
                 </a:ext>
               </a:extLst>
             </p:cNvPr>
@@ -10623,7 +9663,7 @@
               <p:cNvPr id="19" name="Freeform 5">
                 <a:extLst>
                   <a:ext uri="{FF2B5EF4-FFF2-40B4-BE49-F238E27FC236}">
-                    <a16:creationId xmlns="" xmlns:a16="http://schemas.microsoft.com/office/drawing/2014/main" id="{01876F8F-C11E-4FB2-8150-1F0602752F97}"/>
+                    <a16:creationId xmlns:a16="http://schemas.microsoft.com/office/drawing/2014/main" xmlns="" id="{01876F8F-C11E-4FB2-8150-1F0602752F97}"/>
                   </a:ext>
                 </a:extLst>
               </p:cNvPr>
@@ -10813,7 +9853,7 @@
               <p:cNvPr id="20" name="Freeform 6">
                 <a:extLst>
                   <a:ext uri="{FF2B5EF4-FFF2-40B4-BE49-F238E27FC236}">
-                    <a16:creationId xmlns="" xmlns:a16="http://schemas.microsoft.com/office/drawing/2014/main" id="{08A1D05F-5F61-4156-8C83-1A002AA1E886}"/>
+                    <a16:creationId xmlns:a16="http://schemas.microsoft.com/office/drawing/2014/main" xmlns="" id="{08A1D05F-5F61-4156-8C83-1A002AA1E886}"/>
                   </a:ext>
                 </a:extLst>
               </p:cNvPr>
@@ -10965,7 +10005,7 @@
           <p:cNvPr id="21" name="Text Placeholder 2">
             <a:extLst>
               <a:ext uri="{FF2B5EF4-FFF2-40B4-BE49-F238E27FC236}">
-                <a16:creationId xmlns="" xmlns:a16="http://schemas.microsoft.com/office/drawing/2014/main" id="{4D77C47B-CC1E-41DA-9146-5DFD63065491}"/>
+                <a16:creationId xmlns:a16="http://schemas.microsoft.com/office/drawing/2014/main" xmlns="" id="{4D77C47B-CC1E-41DA-9146-5DFD63065491}"/>
               </a:ext>
             </a:extLst>
           </p:cNvPr>
@@ -11136,7 +10176,7 @@
           <p:cNvPr id="22" name="Group 21">
             <a:extLst>
               <a:ext uri="{FF2B5EF4-FFF2-40B4-BE49-F238E27FC236}">
-                <a16:creationId xmlns="" xmlns:a16="http://schemas.microsoft.com/office/drawing/2014/main" id="{60E0B501-22AA-4685-BE9B-A267F6F675A7}"/>
+                <a16:creationId xmlns:a16="http://schemas.microsoft.com/office/drawing/2014/main" xmlns="" id="{60E0B501-22AA-4685-BE9B-A267F6F675A7}"/>
               </a:ext>
             </a:extLst>
           </p:cNvPr>
@@ -11161,7 +10201,7 @@
             <p:cNvPr id="24" name="Freeform 5">
               <a:extLst>
                 <a:ext uri="{FF2B5EF4-FFF2-40B4-BE49-F238E27FC236}">
-                  <a16:creationId xmlns="" xmlns:a16="http://schemas.microsoft.com/office/drawing/2014/main" id="{5D0E179E-CA3D-4874-9ACD-F8990F48F4BF}"/>
+                  <a16:creationId xmlns:a16="http://schemas.microsoft.com/office/drawing/2014/main" xmlns="" id="{5D0E179E-CA3D-4874-9ACD-F8990F48F4BF}"/>
                 </a:ext>
               </a:extLst>
             </p:cNvPr>
@@ -11351,7 +10391,7 @@
             <p:cNvPr id="25" name="Freeform 6">
               <a:extLst>
                 <a:ext uri="{FF2B5EF4-FFF2-40B4-BE49-F238E27FC236}">
-                  <a16:creationId xmlns="" xmlns:a16="http://schemas.microsoft.com/office/drawing/2014/main" id="{A9C53936-B93A-4CF6-8766-2FA93ACFEBE3}"/>
+                  <a16:creationId xmlns:a16="http://schemas.microsoft.com/office/drawing/2014/main" xmlns="" id="{A9C53936-B93A-4CF6-8766-2FA93ACFEBE3}"/>
                 </a:ext>
               </a:extLst>
             </p:cNvPr>
@@ -11501,7 +10541,7 @@
             <p:cNvPr id="26" name="Freeform 7">
               <a:extLst>
                 <a:ext uri="{FF2B5EF4-FFF2-40B4-BE49-F238E27FC236}">
-                  <a16:creationId xmlns="" xmlns:a16="http://schemas.microsoft.com/office/drawing/2014/main" id="{5776DEA2-5422-4F51-B359-652B71274D31}"/>
+                  <a16:creationId xmlns:a16="http://schemas.microsoft.com/office/drawing/2014/main" xmlns="" id="{5776DEA2-5422-4F51-B359-652B71274D31}"/>
                 </a:ext>
               </a:extLst>
             </p:cNvPr>
@@ -11642,7 +10682,7 @@
           <p:cNvPr id="7" name="Rectangle 6">
             <a:extLst>
               <a:ext uri="{FF2B5EF4-FFF2-40B4-BE49-F238E27FC236}">
-                <a16:creationId xmlns="" xmlns:a16="http://schemas.microsoft.com/office/drawing/2014/main" id="{76627016-BFC4-46D4-89DB-F72E3C3461EC}"/>
+                <a16:creationId xmlns:a16="http://schemas.microsoft.com/office/drawing/2014/main" xmlns="" id="{76627016-BFC4-46D4-89DB-F72E3C3461EC}"/>
               </a:ext>
             </a:extLst>
           </p:cNvPr>
@@ -11698,7 +10738,7 @@
           <p:cNvPr id="15" name="Oval 14">
             <a:extLst>
               <a:ext uri="{FF2B5EF4-FFF2-40B4-BE49-F238E27FC236}">
-                <a16:creationId xmlns="" xmlns:a16="http://schemas.microsoft.com/office/drawing/2014/main" id="{EF515B4A-CB20-4847-8E00-0DD66F1FEBB4}"/>
+                <a16:creationId xmlns:a16="http://schemas.microsoft.com/office/drawing/2014/main" xmlns="" id="{EF515B4A-CB20-4847-8E00-0DD66F1FEBB4}"/>
               </a:ext>
             </a:extLst>
           </p:cNvPr>
@@ -11750,7 +10790,7 @@
           <p:cNvPr id="16" name="Slide Number Placeholder 5">
             <a:extLst>
               <a:ext uri="{FF2B5EF4-FFF2-40B4-BE49-F238E27FC236}">
-                <a16:creationId xmlns="" xmlns:a16="http://schemas.microsoft.com/office/drawing/2014/main" id="{996B64B9-1DF0-4EE9-BAB5-72AFA94B9AFD}"/>
+                <a16:creationId xmlns:a16="http://schemas.microsoft.com/office/drawing/2014/main" xmlns="" id="{996B64B9-1DF0-4EE9-BAB5-72AFA94B9AFD}"/>
               </a:ext>
             </a:extLst>
           </p:cNvPr>
@@ -11794,7 +10834,7 @@
           <p:cNvPr id="27" name="Content Placeholder 2">
             <a:extLst>
               <a:ext uri="{FF2B5EF4-FFF2-40B4-BE49-F238E27FC236}">
-                <a16:creationId xmlns="" xmlns:a16="http://schemas.microsoft.com/office/drawing/2014/main" id="{1A1F33A2-66F7-4D85-99DD-7B00F265AC6D}"/>
+                <a16:creationId xmlns:a16="http://schemas.microsoft.com/office/drawing/2014/main" xmlns="" id="{1A1F33A2-66F7-4D85-99DD-7B00F265AC6D}"/>
               </a:ext>
             </a:extLst>
           </p:cNvPr>
@@ -11857,7 +10897,7 @@
           <p:cNvPr id="12" name="Picture 11">
             <a:extLst>
               <a:ext uri="{FF2B5EF4-FFF2-40B4-BE49-F238E27FC236}">
-                <a16:creationId xmlns="" xmlns:a16="http://schemas.microsoft.com/office/drawing/2014/main" id="{EC2DFD46-BF74-47BA-A496-92ED1979C360}"/>
+                <a16:creationId xmlns:a16="http://schemas.microsoft.com/office/drawing/2014/main" xmlns="" id="{EC2DFD46-BF74-47BA-A496-92ED1979C360}"/>
               </a:ext>
             </a:extLst>
           </p:cNvPr>
@@ -11893,7 +10933,7 @@
           <p:cNvPr id="13" name="Title 1">
             <a:extLst>
               <a:ext uri="{FF2B5EF4-FFF2-40B4-BE49-F238E27FC236}">
-                <a16:creationId xmlns="" xmlns:a16="http://schemas.microsoft.com/office/drawing/2014/main" id="{EF788279-D710-447A-9E71-4D1344575691}"/>
+                <a16:creationId xmlns:a16="http://schemas.microsoft.com/office/drawing/2014/main" xmlns="" id="{EF788279-D710-447A-9E71-4D1344575691}"/>
               </a:ext>
             </a:extLst>
           </p:cNvPr>
@@ -11963,7 +11003,7 @@
           <p:cNvPr id="18" name="Group 17">
             <a:extLst>
               <a:ext uri="{FF2B5EF4-FFF2-40B4-BE49-F238E27FC236}">
-                <a16:creationId xmlns="" xmlns:a16="http://schemas.microsoft.com/office/drawing/2014/main" id="{C2A6B906-ACDA-40FD-8AC8-0B693AB12796}"/>
+                <a16:creationId xmlns:a16="http://schemas.microsoft.com/office/drawing/2014/main" xmlns="" id="{C2A6B906-ACDA-40FD-8AC8-0B693AB12796}"/>
               </a:ext>
             </a:extLst>
           </p:cNvPr>
@@ -11988,7 +11028,7 @@
             <p:cNvPr id="19" name="Freeform 5">
               <a:extLst>
                 <a:ext uri="{FF2B5EF4-FFF2-40B4-BE49-F238E27FC236}">
-                  <a16:creationId xmlns="" xmlns:a16="http://schemas.microsoft.com/office/drawing/2014/main" id="{717F7366-5A99-4065-90C2-AE7DF5DD0F44}"/>
+                  <a16:creationId xmlns:a16="http://schemas.microsoft.com/office/drawing/2014/main" xmlns="" id="{717F7366-5A99-4065-90C2-AE7DF5DD0F44}"/>
                 </a:ext>
               </a:extLst>
             </p:cNvPr>
@@ -12178,7 +11218,7 @@
             <p:cNvPr id="20" name="Freeform 6">
               <a:extLst>
                 <a:ext uri="{FF2B5EF4-FFF2-40B4-BE49-F238E27FC236}">
-                  <a16:creationId xmlns="" xmlns:a16="http://schemas.microsoft.com/office/drawing/2014/main" id="{90A089CA-63B9-4456-B0B1-17C75EBFB982}"/>
+                  <a16:creationId xmlns:a16="http://schemas.microsoft.com/office/drawing/2014/main" xmlns="" id="{90A089CA-63B9-4456-B0B1-17C75EBFB982}"/>
                 </a:ext>
               </a:extLst>
             </p:cNvPr>
@@ -12328,7 +11368,7 @@
             <p:cNvPr id="22" name="Freeform 7">
               <a:extLst>
                 <a:ext uri="{FF2B5EF4-FFF2-40B4-BE49-F238E27FC236}">
-                  <a16:creationId xmlns="" xmlns:a16="http://schemas.microsoft.com/office/drawing/2014/main" id="{8D36B2D1-BCFE-43FC-8743-7B7A30E1AD5D}"/>
+                  <a16:creationId xmlns:a16="http://schemas.microsoft.com/office/drawing/2014/main" xmlns="" id="{8D36B2D1-BCFE-43FC-8743-7B7A30E1AD5D}"/>
                 </a:ext>
               </a:extLst>
             </p:cNvPr>
@@ -12469,7 +11509,7 @@
           <p:cNvPr id="7" name="Rectangle 6">
             <a:extLst>
               <a:ext uri="{FF2B5EF4-FFF2-40B4-BE49-F238E27FC236}">
-                <a16:creationId xmlns="" xmlns:a16="http://schemas.microsoft.com/office/drawing/2014/main" id="{76627016-BFC4-46D4-89DB-F72E3C3461EC}"/>
+                <a16:creationId xmlns:a16="http://schemas.microsoft.com/office/drawing/2014/main" xmlns="" id="{76627016-BFC4-46D4-89DB-F72E3C3461EC}"/>
               </a:ext>
             </a:extLst>
           </p:cNvPr>
@@ -12525,7 +11565,7 @@
           <p:cNvPr id="15" name="Oval 14">
             <a:extLst>
               <a:ext uri="{FF2B5EF4-FFF2-40B4-BE49-F238E27FC236}">
-                <a16:creationId xmlns="" xmlns:a16="http://schemas.microsoft.com/office/drawing/2014/main" id="{EF515B4A-CB20-4847-8E00-0DD66F1FEBB4}"/>
+                <a16:creationId xmlns:a16="http://schemas.microsoft.com/office/drawing/2014/main" xmlns="" id="{EF515B4A-CB20-4847-8E00-0DD66F1FEBB4}"/>
               </a:ext>
             </a:extLst>
           </p:cNvPr>
@@ -12577,7 +11617,7 @@
           <p:cNvPr id="16" name="Slide Number Placeholder 5">
             <a:extLst>
               <a:ext uri="{FF2B5EF4-FFF2-40B4-BE49-F238E27FC236}">
-                <a16:creationId xmlns="" xmlns:a16="http://schemas.microsoft.com/office/drawing/2014/main" id="{996B64B9-1DF0-4EE9-BAB5-72AFA94B9AFD}"/>
+                <a16:creationId xmlns:a16="http://schemas.microsoft.com/office/drawing/2014/main" xmlns="" id="{996B64B9-1DF0-4EE9-BAB5-72AFA94B9AFD}"/>
               </a:ext>
             </a:extLst>
           </p:cNvPr>
@@ -12621,7 +11661,7 @@
           <p:cNvPr id="14" name="Content Placeholder 2">
             <a:extLst>
               <a:ext uri="{FF2B5EF4-FFF2-40B4-BE49-F238E27FC236}">
-                <a16:creationId xmlns="" xmlns:a16="http://schemas.microsoft.com/office/drawing/2014/main" id="{079DA8F4-EDD3-4D62-A90B-8C3C1AFB0083}"/>
+                <a16:creationId xmlns:a16="http://schemas.microsoft.com/office/drawing/2014/main" xmlns="" id="{079DA8F4-EDD3-4D62-A90B-8C3C1AFB0083}"/>
               </a:ext>
             </a:extLst>
           </p:cNvPr>
@@ -12684,7 +11724,7 @@
           <p:cNvPr id="17" name="Content Placeholder 3">
             <a:extLst>
               <a:ext uri="{FF2B5EF4-FFF2-40B4-BE49-F238E27FC236}">
-                <a16:creationId xmlns="" xmlns:a16="http://schemas.microsoft.com/office/drawing/2014/main" id="{DA0DA994-B4A9-447A-BEBF-3EA31D3755A2}"/>
+                <a16:creationId xmlns:a16="http://schemas.microsoft.com/office/drawing/2014/main" xmlns="" id="{DA0DA994-B4A9-447A-BEBF-3EA31D3755A2}"/>
               </a:ext>
             </a:extLst>
           </p:cNvPr>
@@ -12747,7 +11787,7 @@
           <p:cNvPr id="13" name="Picture 12">
             <a:extLst>
               <a:ext uri="{FF2B5EF4-FFF2-40B4-BE49-F238E27FC236}">
-                <a16:creationId xmlns="" xmlns:a16="http://schemas.microsoft.com/office/drawing/2014/main" id="{332150F9-14BF-4DCB-884D-49596914C290}"/>
+                <a16:creationId xmlns:a16="http://schemas.microsoft.com/office/drawing/2014/main" xmlns="" id="{332150F9-14BF-4DCB-884D-49596914C290}"/>
               </a:ext>
             </a:extLst>
           </p:cNvPr>
@@ -12783,7 +11823,7 @@
           <p:cNvPr id="21" name="Title 1">
             <a:extLst>
               <a:ext uri="{FF2B5EF4-FFF2-40B4-BE49-F238E27FC236}">
-                <a16:creationId xmlns="" xmlns:a16="http://schemas.microsoft.com/office/drawing/2014/main" id="{19DEF115-82C2-4E9D-A22C-8DA561FB37B8}"/>
+                <a16:creationId xmlns:a16="http://schemas.microsoft.com/office/drawing/2014/main" xmlns="" id="{19DEF115-82C2-4E9D-A22C-8DA561FB37B8}"/>
               </a:ext>
             </a:extLst>
           </p:cNvPr>
@@ -12853,7 +11893,7 @@
           <p:cNvPr id="20" name="Group 19">
             <a:extLst>
               <a:ext uri="{FF2B5EF4-FFF2-40B4-BE49-F238E27FC236}">
-                <a16:creationId xmlns="" xmlns:a16="http://schemas.microsoft.com/office/drawing/2014/main" id="{616F52B4-215E-4237-893C-E22B23804744}"/>
+                <a16:creationId xmlns:a16="http://schemas.microsoft.com/office/drawing/2014/main" xmlns="" id="{616F52B4-215E-4237-893C-E22B23804744}"/>
               </a:ext>
             </a:extLst>
           </p:cNvPr>
@@ -12878,7 +11918,7 @@
             <p:cNvPr id="22" name="Freeform 5">
               <a:extLst>
                 <a:ext uri="{FF2B5EF4-FFF2-40B4-BE49-F238E27FC236}">
-                  <a16:creationId xmlns="" xmlns:a16="http://schemas.microsoft.com/office/drawing/2014/main" id="{B7C40C77-B795-4B07-B92D-2E8A56635773}"/>
+                  <a16:creationId xmlns:a16="http://schemas.microsoft.com/office/drawing/2014/main" xmlns="" id="{B7C40C77-B795-4B07-B92D-2E8A56635773}"/>
                 </a:ext>
               </a:extLst>
             </p:cNvPr>
@@ -13068,7 +12108,7 @@
             <p:cNvPr id="23" name="Freeform 6">
               <a:extLst>
                 <a:ext uri="{FF2B5EF4-FFF2-40B4-BE49-F238E27FC236}">
-                  <a16:creationId xmlns="" xmlns:a16="http://schemas.microsoft.com/office/drawing/2014/main" id="{6E703A1E-5F10-4BB5-9D52-77CB6F5994C0}"/>
+                  <a16:creationId xmlns:a16="http://schemas.microsoft.com/office/drawing/2014/main" xmlns="" id="{6E703A1E-5F10-4BB5-9D52-77CB6F5994C0}"/>
                 </a:ext>
               </a:extLst>
             </p:cNvPr>
@@ -13218,7 +12258,7 @@
             <p:cNvPr id="24" name="Freeform 7">
               <a:extLst>
                 <a:ext uri="{FF2B5EF4-FFF2-40B4-BE49-F238E27FC236}">
-                  <a16:creationId xmlns="" xmlns:a16="http://schemas.microsoft.com/office/drawing/2014/main" id="{22CEE04C-09CE-41CF-937D-EC2D3C23ECC6}"/>
+                  <a16:creationId xmlns:a16="http://schemas.microsoft.com/office/drawing/2014/main" xmlns="" id="{22CEE04C-09CE-41CF-937D-EC2D3C23ECC6}"/>
                 </a:ext>
               </a:extLst>
             </p:cNvPr>
@@ -13359,7 +12399,7 @@
           <p:cNvPr id="7" name="Rectangle 6">
             <a:extLst>
               <a:ext uri="{FF2B5EF4-FFF2-40B4-BE49-F238E27FC236}">
-                <a16:creationId xmlns="" xmlns:a16="http://schemas.microsoft.com/office/drawing/2014/main" id="{76627016-BFC4-46D4-89DB-F72E3C3461EC}"/>
+                <a16:creationId xmlns:a16="http://schemas.microsoft.com/office/drawing/2014/main" xmlns="" id="{76627016-BFC4-46D4-89DB-F72E3C3461EC}"/>
               </a:ext>
             </a:extLst>
           </p:cNvPr>
@@ -13415,7 +12455,7 @@
           <p:cNvPr id="15" name="Oval 14">
             <a:extLst>
               <a:ext uri="{FF2B5EF4-FFF2-40B4-BE49-F238E27FC236}">
-                <a16:creationId xmlns="" xmlns:a16="http://schemas.microsoft.com/office/drawing/2014/main" id="{EF515B4A-CB20-4847-8E00-0DD66F1FEBB4}"/>
+                <a16:creationId xmlns:a16="http://schemas.microsoft.com/office/drawing/2014/main" xmlns="" id="{EF515B4A-CB20-4847-8E00-0DD66F1FEBB4}"/>
               </a:ext>
             </a:extLst>
           </p:cNvPr>
@@ -13467,7 +12507,7 @@
           <p:cNvPr id="16" name="Slide Number Placeholder 5">
             <a:extLst>
               <a:ext uri="{FF2B5EF4-FFF2-40B4-BE49-F238E27FC236}">
-                <a16:creationId xmlns="" xmlns:a16="http://schemas.microsoft.com/office/drawing/2014/main" id="{996B64B9-1DF0-4EE9-BAB5-72AFA94B9AFD}"/>
+                <a16:creationId xmlns:a16="http://schemas.microsoft.com/office/drawing/2014/main" xmlns="" id="{996B64B9-1DF0-4EE9-BAB5-72AFA94B9AFD}"/>
               </a:ext>
             </a:extLst>
           </p:cNvPr>
@@ -13511,7 +12551,7 @@
           <p:cNvPr id="14" name="Text Placeholder 2">
             <a:extLst>
               <a:ext uri="{FF2B5EF4-FFF2-40B4-BE49-F238E27FC236}">
-                <a16:creationId xmlns="" xmlns:a16="http://schemas.microsoft.com/office/drawing/2014/main" id="{774CF4BA-8DCB-42CF-A2C4-D6AF95EE3F54}"/>
+                <a16:creationId xmlns:a16="http://schemas.microsoft.com/office/drawing/2014/main" xmlns="" id="{774CF4BA-8DCB-42CF-A2C4-D6AF95EE3F54}"/>
               </a:ext>
             </a:extLst>
           </p:cNvPr>
@@ -13586,7 +12626,7 @@
           <p:cNvPr id="17" name="Content Placeholder 3">
             <a:extLst>
               <a:ext uri="{FF2B5EF4-FFF2-40B4-BE49-F238E27FC236}">
-                <a16:creationId xmlns="" xmlns:a16="http://schemas.microsoft.com/office/drawing/2014/main" id="{67BA8B6E-A28D-4658-8C91-6CA7BD539B85}"/>
+                <a16:creationId xmlns:a16="http://schemas.microsoft.com/office/drawing/2014/main" xmlns="" id="{67BA8B6E-A28D-4658-8C91-6CA7BD539B85}"/>
               </a:ext>
             </a:extLst>
           </p:cNvPr>
@@ -13649,7 +12689,7 @@
           <p:cNvPr id="18" name="Text Placeholder 4">
             <a:extLst>
               <a:ext uri="{FF2B5EF4-FFF2-40B4-BE49-F238E27FC236}">
-                <a16:creationId xmlns="" xmlns:a16="http://schemas.microsoft.com/office/drawing/2014/main" id="{F73B3215-82DB-4DBF-9E77-3AE2308C6920}"/>
+                <a16:creationId xmlns:a16="http://schemas.microsoft.com/office/drawing/2014/main" xmlns="" id="{F73B3215-82DB-4DBF-9E77-3AE2308C6920}"/>
               </a:ext>
             </a:extLst>
           </p:cNvPr>
@@ -13724,7 +12764,7 @@
           <p:cNvPr id="19" name="Content Placeholder 5">
             <a:extLst>
               <a:ext uri="{FF2B5EF4-FFF2-40B4-BE49-F238E27FC236}">
-                <a16:creationId xmlns="" xmlns:a16="http://schemas.microsoft.com/office/drawing/2014/main" id="{8DFD34E8-36CC-4FFE-926B-C170208FEDB8}"/>
+                <a16:creationId xmlns:a16="http://schemas.microsoft.com/office/drawing/2014/main" xmlns="" id="{8DFD34E8-36CC-4FFE-926B-C170208FEDB8}"/>
               </a:ext>
             </a:extLst>
           </p:cNvPr>
@@ -13787,7 +12827,7 @@
           <p:cNvPr id="21" name="Picture 20">
             <a:extLst>
               <a:ext uri="{FF2B5EF4-FFF2-40B4-BE49-F238E27FC236}">
-                <a16:creationId xmlns="" xmlns:a16="http://schemas.microsoft.com/office/drawing/2014/main" id="{03383C6B-3BE4-4380-AF26-1C21492FCE8A}"/>
+                <a16:creationId xmlns:a16="http://schemas.microsoft.com/office/drawing/2014/main" xmlns="" id="{03383C6B-3BE4-4380-AF26-1C21492FCE8A}"/>
               </a:ext>
             </a:extLst>
           </p:cNvPr>
@@ -13823,7 +12863,7 @@
           <p:cNvPr id="25" name="Title 1">
             <a:extLst>
               <a:ext uri="{FF2B5EF4-FFF2-40B4-BE49-F238E27FC236}">
-                <a16:creationId xmlns="" xmlns:a16="http://schemas.microsoft.com/office/drawing/2014/main" id="{AE3770E9-CB74-47B0-8229-91F6F756015E}"/>
+                <a16:creationId xmlns:a16="http://schemas.microsoft.com/office/drawing/2014/main" xmlns="" id="{AE3770E9-CB74-47B0-8229-91F6F756015E}"/>
               </a:ext>
             </a:extLst>
           </p:cNvPr>
@@ -13893,7 +12933,7 @@
           <p:cNvPr id="22" name="Picture Placeholder 21">
             <a:extLst>
               <a:ext uri="{FF2B5EF4-FFF2-40B4-BE49-F238E27FC236}">
-                <a16:creationId xmlns="" xmlns:a16="http://schemas.microsoft.com/office/drawing/2014/main" id="{C57825D7-DD33-4B70-BBBE-D46E7A5352EC}"/>
+                <a16:creationId xmlns:a16="http://schemas.microsoft.com/office/drawing/2014/main" xmlns="" id="{C57825D7-DD33-4B70-BBBE-D46E7A5352EC}"/>
               </a:ext>
             </a:extLst>
           </p:cNvPr>
@@ -14031,7 +13071,7 @@
           <p:cNvPr id="14" name="Group 13">
             <a:extLst>
               <a:ext uri="{FF2B5EF4-FFF2-40B4-BE49-F238E27FC236}">
-                <a16:creationId xmlns="" xmlns:a16="http://schemas.microsoft.com/office/drawing/2014/main" id="{0DC2055F-AE3F-46BE-B57E-A0F1A86D1C36}"/>
+                <a16:creationId xmlns:a16="http://schemas.microsoft.com/office/drawing/2014/main" xmlns="" id="{0DC2055F-AE3F-46BE-B57E-A0F1A86D1C36}"/>
               </a:ext>
             </a:extLst>
           </p:cNvPr>
@@ -14056,7 +13096,7 @@
             <p:cNvPr id="15" name="Freeform 5">
               <a:extLst>
                 <a:ext uri="{FF2B5EF4-FFF2-40B4-BE49-F238E27FC236}">
-                  <a16:creationId xmlns="" xmlns:a16="http://schemas.microsoft.com/office/drawing/2014/main" id="{C98EF042-A3B8-406D-BC16-153A989F571A}"/>
+                  <a16:creationId xmlns:a16="http://schemas.microsoft.com/office/drawing/2014/main" xmlns="" id="{C98EF042-A3B8-406D-BC16-153A989F571A}"/>
                 </a:ext>
               </a:extLst>
             </p:cNvPr>
@@ -14246,7 +13286,7 @@
             <p:cNvPr id="16" name="Freeform 6">
               <a:extLst>
                 <a:ext uri="{FF2B5EF4-FFF2-40B4-BE49-F238E27FC236}">
-                  <a16:creationId xmlns="" xmlns:a16="http://schemas.microsoft.com/office/drawing/2014/main" id="{68E5FAC9-A660-4D7A-AC84-0A7C8CC3BB65}"/>
+                  <a16:creationId xmlns:a16="http://schemas.microsoft.com/office/drawing/2014/main" xmlns="" id="{68E5FAC9-A660-4D7A-AC84-0A7C8CC3BB65}"/>
                 </a:ext>
               </a:extLst>
             </p:cNvPr>
@@ -14397,7 +13437,7 @@
           <p:cNvPr id="19" name="Title 1">
             <a:extLst>
               <a:ext uri="{FF2B5EF4-FFF2-40B4-BE49-F238E27FC236}">
-                <a16:creationId xmlns="" xmlns:a16="http://schemas.microsoft.com/office/drawing/2014/main" id="{19A1397F-1946-4CBE-9EC5-159C3CBC78B6}"/>
+                <a16:creationId xmlns:a16="http://schemas.microsoft.com/office/drawing/2014/main" xmlns="" id="{19A1397F-1946-4CBE-9EC5-159C3CBC78B6}"/>
               </a:ext>
             </a:extLst>
           </p:cNvPr>
@@ -14435,7 +13475,7 @@
           <p:cNvPr id="20" name="Text Placeholder 3">
             <a:extLst>
               <a:ext uri="{FF2B5EF4-FFF2-40B4-BE49-F238E27FC236}">
-                <a16:creationId xmlns="" xmlns:a16="http://schemas.microsoft.com/office/drawing/2014/main" id="{C535F2AB-153E-44A9-97BE-00553BEC1770}"/>
+                <a16:creationId xmlns:a16="http://schemas.microsoft.com/office/drawing/2014/main" xmlns="" id="{C535F2AB-153E-44A9-97BE-00553BEC1770}"/>
               </a:ext>
             </a:extLst>
           </p:cNvPr>
@@ -14507,7 +13547,7 @@
           <p:cNvPr id="8" name="Picture 7">
             <a:extLst>
               <a:ext uri="{FF2B5EF4-FFF2-40B4-BE49-F238E27FC236}">
-                <a16:creationId xmlns="" xmlns:a16="http://schemas.microsoft.com/office/drawing/2014/main" id="{06298D65-1027-4897-A948-DCEEF8FC3D98}"/>
+                <a16:creationId xmlns:a16="http://schemas.microsoft.com/office/drawing/2014/main" xmlns="" id="{06298D65-1027-4897-A948-DCEEF8FC3D98}"/>
               </a:ext>
             </a:extLst>
           </p:cNvPr>
@@ -14573,7 +13613,7 @@
           <p:cNvPr id="19" name="Group 18">
             <a:extLst>
               <a:ext uri="{FF2B5EF4-FFF2-40B4-BE49-F238E27FC236}">
-                <a16:creationId xmlns="" xmlns:a16="http://schemas.microsoft.com/office/drawing/2014/main" id="{9F866E5C-B8AA-4805-B232-831BA01AAF16}"/>
+                <a16:creationId xmlns:a16="http://schemas.microsoft.com/office/drawing/2014/main" xmlns="" id="{9F866E5C-B8AA-4805-B232-831BA01AAF16}"/>
               </a:ext>
             </a:extLst>
           </p:cNvPr>
@@ -14598,7 +13638,7 @@
             <p:cNvPr id="20" name="Freeform 5">
               <a:extLst>
                 <a:ext uri="{FF2B5EF4-FFF2-40B4-BE49-F238E27FC236}">
-                  <a16:creationId xmlns="" xmlns:a16="http://schemas.microsoft.com/office/drawing/2014/main" id="{F98614F0-2DA3-4F29-8CB3-D61424AC8506}"/>
+                  <a16:creationId xmlns:a16="http://schemas.microsoft.com/office/drawing/2014/main" xmlns="" id="{F98614F0-2DA3-4F29-8CB3-D61424AC8506}"/>
                 </a:ext>
               </a:extLst>
             </p:cNvPr>
@@ -14788,7 +13828,7 @@
             <p:cNvPr id="22" name="Freeform 6">
               <a:extLst>
                 <a:ext uri="{FF2B5EF4-FFF2-40B4-BE49-F238E27FC236}">
-                  <a16:creationId xmlns="" xmlns:a16="http://schemas.microsoft.com/office/drawing/2014/main" id="{66D52F08-13EC-4AB4-BB79-89A5395A03BF}"/>
+                  <a16:creationId xmlns:a16="http://schemas.microsoft.com/office/drawing/2014/main" xmlns="" id="{66D52F08-13EC-4AB4-BB79-89A5395A03BF}"/>
                 </a:ext>
               </a:extLst>
             </p:cNvPr>
@@ -14938,7 +13978,7 @@
             <p:cNvPr id="23" name="Freeform 7">
               <a:extLst>
                 <a:ext uri="{FF2B5EF4-FFF2-40B4-BE49-F238E27FC236}">
-                  <a16:creationId xmlns="" xmlns:a16="http://schemas.microsoft.com/office/drawing/2014/main" id="{2544236D-8C3A-41EF-9A68-C84A8A7D0F5A}"/>
+                  <a16:creationId xmlns:a16="http://schemas.microsoft.com/office/drawing/2014/main" xmlns="" id="{2544236D-8C3A-41EF-9A68-C84A8A7D0F5A}"/>
                 </a:ext>
               </a:extLst>
             </p:cNvPr>
@@ -15079,7 +14119,7 @@
           <p:cNvPr id="7" name="Rectangle 6">
             <a:extLst>
               <a:ext uri="{FF2B5EF4-FFF2-40B4-BE49-F238E27FC236}">
-                <a16:creationId xmlns="" xmlns:a16="http://schemas.microsoft.com/office/drawing/2014/main" id="{76627016-BFC4-46D4-89DB-F72E3C3461EC}"/>
+                <a16:creationId xmlns:a16="http://schemas.microsoft.com/office/drawing/2014/main" xmlns="" id="{76627016-BFC4-46D4-89DB-F72E3C3461EC}"/>
               </a:ext>
             </a:extLst>
           </p:cNvPr>
@@ -15135,7 +14175,7 @@
           <p:cNvPr id="15" name="Oval 14">
             <a:extLst>
               <a:ext uri="{FF2B5EF4-FFF2-40B4-BE49-F238E27FC236}">
-                <a16:creationId xmlns="" xmlns:a16="http://schemas.microsoft.com/office/drawing/2014/main" id="{EF515B4A-CB20-4847-8E00-0DD66F1FEBB4}"/>
+                <a16:creationId xmlns:a16="http://schemas.microsoft.com/office/drawing/2014/main" xmlns="" id="{EF515B4A-CB20-4847-8E00-0DD66F1FEBB4}"/>
               </a:ext>
             </a:extLst>
           </p:cNvPr>
@@ -15187,7 +14227,7 @@
           <p:cNvPr id="16" name="Slide Number Placeholder 5">
             <a:extLst>
               <a:ext uri="{FF2B5EF4-FFF2-40B4-BE49-F238E27FC236}">
-                <a16:creationId xmlns="" xmlns:a16="http://schemas.microsoft.com/office/drawing/2014/main" id="{996B64B9-1DF0-4EE9-BAB5-72AFA94B9AFD}"/>
+                <a16:creationId xmlns:a16="http://schemas.microsoft.com/office/drawing/2014/main" xmlns="" id="{996B64B9-1DF0-4EE9-BAB5-72AFA94B9AFD}"/>
               </a:ext>
             </a:extLst>
           </p:cNvPr>
@@ -15231,7 +14271,7 @@
           <p:cNvPr id="14" name="Title 1">
             <a:extLst>
               <a:ext uri="{FF2B5EF4-FFF2-40B4-BE49-F238E27FC236}">
-                <a16:creationId xmlns="" xmlns:a16="http://schemas.microsoft.com/office/drawing/2014/main" id="{9009D5C6-6206-4291-8037-67DC025F0B4C}"/>
+                <a16:creationId xmlns:a16="http://schemas.microsoft.com/office/drawing/2014/main" xmlns="" id="{9009D5C6-6206-4291-8037-67DC025F0B4C}"/>
               </a:ext>
             </a:extLst>
           </p:cNvPr>
@@ -15269,7 +14309,7 @@
           <p:cNvPr id="17" name="Text Placeholder 3">
             <a:extLst>
               <a:ext uri="{FF2B5EF4-FFF2-40B4-BE49-F238E27FC236}">
-                <a16:creationId xmlns="" xmlns:a16="http://schemas.microsoft.com/office/drawing/2014/main" id="{BEB643FD-AA85-4A43-8EBD-AFD10DD98793}"/>
+                <a16:creationId xmlns:a16="http://schemas.microsoft.com/office/drawing/2014/main" xmlns="" id="{BEB643FD-AA85-4A43-8EBD-AFD10DD98793}"/>
               </a:ext>
             </a:extLst>
           </p:cNvPr>
@@ -15340,7 +14380,7 @@
           <p:cNvPr id="18" name="Content Placeholder 2">
             <a:extLst>
               <a:ext uri="{FF2B5EF4-FFF2-40B4-BE49-F238E27FC236}">
-                <a16:creationId xmlns="" xmlns:a16="http://schemas.microsoft.com/office/drawing/2014/main" id="{9001F313-F798-43BE-AFF0-A68C84C3640D}"/>
+                <a16:creationId xmlns:a16="http://schemas.microsoft.com/office/drawing/2014/main" xmlns="" id="{9001F313-F798-43BE-AFF0-A68C84C3640D}"/>
               </a:ext>
             </a:extLst>
           </p:cNvPr>
@@ -15431,7 +14471,7 @@
           <p:cNvPr id="13" name="Picture 12">
             <a:extLst>
               <a:ext uri="{FF2B5EF4-FFF2-40B4-BE49-F238E27FC236}">
-                <a16:creationId xmlns="" xmlns:a16="http://schemas.microsoft.com/office/drawing/2014/main" id="{91881DEA-0ECB-4310-ADF5-4337ACB4338B}"/>
+                <a16:creationId xmlns:a16="http://schemas.microsoft.com/office/drawing/2014/main" xmlns="" id="{91881DEA-0ECB-4310-ADF5-4337ACB4338B}"/>
               </a:ext>
             </a:extLst>
           </p:cNvPr>
@@ -15509,7 +14549,7 @@
           <a:p>
             <a:fld id="{11489015-5B70-4D85-AA05-A54131EA11AC}" type="datetime3">
               <a:rPr lang="en-US" smtClean="0"/>
-              <a:t>2 July 2019</a:t>
+              <a:t>5 July 2019</a:t>
             </a:fld>
             <a:endParaRPr lang="en-US"/>
           </a:p>
@@ -15615,7 +14655,7 @@
           <p:cNvPr id="4" name="Rectangle 3">
             <a:extLst>
               <a:ext uri="{FF2B5EF4-FFF2-40B4-BE49-F238E27FC236}">
-                <a16:creationId xmlns="" xmlns:a16="http://schemas.microsoft.com/office/drawing/2014/main" id="{86299464-ED20-4919-8B3A-2CFAE8DA2347}"/>
+                <a16:creationId xmlns:a16="http://schemas.microsoft.com/office/drawing/2014/main" xmlns="" id="{86299464-ED20-4919-8B3A-2CFAE8DA2347}"/>
               </a:ext>
             </a:extLst>
           </p:cNvPr>
@@ -15667,7 +14707,7 @@
           <p:cNvPr id="2" name="Title 1">
             <a:extLst>
               <a:ext uri="{FF2B5EF4-FFF2-40B4-BE49-F238E27FC236}">
-                <a16:creationId xmlns="" xmlns:a16="http://schemas.microsoft.com/office/drawing/2014/main" id="{2456FD49-C258-4333-9422-358C976A341C}"/>
+                <a16:creationId xmlns:a16="http://schemas.microsoft.com/office/drawing/2014/main" xmlns="" id="{2456FD49-C258-4333-9422-358C976A341C}"/>
               </a:ext>
             </a:extLst>
           </p:cNvPr>
@@ -15711,7 +14751,7 @@
           <p:cNvPr id="3" name="Subtitle 2">
             <a:extLst>
               <a:ext uri="{FF2B5EF4-FFF2-40B4-BE49-F238E27FC236}">
-                <a16:creationId xmlns="" xmlns:a16="http://schemas.microsoft.com/office/drawing/2014/main" id="{59758E15-A93D-4FB9-843D-1490E27A151B}"/>
+                <a16:creationId xmlns:a16="http://schemas.microsoft.com/office/drawing/2014/main" xmlns="" id="{59758E15-A93D-4FB9-843D-1490E27A151B}"/>
               </a:ext>
             </a:extLst>
           </p:cNvPr>
@@ -15788,7 +14828,7 @@
           <p:cNvPr id="13" name="Picture Placeholder 12">
             <a:extLst>
               <a:ext uri="{FF2B5EF4-FFF2-40B4-BE49-F238E27FC236}">
-                <a16:creationId xmlns="" xmlns:a16="http://schemas.microsoft.com/office/drawing/2014/main" id="{BCCC559D-0EC3-432C-B397-6897B366DF36}"/>
+                <a16:creationId xmlns:a16="http://schemas.microsoft.com/office/drawing/2014/main" xmlns="" id="{BCCC559D-0EC3-432C-B397-6897B366DF36}"/>
               </a:ext>
             </a:extLst>
           </p:cNvPr>
@@ -15833,7 +14873,7 @@
           <p:cNvPr id="14" name="Group 13">
             <a:extLst>
               <a:ext uri="{FF2B5EF4-FFF2-40B4-BE49-F238E27FC236}">
-                <a16:creationId xmlns="" xmlns:a16="http://schemas.microsoft.com/office/drawing/2014/main" id="{0DC2055F-AE3F-46BE-B57E-A0F1A86D1C36}"/>
+                <a16:creationId xmlns:a16="http://schemas.microsoft.com/office/drawing/2014/main" xmlns="" id="{0DC2055F-AE3F-46BE-B57E-A0F1A86D1C36}"/>
               </a:ext>
             </a:extLst>
           </p:cNvPr>
@@ -15858,7 +14898,7 @@
             <p:cNvPr id="15" name="Freeform 5">
               <a:extLst>
                 <a:ext uri="{FF2B5EF4-FFF2-40B4-BE49-F238E27FC236}">
-                  <a16:creationId xmlns="" xmlns:a16="http://schemas.microsoft.com/office/drawing/2014/main" id="{C98EF042-A3B8-406D-BC16-153A989F571A}"/>
+                  <a16:creationId xmlns:a16="http://schemas.microsoft.com/office/drawing/2014/main" xmlns="" id="{C98EF042-A3B8-406D-BC16-153A989F571A}"/>
                 </a:ext>
               </a:extLst>
             </p:cNvPr>
@@ -16048,7 +15088,7 @@
             <p:cNvPr id="16" name="Freeform 6">
               <a:extLst>
                 <a:ext uri="{FF2B5EF4-FFF2-40B4-BE49-F238E27FC236}">
-                  <a16:creationId xmlns="" xmlns:a16="http://schemas.microsoft.com/office/drawing/2014/main" id="{68E5FAC9-A660-4D7A-AC84-0A7C8CC3BB65}"/>
+                  <a16:creationId xmlns:a16="http://schemas.microsoft.com/office/drawing/2014/main" xmlns="" id="{68E5FAC9-A660-4D7A-AC84-0A7C8CC3BB65}"/>
                 </a:ext>
               </a:extLst>
             </p:cNvPr>
@@ -16199,7 +15239,7 @@
           <p:cNvPr id="9" name="Picture 8">
             <a:extLst>
               <a:ext uri="{FF2B5EF4-FFF2-40B4-BE49-F238E27FC236}">
-                <a16:creationId xmlns="" xmlns:a16="http://schemas.microsoft.com/office/drawing/2014/main" id="{4FE28ACC-E44C-4381-B768-0310810E78D2}"/>
+                <a16:creationId xmlns:a16="http://schemas.microsoft.com/office/drawing/2014/main" xmlns="" id="{4FE28ACC-E44C-4381-B768-0310810E78D2}"/>
               </a:ext>
             </a:extLst>
           </p:cNvPr>
@@ -16244,7 +15284,7 @@
           <p:cNvPr id="5" name="Straight Connector 4">
             <a:extLst>
               <a:ext uri="{FF2B5EF4-FFF2-40B4-BE49-F238E27FC236}">
-                <a16:creationId xmlns="" xmlns:a16="http://schemas.microsoft.com/office/drawing/2014/main" id="{819AFA09-F4B1-493D-BCAD-FF30C20CD1AA}"/>
+                <a16:creationId xmlns:a16="http://schemas.microsoft.com/office/drawing/2014/main" xmlns="" id="{819AFA09-F4B1-493D-BCAD-FF30C20CD1AA}"/>
               </a:ext>
             </a:extLst>
           </p:cNvPr>
@@ -16341,7 +15381,7 @@
           <p:cNvPr id="10" name="Rectangle 9">
             <a:extLst>
               <a:ext uri="{FF2B5EF4-FFF2-40B4-BE49-F238E27FC236}">
-                <a16:creationId xmlns="" xmlns:a16="http://schemas.microsoft.com/office/drawing/2014/main" id="{F9087E09-D75F-4E26-B01E-A1A09BA2EA70}"/>
+                <a16:creationId xmlns:a16="http://schemas.microsoft.com/office/drawing/2014/main" xmlns="" id="{F9087E09-D75F-4E26-B01E-A1A09BA2EA70}"/>
               </a:ext>
             </a:extLst>
           </p:cNvPr>
@@ -16393,7 +15433,7 @@
           <p:cNvPr id="2" name="Title 1">
             <a:extLst>
               <a:ext uri="{FF2B5EF4-FFF2-40B4-BE49-F238E27FC236}">
-                <a16:creationId xmlns="" xmlns:a16="http://schemas.microsoft.com/office/drawing/2014/main" id="{AF7A70B7-7ADE-4E0B-B956-363B0B1AA613}"/>
+                <a16:creationId xmlns:a16="http://schemas.microsoft.com/office/drawing/2014/main" xmlns="" id="{AF7A70B7-7ADE-4E0B-B956-363B0B1AA613}"/>
               </a:ext>
             </a:extLst>
           </p:cNvPr>
@@ -16437,7 +15477,7 @@
           <p:cNvPr id="3" name="Text Placeholder 2">
             <a:extLst>
               <a:ext uri="{FF2B5EF4-FFF2-40B4-BE49-F238E27FC236}">
-                <a16:creationId xmlns="" xmlns:a16="http://schemas.microsoft.com/office/drawing/2014/main" id="{4ACB5603-8A62-4D45-B6EF-0D7E2D5FC4F7}"/>
+                <a16:creationId xmlns:a16="http://schemas.microsoft.com/office/drawing/2014/main" xmlns="" id="{4ACB5603-8A62-4D45-B6EF-0D7E2D5FC4F7}"/>
               </a:ext>
             </a:extLst>
           </p:cNvPr>
@@ -16562,7 +15602,7 @@
           <p:cNvPr id="8" name="Picture 7">
             <a:extLst>
               <a:ext uri="{FF2B5EF4-FFF2-40B4-BE49-F238E27FC236}">
-                <a16:creationId xmlns="" xmlns:a16="http://schemas.microsoft.com/office/drawing/2014/main" id="{25FC40B0-ED27-47E5-A3C2-32A8418567EE}"/>
+                <a16:creationId xmlns:a16="http://schemas.microsoft.com/office/drawing/2014/main" xmlns="" id="{25FC40B0-ED27-47E5-A3C2-32A8418567EE}"/>
               </a:ext>
             </a:extLst>
           </p:cNvPr>
@@ -16599,7 +15639,7 @@
           <p:cNvPr id="11" name="Oval 10">
             <a:extLst>
               <a:ext uri="{FF2B5EF4-FFF2-40B4-BE49-F238E27FC236}">
-                <a16:creationId xmlns="" xmlns:a16="http://schemas.microsoft.com/office/drawing/2014/main" id="{8931D2A9-0B92-4197-8802-80424C14EA7E}"/>
+                <a16:creationId xmlns:a16="http://schemas.microsoft.com/office/drawing/2014/main" xmlns="" id="{8931D2A9-0B92-4197-8802-80424C14EA7E}"/>
               </a:ext>
             </a:extLst>
           </p:cNvPr>
@@ -16651,7 +15691,7 @@
           <p:cNvPr id="6" name="Slide Number Placeholder 5">
             <a:extLst>
               <a:ext uri="{FF2B5EF4-FFF2-40B4-BE49-F238E27FC236}">
-                <a16:creationId xmlns="" xmlns:a16="http://schemas.microsoft.com/office/drawing/2014/main" id="{533B74B0-30B9-45C2-9AE6-45D1978AAFAE}"/>
+                <a16:creationId xmlns:a16="http://schemas.microsoft.com/office/drawing/2014/main" xmlns="" id="{533B74B0-30B9-45C2-9AE6-45D1978AAFAE}"/>
               </a:ext>
             </a:extLst>
           </p:cNvPr>
@@ -16695,7 +15735,7 @@
           <p:cNvPr id="15" name="Picture Placeholder 14">
             <a:extLst>
               <a:ext uri="{FF2B5EF4-FFF2-40B4-BE49-F238E27FC236}">
-                <a16:creationId xmlns="" xmlns:a16="http://schemas.microsoft.com/office/drawing/2014/main" id="{B5A30B6B-EEDB-4142-8138-D50F5A307D76}"/>
+                <a16:creationId xmlns:a16="http://schemas.microsoft.com/office/drawing/2014/main" xmlns="" id="{B5A30B6B-EEDB-4142-8138-D50F5A307D76}"/>
               </a:ext>
             </a:extLst>
           </p:cNvPr>
@@ -16871,7 +15911,7 @@
           <p:cNvPr id="3" name="Content Placeholder 2">
             <a:extLst>
               <a:ext uri="{FF2B5EF4-FFF2-40B4-BE49-F238E27FC236}">
-                <a16:creationId xmlns="" xmlns:a16="http://schemas.microsoft.com/office/drawing/2014/main" id="{0FEE9886-36F0-4E06-A3A6-D8F00B0665A1}"/>
+                <a16:creationId xmlns:a16="http://schemas.microsoft.com/office/drawing/2014/main" xmlns="" id="{0FEE9886-36F0-4E06-A3A6-D8F00B0665A1}"/>
               </a:ext>
             </a:extLst>
           </p:cNvPr>
@@ -16952,7 +15992,7 @@
           <p:cNvPr id="7" name="Rectangle 6">
             <a:extLst>
               <a:ext uri="{FF2B5EF4-FFF2-40B4-BE49-F238E27FC236}">
-                <a16:creationId xmlns="" xmlns:a16="http://schemas.microsoft.com/office/drawing/2014/main" id="{76627016-BFC4-46D4-89DB-F72E3C3461EC}"/>
+                <a16:creationId xmlns:a16="http://schemas.microsoft.com/office/drawing/2014/main" xmlns="" id="{76627016-BFC4-46D4-89DB-F72E3C3461EC}"/>
               </a:ext>
             </a:extLst>
           </p:cNvPr>
@@ -17008,7 +16048,7 @@
           <p:cNvPr id="8" name="Picture 7">
             <a:extLst>
               <a:ext uri="{FF2B5EF4-FFF2-40B4-BE49-F238E27FC236}">
-                <a16:creationId xmlns="" xmlns:a16="http://schemas.microsoft.com/office/drawing/2014/main" id="{676C557E-B5A7-4416-BCC0-5743550BF152}"/>
+                <a16:creationId xmlns:a16="http://schemas.microsoft.com/office/drawing/2014/main" xmlns="" id="{676C557E-B5A7-4416-BCC0-5743550BF152}"/>
               </a:ext>
             </a:extLst>
           </p:cNvPr>
@@ -17044,7 +16084,7 @@
           <p:cNvPr id="10" name="Group 9">
             <a:extLst>
               <a:ext uri="{FF2B5EF4-FFF2-40B4-BE49-F238E27FC236}">
-                <a16:creationId xmlns="" xmlns:a16="http://schemas.microsoft.com/office/drawing/2014/main" id="{42E17FB3-B5C4-4B3A-A57B-C6493A9D0C66}"/>
+                <a16:creationId xmlns:a16="http://schemas.microsoft.com/office/drawing/2014/main" xmlns="" id="{42E17FB3-B5C4-4B3A-A57B-C6493A9D0C66}"/>
               </a:ext>
             </a:extLst>
           </p:cNvPr>
@@ -17067,7 +16107,7 @@
             <p:cNvPr id="11" name="Freeform 5">
               <a:extLst>
                 <a:ext uri="{FF2B5EF4-FFF2-40B4-BE49-F238E27FC236}">
-                  <a16:creationId xmlns="" xmlns:a16="http://schemas.microsoft.com/office/drawing/2014/main" id="{DCA6C454-F761-4265-BB5E-DFD947CC3592}"/>
+                  <a16:creationId xmlns:a16="http://schemas.microsoft.com/office/drawing/2014/main" xmlns="" id="{DCA6C454-F761-4265-BB5E-DFD947CC3592}"/>
                 </a:ext>
               </a:extLst>
             </p:cNvPr>
@@ -17257,7 +16297,7 @@
             <p:cNvPr id="12" name="Freeform 6">
               <a:extLst>
                 <a:ext uri="{FF2B5EF4-FFF2-40B4-BE49-F238E27FC236}">
-                  <a16:creationId xmlns="" xmlns:a16="http://schemas.microsoft.com/office/drawing/2014/main" id="{6B853B2F-9E1C-4AC4-9344-8610498D5B52}"/>
+                  <a16:creationId xmlns:a16="http://schemas.microsoft.com/office/drawing/2014/main" xmlns="" id="{6B853B2F-9E1C-4AC4-9344-8610498D5B52}"/>
                 </a:ext>
               </a:extLst>
             </p:cNvPr>
@@ -17407,7 +16447,7 @@
             <p:cNvPr id="13" name="Freeform 7">
               <a:extLst>
                 <a:ext uri="{FF2B5EF4-FFF2-40B4-BE49-F238E27FC236}">
-                  <a16:creationId xmlns="" xmlns:a16="http://schemas.microsoft.com/office/drawing/2014/main" id="{B7FCC84B-2235-4948-8277-8363DFC691A4}"/>
+                  <a16:creationId xmlns:a16="http://schemas.microsoft.com/office/drawing/2014/main" xmlns="" id="{B7FCC84B-2235-4948-8277-8363DFC691A4}"/>
                 </a:ext>
               </a:extLst>
             </p:cNvPr>
@@ -17548,7 +16588,7 @@
           <p:cNvPr id="15" name="Oval 14">
             <a:extLst>
               <a:ext uri="{FF2B5EF4-FFF2-40B4-BE49-F238E27FC236}">
-                <a16:creationId xmlns="" xmlns:a16="http://schemas.microsoft.com/office/drawing/2014/main" id="{EF515B4A-CB20-4847-8E00-0DD66F1FEBB4}"/>
+                <a16:creationId xmlns:a16="http://schemas.microsoft.com/office/drawing/2014/main" xmlns="" id="{EF515B4A-CB20-4847-8E00-0DD66F1FEBB4}"/>
               </a:ext>
             </a:extLst>
           </p:cNvPr>
@@ -17600,7 +16640,7 @@
           <p:cNvPr id="16" name="Slide Number Placeholder 5">
             <a:extLst>
               <a:ext uri="{FF2B5EF4-FFF2-40B4-BE49-F238E27FC236}">
-                <a16:creationId xmlns="" xmlns:a16="http://schemas.microsoft.com/office/drawing/2014/main" id="{996B64B9-1DF0-4EE9-BAB5-72AFA94B9AFD}"/>
+                <a16:creationId xmlns:a16="http://schemas.microsoft.com/office/drawing/2014/main" xmlns="" id="{996B64B9-1DF0-4EE9-BAB5-72AFA94B9AFD}"/>
               </a:ext>
             </a:extLst>
           </p:cNvPr>
@@ -17644,7 +16684,7 @@
           <p:cNvPr id="23" name="Picture Placeholder 22">
             <a:extLst>
               <a:ext uri="{FF2B5EF4-FFF2-40B4-BE49-F238E27FC236}">
-                <a16:creationId xmlns="" xmlns:a16="http://schemas.microsoft.com/office/drawing/2014/main" id="{26619E66-5354-4D60-8529-27917AC037C0}"/>
+                <a16:creationId xmlns:a16="http://schemas.microsoft.com/office/drawing/2014/main" xmlns="" id="{26619E66-5354-4D60-8529-27917AC037C0}"/>
               </a:ext>
             </a:extLst>
           </p:cNvPr>
@@ -17764,7 +16804,7 @@
           <p:cNvPr id="14" name="Title 1">
             <a:extLst>
               <a:ext uri="{FF2B5EF4-FFF2-40B4-BE49-F238E27FC236}">
-                <a16:creationId xmlns="" xmlns:a16="http://schemas.microsoft.com/office/drawing/2014/main" id="{2E646B4F-6CCB-724C-9D5E-6D5770023939}"/>
+                <a16:creationId xmlns:a16="http://schemas.microsoft.com/office/drawing/2014/main" xmlns="" id="{2E646B4F-6CCB-724C-9D5E-6D5770023939}"/>
               </a:ext>
             </a:extLst>
           </p:cNvPr>
@@ -17834,7 +16874,7 @@
           <p:cNvPr id="2" name="Title 1">
             <a:extLst>
               <a:ext uri="{FF2B5EF4-FFF2-40B4-BE49-F238E27FC236}">
-                <a16:creationId xmlns="" xmlns:a16="http://schemas.microsoft.com/office/drawing/2014/main" id="{32970CD0-696D-4313-96BA-4AA72C813BD0}"/>
+                <a16:creationId xmlns:a16="http://schemas.microsoft.com/office/drawing/2014/main" xmlns="" id="{32970CD0-696D-4313-96BA-4AA72C813BD0}"/>
               </a:ext>
             </a:extLst>
           </p:cNvPr>
@@ -17874,7 +16914,7 @@
           <p:cNvPr id="3" name="Content Placeholder 2">
             <a:extLst>
               <a:ext uri="{FF2B5EF4-FFF2-40B4-BE49-F238E27FC236}">
-                <a16:creationId xmlns="" xmlns:a16="http://schemas.microsoft.com/office/drawing/2014/main" id="{0FEE9886-36F0-4E06-A3A6-D8F00B0665A1}"/>
+                <a16:creationId xmlns:a16="http://schemas.microsoft.com/office/drawing/2014/main" xmlns="" id="{0FEE9886-36F0-4E06-A3A6-D8F00B0665A1}"/>
               </a:ext>
             </a:extLst>
           </p:cNvPr>
@@ -17954,7 +16994,7 @@
           <p:cNvPr id="7" name="Rectangle 6">
             <a:extLst>
               <a:ext uri="{FF2B5EF4-FFF2-40B4-BE49-F238E27FC236}">
-                <a16:creationId xmlns="" xmlns:a16="http://schemas.microsoft.com/office/drawing/2014/main" id="{76627016-BFC4-46D4-89DB-F72E3C3461EC}"/>
+                <a16:creationId xmlns:a16="http://schemas.microsoft.com/office/drawing/2014/main" xmlns="" id="{76627016-BFC4-46D4-89DB-F72E3C3461EC}"/>
               </a:ext>
             </a:extLst>
           </p:cNvPr>
@@ -18010,7 +17050,7 @@
           <p:cNvPr id="8" name="Picture 7">
             <a:extLst>
               <a:ext uri="{FF2B5EF4-FFF2-40B4-BE49-F238E27FC236}">
-                <a16:creationId xmlns="" xmlns:a16="http://schemas.microsoft.com/office/drawing/2014/main" id="{676C557E-B5A7-4416-BCC0-5743550BF152}"/>
+                <a16:creationId xmlns:a16="http://schemas.microsoft.com/office/drawing/2014/main" xmlns="" id="{676C557E-B5A7-4416-BCC0-5743550BF152}"/>
               </a:ext>
             </a:extLst>
           </p:cNvPr>
@@ -18046,7 +17086,7 @@
           <p:cNvPr id="15" name="Oval 14">
             <a:extLst>
               <a:ext uri="{FF2B5EF4-FFF2-40B4-BE49-F238E27FC236}">
-                <a16:creationId xmlns="" xmlns:a16="http://schemas.microsoft.com/office/drawing/2014/main" id="{EF515B4A-CB20-4847-8E00-0DD66F1FEBB4}"/>
+                <a16:creationId xmlns:a16="http://schemas.microsoft.com/office/drawing/2014/main" xmlns="" id="{EF515B4A-CB20-4847-8E00-0DD66F1FEBB4}"/>
               </a:ext>
             </a:extLst>
           </p:cNvPr>
@@ -18098,7 +17138,7 @@
           <p:cNvPr id="16" name="Slide Number Placeholder 5">
             <a:extLst>
               <a:ext uri="{FF2B5EF4-FFF2-40B4-BE49-F238E27FC236}">
-                <a16:creationId xmlns="" xmlns:a16="http://schemas.microsoft.com/office/drawing/2014/main" id="{996B64B9-1DF0-4EE9-BAB5-72AFA94B9AFD}"/>
+                <a16:creationId xmlns:a16="http://schemas.microsoft.com/office/drawing/2014/main" xmlns="" id="{996B64B9-1DF0-4EE9-BAB5-72AFA94B9AFD}"/>
               </a:ext>
             </a:extLst>
           </p:cNvPr>
@@ -18142,7 +17182,7 @@
           <p:cNvPr id="14" name="Rectangle 13">
             <a:extLst>
               <a:ext uri="{FF2B5EF4-FFF2-40B4-BE49-F238E27FC236}">
-                <a16:creationId xmlns="" xmlns:a16="http://schemas.microsoft.com/office/drawing/2014/main" id="{9D415693-E2CB-4DB4-B07C-2F96B0CAB302}"/>
+                <a16:creationId xmlns:a16="http://schemas.microsoft.com/office/drawing/2014/main" xmlns="" id="{9D415693-E2CB-4DB4-B07C-2F96B0CAB302}"/>
               </a:ext>
             </a:extLst>
           </p:cNvPr>
@@ -18198,7 +17238,7 @@
           <p:cNvPr id="4" name="Oval 3">
             <a:extLst>
               <a:ext uri="{FF2B5EF4-FFF2-40B4-BE49-F238E27FC236}">
-                <a16:creationId xmlns="" xmlns:a16="http://schemas.microsoft.com/office/drawing/2014/main" id="{14C1BF67-E354-4E04-8F94-BABF2B7D1AFB}"/>
+                <a16:creationId xmlns:a16="http://schemas.microsoft.com/office/drawing/2014/main" xmlns="" id="{14C1BF67-E354-4E04-8F94-BABF2B7D1AFB}"/>
               </a:ext>
             </a:extLst>
           </p:cNvPr>
@@ -18252,7 +17292,7 @@
           <p:cNvPr id="18" name="Picture Placeholder 5">
             <a:extLst>
               <a:ext uri="{FF2B5EF4-FFF2-40B4-BE49-F238E27FC236}">
-                <a16:creationId xmlns="" xmlns:a16="http://schemas.microsoft.com/office/drawing/2014/main" id="{FF6AC390-6F85-4B64-AE7A-E8E0D8FC89CF}"/>
+                <a16:creationId xmlns:a16="http://schemas.microsoft.com/office/drawing/2014/main" xmlns="" id="{FF6AC390-6F85-4B64-AE7A-E8E0D8FC89CF}"/>
               </a:ext>
             </a:extLst>
           </p:cNvPr>
@@ -18329,7 +17369,7 @@
           <p:cNvPr id="19" name="Rectangle 18">
             <a:extLst>
               <a:ext uri="{FF2B5EF4-FFF2-40B4-BE49-F238E27FC236}">
-                <a16:creationId xmlns="" xmlns:a16="http://schemas.microsoft.com/office/drawing/2014/main" id="{12E4E194-63F1-4D43-AC02-75733DF045E9}"/>
+                <a16:creationId xmlns:a16="http://schemas.microsoft.com/office/drawing/2014/main" xmlns="" id="{12E4E194-63F1-4D43-AC02-75733DF045E9}"/>
               </a:ext>
             </a:extLst>
           </p:cNvPr>
@@ -18381,7 +17421,7 @@
           <p:cNvPr id="22" name="Oval 21">
             <a:extLst>
               <a:ext uri="{FF2B5EF4-FFF2-40B4-BE49-F238E27FC236}">
-                <a16:creationId xmlns="" xmlns:a16="http://schemas.microsoft.com/office/drawing/2014/main" id="{E799E3E2-888B-2343-9A63-F84C03265CB5}"/>
+                <a16:creationId xmlns:a16="http://schemas.microsoft.com/office/drawing/2014/main" xmlns="" id="{E799E3E2-888B-2343-9A63-F84C03265CB5}"/>
               </a:ext>
             </a:extLst>
           </p:cNvPr>
@@ -18437,7 +17477,7 @@
           <p:cNvPr id="23" name="Picture Placeholder 11">
             <a:extLst>
               <a:ext uri="{FF2B5EF4-FFF2-40B4-BE49-F238E27FC236}">
-                <a16:creationId xmlns="" xmlns:a16="http://schemas.microsoft.com/office/drawing/2014/main" id="{8FEDE8EF-5B7A-A741-9A56-D365CAE01B62}"/>
+                <a16:creationId xmlns:a16="http://schemas.microsoft.com/office/drawing/2014/main" xmlns="" id="{8FEDE8EF-5B7A-A741-9A56-D365CAE01B62}"/>
               </a:ext>
             </a:extLst>
           </p:cNvPr>
@@ -18485,7 +17525,7 @@
           <p:cNvPr id="9" name="Rectangle 8">
             <a:extLst>
               <a:ext uri="{FF2B5EF4-FFF2-40B4-BE49-F238E27FC236}">
-                <a16:creationId xmlns="" xmlns:a16="http://schemas.microsoft.com/office/drawing/2014/main" id="{3755C1FB-E61C-4BBC-8179-D34908DEA1B6}"/>
+                <a16:creationId xmlns:a16="http://schemas.microsoft.com/office/drawing/2014/main" xmlns="" id="{3755C1FB-E61C-4BBC-8179-D34908DEA1B6}"/>
               </a:ext>
             </a:extLst>
           </p:cNvPr>
@@ -18537,7 +17577,7 @@
           <p:cNvPr id="4" name="Oval 3">
             <a:extLst>
               <a:ext uri="{FF2B5EF4-FFF2-40B4-BE49-F238E27FC236}">
-                <a16:creationId xmlns="" xmlns:a16="http://schemas.microsoft.com/office/drawing/2014/main" id="{8C1E0992-271E-4948-9461-C7AA54AF8FEA}"/>
+                <a16:creationId xmlns:a16="http://schemas.microsoft.com/office/drawing/2014/main" xmlns="" id="{8C1E0992-271E-4948-9461-C7AA54AF8FEA}"/>
               </a:ext>
             </a:extLst>
           </p:cNvPr>
@@ -18590,7 +17630,7 @@
           <p:cNvPr id="2" name="Title 1">
             <a:extLst>
               <a:ext uri="{FF2B5EF4-FFF2-40B4-BE49-F238E27FC236}">
-                <a16:creationId xmlns="" xmlns:a16="http://schemas.microsoft.com/office/drawing/2014/main" id="{32970CD0-696D-4313-96BA-4AA72C813BD0}"/>
+                <a16:creationId xmlns:a16="http://schemas.microsoft.com/office/drawing/2014/main" xmlns="" id="{32970CD0-696D-4313-96BA-4AA72C813BD0}"/>
               </a:ext>
             </a:extLst>
           </p:cNvPr>
@@ -18630,7 +17670,7 @@
           <p:cNvPr id="3" name="Content Placeholder 2">
             <a:extLst>
               <a:ext uri="{FF2B5EF4-FFF2-40B4-BE49-F238E27FC236}">
-                <a16:creationId xmlns="" xmlns:a16="http://schemas.microsoft.com/office/drawing/2014/main" id="{0FEE9886-36F0-4E06-A3A6-D8F00B0665A1}"/>
+                <a16:creationId xmlns:a16="http://schemas.microsoft.com/office/drawing/2014/main" xmlns="" id="{0FEE9886-36F0-4E06-A3A6-D8F00B0665A1}"/>
               </a:ext>
             </a:extLst>
           </p:cNvPr>
@@ -18687,7 +17727,7 @@
           <p:cNvPr id="7" name="Rectangle 6">
             <a:extLst>
               <a:ext uri="{FF2B5EF4-FFF2-40B4-BE49-F238E27FC236}">
-                <a16:creationId xmlns="" xmlns:a16="http://schemas.microsoft.com/office/drawing/2014/main" id="{76627016-BFC4-46D4-89DB-F72E3C3461EC}"/>
+                <a16:creationId xmlns:a16="http://schemas.microsoft.com/office/drawing/2014/main" xmlns="" id="{76627016-BFC4-46D4-89DB-F72E3C3461EC}"/>
               </a:ext>
             </a:extLst>
           </p:cNvPr>
@@ -18743,7 +17783,7 @@
           <p:cNvPr id="8" name="Picture 7">
             <a:extLst>
               <a:ext uri="{FF2B5EF4-FFF2-40B4-BE49-F238E27FC236}">
-                <a16:creationId xmlns="" xmlns:a16="http://schemas.microsoft.com/office/drawing/2014/main" id="{676C557E-B5A7-4416-BCC0-5743550BF152}"/>
+                <a16:creationId xmlns:a16="http://schemas.microsoft.com/office/drawing/2014/main" xmlns="" id="{676C557E-B5A7-4416-BCC0-5743550BF152}"/>
               </a:ext>
             </a:extLst>
           </p:cNvPr>
@@ -18779,7 +17819,7 @@
           <p:cNvPr id="15" name="Oval 14">
             <a:extLst>
               <a:ext uri="{FF2B5EF4-FFF2-40B4-BE49-F238E27FC236}">
-                <a16:creationId xmlns="" xmlns:a16="http://schemas.microsoft.com/office/drawing/2014/main" id="{EF515B4A-CB20-4847-8E00-0DD66F1FEBB4}"/>
+                <a16:creationId xmlns:a16="http://schemas.microsoft.com/office/drawing/2014/main" xmlns="" id="{EF515B4A-CB20-4847-8E00-0DD66F1FEBB4}"/>
               </a:ext>
             </a:extLst>
           </p:cNvPr>
@@ -18831,7 +17871,7 @@
           <p:cNvPr id="16" name="Slide Number Placeholder 5">
             <a:extLst>
               <a:ext uri="{FF2B5EF4-FFF2-40B4-BE49-F238E27FC236}">
-                <a16:creationId xmlns="" xmlns:a16="http://schemas.microsoft.com/office/drawing/2014/main" id="{996B64B9-1DF0-4EE9-BAB5-72AFA94B9AFD}"/>
+                <a16:creationId xmlns:a16="http://schemas.microsoft.com/office/drawing/2014/main" xmlns="" id="{996B64B9-1DF0-4EE9-BAB5-72AFA94B9AFD}"/>
               </a:ext>
             </a:extLst>
           </p:cNvPr>
@@ -18875,7 +17915,7 @@
           <p:cNvPr id="6" name="Picture Placeholder 5">
             <a:extLst>
               <a:ext uri="{FF2B5EF4-FFF2-40B4-BE49-F238E27FC236}">
-                <a16:creationId xmlns="" xmlns:a16="http://schemas.microsoft.com/office/drawing/2014/main" id="{35B71D50-AA4B-4E0C-8F6A-0F64F2C8A8C7}"/>
+                <a16:creationId xmlns:a16="http://schemas.microsoft.com/office/drawing/2014/main" xmlns="" id="{35B71D50-AA4B-4E0C-8F6A-0F64F2C8A8C7}"/>
               </a:ext>
             </a:extLst>
           </p:cNvPr>
@@ -18919,7 +17959,7 @@
           <p:cNvPr id="17" name="Content Placeholder 2">
             <a:extLst>
               <a:ext uri="{FF2B5EF4-FFF2-40B4-BE49-F238E27FC236}">
-                <a16:creationId xmlns="" xmlns:a16="http://schemas.microsoft.com/office/drawing/2014/main" id="{147C9C38-5B17-467D-B581-EF28ECB11E80}"/>
+                <a16:creationId xmlns:a16="http://schemas.microsoft.com/office/drawing/2014/main" xmlns="" id="{147C9C38-5B17-467D-B581-EF28ECB11E80}"/>
               </a:ext>
             </a:extLst>
           </p:cNvPr>
@@ -18976,7 +18016,7 @@
           <p:cNvPr id="20" name="Content Placeholder 2">
             <a:extLst>
               <a:ext uri="{FF2B5EF4-FFF2-40B4-BE49-F238E27FC236}">
-                <a16:creationId xmlns="" xmlns:a16="http://schemas.microsoft.com/office/drawing/2014/main" id="{FEB88DD7-AEB5-4718-AF2D-28B5B91ED715}"/>
+                <a16:creationId xmlns:a16="http://schemas.microsoft.com/office/drawing/2014/main" xmlns="" id="{FEB88DD7-AEB5-4718-AF2D-28B5B91ED715}"/>
               </a:ext>
             </a:extLst>
           </p:cNvPr>
@@ -19035,7 +18075,7 @@
           <p:cNvPr id="21" name="Content Placeholder 2">
             <a:extLst>
               <a:ext uri="{FF2B5EF4-FFF2-40B4-BE49-F238E27FC236}">
-                <a16:creationId xmlns="" xmlns:a16="http://schemas.microsoft.com/office/drawing/2014/main" id="{F694448B-800C-40EF-8F61-18C018E8374C}"/>
+                <a16:creationId xmlns:a16="http://schemas.microsoft.com/office/drawing/2014/main" xmlns="" id="{F694448B-800C-40EF-8F61-18C018E8374C}"/>
               </a:ext>
             </a:extLst>
           </p:cNvPr>
@@ -19094,7 +18134,7 @@
           <p:cNvPr id="12" name="Picture Placeholder 11">
             <a:extLst>
               <a:ext uri="{FF2B5EF4-FFF2-40B4-BE49-F238E27FC236}">
-                <a16:creationId xmlns="" xmlns:a16="http://schemas.microsoft.com/office/drawing/2014/main" id="{483B974E-5202-4EAD-9D55-4129C84BAE87}"/>
+                <a16:creationId xmlns:a16="http://schemas.microsoft.com/office/drawing/2014/main" xmlns="" id="{483B974E-5202-4EAD-9D55-4129C84BAE87}"/>
               </a:ext>
             </a:extLst>
           </p:cNvPr>
@@ -19172,7 +18212,7 @@
           <p:cNvPr id="22" name="Rectangle 21">
             <a:extLst>
               <a:ext uri="{FF2B5EF4-FFF2-40B4-BE49-F238E27FC236}">
-                <a16:creationId xmlns="" xmlns:a16="http://schemas.microsoft.com/office/drawing/2014/main" id="{1B6EB0C6-606C-4AFB-8FF8-AB43606B95BD}"/>
+                <a16:creationId xmlns:a16="http://schemas.microsoft.com/office/drawing/2014/main" xmlns="" id="{1B6EB0C6-606C-4AFB-8FF8-AB43606B95BD}"/>
               </a:ext>
             </a:extLst>
           </p:cNvPr>
@@ -19224,7 +18264,7 @@
           <p:cNvPr id="4" name="Rectangle 3">
             <a:extLst>
               <a:ext uri="{FF2B5EF4-FFF2-40B4-BE49-F238E27FC236}">
-                <a16:creationId xmlns="" xmlns:a16="http://schemas.microsoft.com/office/drawing/2014/main" id="{25CE6D5A-A5C0-4B12-A26A-691D5743FA5C}"/>
+                <a16:creationId xmlns:a16="http://schemas.microsoft.com/office/drawing/2014/main" xmlns="" id="{25CE6D5A-A5C0-4B12-A26A-691D5743FA5C}"/>
               </a:ext>
             </a:extLst>
           </p:cNvPr>
@@ -19276,7 +18316,7 @@
           <p:cNvPr id="2" name="Title 1">
             <a:extLst>
               <a:ext uri="{FF2B5EF4-FFF2-40B4-BE49-F238E27FC236}">
-                <a16:creationId xmlns="" xmlns:a16="http://schemas.microsoft.com/office/drawing/2014/main" id="{32970CD0-696D-4313-96BA-4AA72C813BD0}"/>
+                <a16:creationId xmlns:a16="http://schemas.microsoft.com/office/drawing/2014/main" xmlns="" id="{32970CD0-696D-4313-96BA-4AA72C813BD0}"/>
               </a:ext>
             </a:extLst>
           </p:cNvPr>
@@ -19316,7 +18356,7 @@
           <p:cNvPr id="3" name="Content Placeholder 2">
             <a:extLst>
               <a:ext uri="{FF2B5EF4-FFF2-40B4-BE49-F238E27FC236}">
-                <a16:creationId xmlns="" xmlns:a16="http://schemas.microsoft.com/office/drawing/2014/main" id="{0FEE9886-36F0-4E06-A3A6-D8F00B0665A1}"/>
+                <a16:creationId xmlns:a16="http://schemas.microsoft.com/office/drawing/2014/main" xmlns="" id="{0FEE9886-36F0-4E06-A3A6-D8F00B0665A1}"/>
               </a:ext>
             </a:extLst>
           </p:cNvPr>
@@ -19373,7 +18413,7 @@
           <p:cNvPr id="7" name="Rectangle 6">
             <a:extLst>
               <a:ext uri="{FF2B5EF4-FFF2-40B4-BE49-F238E27FC236}">
-                <a16:creationId xmlns="" xmlns:a16="http://schemas.microsoft.com/office/drawing/2014/main" id="{76627016-BFC4-46D4-89DB-F72E3C3461EC}"/>
+                <a16:creationId xmlns:a16="http://schemas.microsoft.com/office/drawing/2014/main" xmlns="" id="{76627016-BFC4-46D4-89DB-F72E3C3461EC}"/>
               </a:ext>
             </a:extLst>
           </p:cNvPr>
@@ -19429,7 +18469,7 @@
           <p:cNvPr id="8" name="Picture 7">
             <a:extLst>
               <a:ext uri="{FF2B5EF4-FFF2-40B4-BE49-F238E27FC236}">
-                <a16:creationId xmlns="" xmlns:a16="http://schemas.microsoft.com/office/drawing/2014/main" id="{676C557E-B5A7-4416-BCC0-5743550BF152}"/>
+                <a16:creationId xmlns:a16="http://schemas.microsoft.com/office/drawing/2014/main" xmlns="" id="{676C557E-B5A7-4416-BCC0-5743550BF152}"/>
               </a:ext>
             </a:extLst>
           </p:cNvPr>
@@ -19465,7 +18505,7 @@
           <p:cNvPr id="15" name="Oval 14">
             <a:extLst>
               <a:ext uri="{FF2B5EF4-FFF2-40B4-BE49-F238E27FC236}">
-                <a16:creationId xmlns="" xmlns:a16="http://schemas.microsoft.com/office/drawing/2014/main" id="{EF515B4A-CB20-4847-8E00-0DD66F1FEBB4}"/>
+                <a16:creationId xmlns:a16="http://schemas.microsoft.com/office/drawing/2014/main" xmlns="" id="{EF515B4A-CB20-4847-8E00-0DD66F1FEBB4}"/>
               </a:ext>
             </a:extLst>
           </p:cNvPr>
@@ -19517,7 +18557,7 @@
           <p:cNvPr id="16" name="Slide Number Placeholder 5">
             <a:extLst>
               <a:ext uri="{FF2B5EF4-FFF2-40B4-BE49-F238E27FC236}">
-                <a16:creationId xmlns="" xmlns:a16="http://schemas.microsoft.com/office/drawing/2014/main" id="{996B64B9-1DF0-4EE9-BAB5-72AFA94B9AFD}"/>
+                <a16:creationId xmlns:a16="http://schemas.microsoft.com/office/drawing/2014/main" xmlns="" id="{996B64B9-1DF0-4EE9-BAB5-72AFA94B9AFD}"/>
               </a:ext>
             </a:extLst>
           </p:cNvPr>
@@ -19561,7 +18601,7 @@
           <p:cNvPr id="20" name="Content Placeholder 2">
             <a:extLst>
               <a:ext uri="{FF2B5EF4-FFF2-40B4-BE49-F238E27FC236}">
-                <a16:creationId xmlns="" xmlns:a16="http://schemas.microsoft.com/office/drawing/2014/main" id="{FEB88DD7-AEB5-4718-AF2D-28B5B91ED715}"/>
+                <a16:creationId xmlns:a16="http://schemas.microsoft.com/office/drawing/2014/main" xmlns="" id="{FEB88DD7-AEB5-4718-AF2D-28B5B91ED715}"/>
               </a:ext>
             </a:extLst>
           </p:cNvPr>
@@ -19623,7 +18663,7 @@
           <p:cNvPr id="23" name="Content Placeholder 2">
             <a:extLst>
               <a:ext uri="{FF2B5EF4-FFF2-40B4-BE49-F238E27FC236}">
-                <a16:creationId xmlns="" xmlns:a16="http://schemas.microsoft.com/office/drawing/2014/main" id="{E5123CE7-2F8A-489B-BD99-0C2A33ADF49A}"/>
+                <a16:creationId xmlns:a16="http://schemas.microsoft.com/office/drawing/2014/main" xmlns="" id="{E5123CE7-2F8A-489B-BD99-0C2A33ADF49A}"/>
               </a:ext>
             </a:extLst>
           </p:cNvPr>
@@ -19680,7 +18720,7 @@
           <p:cNvPr id="25" name="Content Placeholder 2">
             <a:extLst>
               <a:ext uri="{FF2B5EF4-FFF2-40B4-BE49-F238E27FC236}">
-                <a16:creationId xmlns="" xmlns:a16="http://schemas.microsoft.com/office/drawing/2014/main" id="{07730BCF-AC2A-4FEC-8F01-63964DB444CF}"/>
+                <a16:creationId xmlns:a16="http://schemas.microsoft.com/office/drawing/2014/main" xmlns="" id="{07730BCF-AC2A-4FEC-8F01-63964DB444CF}"/>
               </a:ext>
             </a:extLst>
           </p:cNvPr>
@@ -19742,7 +18782,7 @@
           <p:cNvPr id="21" name="Oval 20">
             <a:extLst>
               <a:ext uri="{FF2B5EF4-FFF2-40B4-BE49-F238E27FC236}">
-                <a16:creationId xmlns="" xmlns:a16="http://schemas.microsoft.com/office/drawing/2014/main" id="{919C8692-230B-D543-A7F7-4FD61B04D1C6}"/>
+                <a16:creationId xmlns:a16="http://schemas.microsoft.com/office/drawing/2014/main" xmlns="" id="{919C8692-230B-D543-A7F7-4FD61B04D1C6}"/>
               </a:ext>
             </a:extLst>
           </p:cNvPr>
@@ -19795,7 +18835,7 @@
           <p:cNvPr id="24" name="Picture Placeholder 11">
             <a:extLst>
               <a:ext uri="{FF2B5EF4-FFF2-40B4-BE49-F238E27FC236}">
-                <a16:creationId xmlns="" xmlns:a16="http://schemas.microsoft.com/office/drawing/2014/main" id="{E150BFC7-A11D-CC46-B5A2-8BD93C269506}"/>
+                <a16:creationId xmlns:a16="http://schemas.microsoft.com/office/drawing/2014/main" xmlns="" id="{E150BFC7-A11D-CC46-B5A2-8BD93C269506}"/>
               </a:ext>
             </a:extLst>
           </p:cNvPr>
@@ -19843,7 +18883,7 @@
           <p:cNvPr id="28" name="Oval 27">
             <a:extLst>
               <a:ext uri="{FF2B5EF4-FFF2-40B4-BE49-F238E27FC236}">
-                <a16:creationId xmlns="" xmlns:a16="http://schemas.microsoft.com/office/drawing/2014/main" id="{F95B55F4-B501-3440-8904-A1C7F049CBE8}"/>
+                <a16:creationId xmlns:a16="http://schemas.microsoft.com/office/drawing/2014/main" xmlns="" id="{F95B55F4-B501-3440-8904-A1C7F049CBE8}"/>
               </a:ext>
             </a:extLst>
           </p:cNvPr>
@@ -19899,7 +18939,7 @@
           <p:cNvPr id="29" name="Picture Placeholder 11">
             <a:extLst>
               <a:ext uri="{FF2B5EF4-FFF2-40B4-BE49-F238E27FC236}">
-                <a16:creationId xmlns="" xmlns:a16="http://schemas.microsoft.com/office/drawing/2014/main" id="{F2116994-BE3E-6A43-9C15-E71BA8EC821F}"/>
+                <a16:creationId xmlns:a16="http://schemas.microsoft.com/office/drawing/2014/main" xmlns="" id="{F2116994-BE3E-6A43-9C15-E71BA8EC821F}"/>
               </a:ext>
             </a:extLst>
           </p:cNvPr>
@@ -19977,7 +19017,7 @@
           <p:cNvPr id="11" name="Group 10">
             <a:extLst>
               <a:ext uri="{FF2B5EF4-FFF2-40B4-BE49-F238E27FC236}">
-                <a16:creationId xmlns="" xmlns:a16="http://schemas.microsoft.com/office/drawing/2014/main" id="{04B31150-A166-4DB3-A898-2154C9665891}"/>
+                <a16:creationId xmlns:a16="http://schemas.microsoft.com/office/drawing/2014/main" xmlns="" id="{04B31150-A166-4DB3-A898-2154C9665891}"/>
               </a:ext>
             </a:extLst>
           </p:cNvPr>
@@ -20002,7 +19042,7 @@
             <p:cNvPr id="12" name="Freeform 5">
               <a:extLst>
                 <a:ext uri="{FF2B5EF4-FFF2-40B4-BE49-F238E27FC236}">
-                  <a16:creationId xmlns="" xmlns:a16="http://schemas.microsoft.com/office/drawing/2014/main" id="{1C1A95BC-42CA-4166-918D-DF4306881408}"/>
+                  <a16:creationId xmlns:a16="http://schemas.microsoft.com/office/drawing/2014/main" xmlns="" id="{1C1A95BC-42CA-4166-918D-DF4306881408}"/>
                 </a:ext>
               </a:extLst>
             </p:cNvPr>
@@ -20192,7 +19232,7 @@
             <p:cNvPr id="13" name="Freeform 6">
               <a:extLst>
                 <a:ext uri="{FF2B5EF4-FFF2-40B4-BE49-F238E27FC236}">
-                  <a16:creationId xmlns="" xmlns:a16="http://schemas.microsoft.com/office/drawing/2014/main" id="{4B4D5F91-2158-4A30-B83C-5CC9CC6E5D4F}"/>
+                  <a16:creationId xmlns:a16="http://schemas.microsoft.com/office/drawing/2014/main" xmlns="" id="{4B4D5F91-2158-4A30-B83C-5CC9CC6E5D4F}"/>
                 </a:ext>
               </a:extLst>
             </p:cNvPr>
@@ -20342,7 +19382,7 @@
             <p:cNvPr id="14" name="Freeform 7">
               <a:extLst>
                 <a:ext uri="{FF2B5EF4-FFF2-40B4-BE49-F238E27FC236}">
-                  <a16:creationId xmlns="" xmlns:a16="http://schemas.microsoft.com/office/drawing/2014/main" id="{C509E5D6-79CC-4E1D-AAF4-C6F28F3C1777}"/>
+                  <a16:creationId xmlns:a16="http://schemas.microsoft.com/office/drawing/2014/main" xmlns="" id="{C509E5D6-79CC-4E1D-AAF4-C6F28F3C1777}"/>
                 </a:ext>
               </a:extLst>
             </p:cNvPr>
@@ -20483,7 +19523,7 @@
           <p:cNvPr id="6" name="Title 1">
             <a:extLst>
               <a:ext uri="{FF2B5EF4-FFF2-40B4-BE49-F238E27FC236}">
-                <a16:creationId xmlns="" xmlns:a16="http://schemas.microsoft.com/office/drawing/2014/main" id="{B70E2287-0F7B-4DD3-A805-DB19BBF3C716}"/>
+                <a16:creationId xmlns:a16="http://schemas.microsoft.com/office/drawing/2014/main" xmlns="" id="{B70E2287-0F7B-4DD3-A805-DB19BBF3C716}"/>
               </a:ext>
             </a:extLst>
           </p:cNvPr>
@@ -20523,7 +19563,7 @@
           <p:cNvPr id="7" name="Rectangle 6">
             <a:extLst>
               <a:ext uri="{FF2B5EF4-FFF2-40B4-BE49-F238E27FC236}">
-                <a16:creationId xmlns="" xmlns:a16="http://schemas.microsoft.com/office/drawing/2014/main" id="{8DCE74CE-BEFF-42B3-BF3E-C41B1B1F1EE4}"/>
+                <a16:creationId xmlns:a16="http://schemas.microsoft.com/office/drawing/2014/main" xmlns="" id="{8DCE74CE-BEFF-42B3-BF3E-C41B1B1F1EE4}"/>
               </a:ext>
             </a:extLst>
           </p:cNvPr>
@@ -20579,7 +19619,7 @@
           <p:cNvPr id="8" name="Picture 7">
             <a:extLst>
               <a:ext uri="{FF2B5EF4-FFF2-40B4-BE49-F238E27FC236}">
-                <a16:creationId xmlns="" xmlns:a16="http://schemas.microsoft.com/office/drawing/2014/main" id="{8B0944B4-FE4A-459A-85B1-3476FE6C4C49}"/>
+                <a16:creationId xmlns:a16="http://schemas.microsoft.com/office/drawing/2014/main" xmlns="" id="{8B0944B4-FE4A-459A-85B1-3476FE6C4C49}"/>
               </a:ext>
             </a:extLst>
           </p:cNvPr>
@@ -20615,7 +19655,7 @@
           <p:cNvPr id="9" name="Oval 8">
             <a:extLst>
               <a:ext uri="{FF2B5EF4-FFF2-40B4-BE49-F238E27FC236}">
-                <a16:creationId xmlns="" xmlns:a16="http://schemas.microsoft.com/office/drawing/2014/main" id="{1B26B4BC-3D52-4C1C-85FB-226F0B5201F1}"/>
+                <a16:creationId xmlns:a16="http://schemas.microsoft.com/office/drawing/2014/main" xmlns="" id="{1B26B4BC-3D52-4C1C-85FB-226F0B5201F1}"/>
               </a:ext>
             </a:extLst>
           </p:cNvPr>
@@ -20667,7 +19707,7 @@
           <p:cNvPr id="10" name="Slide Number Placeholder 5">
             <a:extLst>
               <a:ext uri="{FF2B5EF4-FFF2-40B4-BE49-F238E27FC236}">
-                <a16:creationId xmlns="" xmlns:a16="http://schemas.microsoft.com/office/drawing/2014/main" id="{CEC6B25A-6AA2-46A7-84BE-5C907CA51B02}"/>
+                <a16:creationId xmlns:a16="http://schemas.microsoft.com/office/drawing/2014/main" xmlns="" id="{CEC6B25A-6AA2-46A7-84BE-5C907CA51B02}"/>
               </a:ext>
             </a:extLst>
           </p:cNvPr>
@@ -20741,7 +19781,7 @@
           <p:cNvPr id="35" name="Group 34">
             <a:extLst>
               <a:ext uri="{FF2B5EF4-FFF2-40B4-BE49-F238E27FC236}">
-                <a16:creationId xmlns="" xmlns:a16="http://schemas.microsoft.com/office/drawing/2014/main" id="{431CD316-21C7-4FA9-A45A-374D6AE71ED5}"/>
+                <a16:creationId xmlns:a16="http://schemas.microsoft.com/office/drawing/2014/main" xmlns="" id="{431CD316-21C7-4FA9-A45A-374D6AE71ED5}"/>
               </a:ext>
             </a:extLst>
           </p:cNvPr>
@@ -20766,7 +19806,7 @@
             <p:cNvPr id="36" name="Freeform 5">
               <a:extLst>
                 <a:ext uri="{FF2B5EF4-FFF2-40B4-BE49-F238E27FC236}">
-                  <a16:creationId xmlns="" xmlns:a16="http://schemas.microsoft.com/office/drawing/2014/main" id="{E107D9FB-3967-4583-A9DA-6787AF71202C}"/>
+                  <a16:creationId xmlns:a16="http://schemas.microsoft.com/office/drawing/2014/main" xmlns="" id="{E107D9FB-3967-4583-A9DA-6787AF71202C}"/>
                 </a:ext>
               </a:extLst>
             </p:cNvPr>
@@ -20956,7 +19996,7 @@
             <p:cNvPr id="37" name="Freeform 6">
               <a:extLst>
                 <a:ext uri="{FF2B5EF4-FFF2-40B4-BE49-F238E27FC236}">
-                  <a16:creationId xmlns="" xmlns:a16="http://schemas.microsoft.com/office/drawing/2014/main" id="{138D5FEB-37FF-4F26-B625-CE2BE91FF21B}"/>
+                  <a16:creationId xmlns:a16="http://schemas.microsoft.com/office/drawing/2014/main" xmlns="" id="{138D5FEB-37FF-4F26-B625-CE2BE91FF21B}"/>
                 </a:ext>
               </a:extLst>
             </p:cNvPr>
@@ -21106,7 +20146,7 @@
             <p:cNvPr id="38" name="Freeform 7">
               <a:extLst>
                 <a:ext uri="{FF2B5EF4-FFF2-40B4-BE49-F238E27FC236}">
-                  <a16:creationId xmlns="" xmlns:a16="http://schemas.microsoft.com/office/drawing/2014/main" id="{6C2B67E8-673C-422C-B021-296E2E2B952D}"/>
+                  <a16:creationId xmlns:a16="http://schemas.microsoft.com/office/drawing/2014/main" xmlns="" id="{6C2B67E8-673C-422C-B021-296E2E2B952D}"/>
                 </a:ext>
               </a:extLst>
             </p:cNvPr>
@@ -21247,7 +20287,7 @@
           <p:cNvPr id="23" name="Oval 22">
             <a:extLst>
               <a:ext uri="{FF2B5EF4-FFF2-40B4-BE49-F238E27FC236}">
-                <a16:creationId xmlns="" xmlns:a16="http://schemas.microsoft.com/office/drawing/2014/main" id="{687010E4-ADF2-486D-8DF7-B0FF38C6DADF}"/>
+                <a16:creationId xmlns:a16="http://schemas.microsoft.com/office/drawing/2014/main" xmlns="" id="{687010E4-ADF2-486D-8DF7-B0FF38C6DADF}"/>
               </a:ext>
             </a:extLst>
           </p:cNvPr>
@@ -21301,7 +20341,7 @@
           <p:cNvPr id="24" name="Oval 23">
             <a:extLst>
               <a:ext uri="{FF2B5EF4-FFF2-40B4-BE49-F238E27FC236}">
-                <a16:creationId xmlns="" xmlns:a16="http://schemas.microsoft.com/office/drawing/2014/main" id="{9159AA79-2237-4A27-BBC2-D44032158D19}"/>
+                <a16:creationId xmlns:a16="http://schemas.microsoft.com/office/drawing/2014/main" xmlns="" id="{9159AA79-2237-4A27-BBC2-D44032158D19}"/>
               </a:ext>
             </a:extLst>
           </p:cNvPr>
@@ -21355,7 +20395,7 @@
           <p:cNvPr id="25" name="Oval 24">
             <a:extLst>
               <a:ext uri="{FF2B5EF4-FFF2-40B4-BE49-F238E27FC236}">
-                <a16:creationId xmlns="" xmlns:a16="http://schemas.microsoft.com/office/drawing/2014/main" id="{0272B962-9566-42D2-B4C3-E7AA81884A83}"/>
+                <a16:creationId xmlns:a16="http://schemas.microsoft.com/office/drawing/2014/main" xmlns="" id="{0272B962-9566-42D2-B4C3-E7AA81884A83}"/>
               </a:ext>
             </a:extLst>
           </p:cNvPr>
@@ -21409,7 +20449,7 @@
           <p:cNvPr id="26" name="Oval 25">
             <a:extLst>
               <a:ext uri="{FF2B5EF4-FFF2-40B4-BE49-F238E27FC236}">
-                <a16:creationId xmlns="" xmlns:a16="http://schemas.microsoft.com/office/drawing/2014/main" id="{19733285-016C-4C38-816C-83D30C075C70}"/>
+                <a16:creationId xmlns:a16="http://schemas.microsoft.com/office/drawing/2014/main" xmlns="" id="{19733285-016C-4C38-816C-83D30C075C70}"/>
               </a:ext>
             </a:extLst>
           </p:cNvPr>
@@ -21463,7 +20503,7 @@
           <p:cNvPr id="20" name="Freeform: Shape 19">
             <a:extLst>
               <a:ext uri="{FF2B5EF4-FFF2-40B4-BE49-F238E27FC236}">
-                <a16:creationId xmlns="" xmlns:a16="http://schemas.microsoft.com/office/drawing/2014/main" id="{EF40DBA4-AB63-4B47-B37F-BCC3D59B5392}"/>
+                <a16:creationId xmlns:a16="http://schemas.microsoft.com/office/drawing/2014/main" xmlns="" id="{EF40DBA4-AB63-4B47-B37F-BCC3D59B5392}"/>
               </a:ext>
             </a:extLst>
           </p:cNvPr>
@@ -21578,7 +20618,7 @@
           <p:cNvPr id="21" name="Freeform: Shape 20">
             <a:extLst>
               <a:ext uri="{FF2B5EF4-FFF2-40B4-BE49-F238E27FC236}">
-                <a16:creationId xmlns="" xmlns:a16="http://schemas.microsoft.com/office/drawing/2014/main" id="{33EF0AFB-D099-4FF1-8963-7DA87268867F}"/>
+                <a16:creationId xmlns:a16="http://schemas.microsoft.com/office/drawing/2014/main" xmlns="" id="{33EF0AFB-D099-4FF1-8963-7DA87268867F}"/>
               </a:ext>
             </a:extLst>
           </p:cNvPr>
@@ -21693,7 +20733,7 @@
           <p:cNvPr id="22" name="Freeform: Shape 21">
             <a:extLst>
               <a:ext uri="{FF2B5EF4-FFF2-40B4-BE49-F238E27FC236}">
-                <a16:creationId xmlns="" xmlns:a16="http://schemas.microsoft.com/office/drawing/2014/main" id="{6872C96E-9AF3-4FA0-8180-C213C7F2209E}"/>
+                <a16:creationId xmlns:a16="http://schemas.microsoft.com/office/drawing/2014/main" xmlns="" id="{6872C96E-9AF3-4FA0-8180-C213C7F2209E}"/>
               </a:ext>
             </a:extLst>
           </p:cNvPr>
@@ -21808,7 +20848,7 @@
           <p:cNvPr id="17" name="Freeform: Shape 16">
             <a:extLst>
               <a:ext uri="{FF2B5EF4-FFF2-40B4-BE49-F238E27FC236}">
-                <a16:creationId xmlns="" xmlns:a16="http://schemas.microsoft.com/office/drawing/2014/main" id="{3A08BE29-CFA5-4E0D-9DBE-A430AE1B8072}"/>
+                <a16:creationId xmlns:a16="http://schemas.microsoft.com/office/drawing/2014/main" xmlns="" id="{3A08BE29-CFA5-4E0D-9DBE-A430AE1B8072}"/>
               </a:ext>
             </a:extLst>
           </p:cNvPr>
@@ -21923,7 +20963,7 @@
           <p:cNvPr id="6" name="Title 1">
             <a:extLst>
               <a:ext uri="{FF2B5EF4-FFF2-40B4-BE49-F238E27FC236}">
-                <a16:creationId xmlns="" xmlns:a16="http://schemas.microsoft.com/office/drawing/2014/main" id="{B70E2287-0F7B-4DD3-A805-DB19BBF3C716}"/>
+                <a16:creationId xmlns:a16="http://schemas.microsoft.com/office/drawing/2014/main" xmlns="" id="{B70E2287-0F7B-4DD3-A805-DB19BBF3C716}"/>
               </a:ext>
             </a:extLst>
           </p:cNvPr>
@@ -21963,7 +21003,7 @@
           <p:cNvPr id="7" name="Rectangle 6">
             <a:extLst>
               <a:ext uri="{FF2B5EF4-FFF2-40B4-BE49-F238E27FC236}">
-                <a16:creationId xmlns="" xmlns:a16="http://schemas.microsoft.com/office/drawing/2014/main" id="{8DCE74CE-BEFF-42B3-BF3E-C41B1B1F1EE4}"/>
+                <a16:creationId xmlns:a16="http://schemas.microsoft.com/office/drawing/2014/main" xmlns="" id="{8DCE74CE-BEFF-42B3-BF3E-C41B1B1F1EE4}"/>
               </a:ext>
             </a:extLst>
           </p:cNvPr>
@@ -22019,7 +21059,7 @@
           <p:cNvPr id="8" name="Picture 7">
             <a:extLst>
               <a:ext uri="{FF2B5EF4-FFF2-40B4-BE49-F238E27FC236}">
-                <a16:creationId xmlns="" xmlns:a16="http://schemas.microsoft.com/office/drawing/2014/main" id="{8B0944B4-FE4A-459A-85B1-3476FE6C4C49}"/>
+                <a16:creationId xmlns:a16="http://schemas.microsoft.com/office/drawing/2014/main" xmlns="" id="{8B0944B4-FE4A-459A-85B1-3476FE6C4C49}"/>
               </a:ext>
             </a:extLst>
           </p:cNvPr>
@@ -22055,7 +21095,7 @@
           <p:cNvPr id="9" name="Oval 8">
             <a:extLst>
               <a:ext uri="{FF2B5EF4-FFF2-40B4-BE49-F238E27FC236}">
-                <a16:creationId xmlns="" xmlns:a16="http://schemas.microsoft.com/office/drawing/2014/main" id="{1B26B4BC-3D52-4C1C-85FB-226F0B5201F1}"/>
+                <a16:creationId xmlns:a16="http://schemas.microsoft.com/office/drawing/2014/main" xmlns="" id="{1B26B4BC-3D52-4C1C-85FB-226F0B5201F1}"/>
               </a:ext>
             </a:extLst>
           </p:cNvPr>
@@ -22107,7 +21147,7 @@
           <p:cNvPr id="10" name="Slide Number Placeholder 5">
             <a:extLst>
               <a:ext uri="{FF2B5EF4-FFF2-40B4-BE49-F238E27FC236}">
-                <a16:creationId xmlns="" xmlns:a16="http://schemas.microsoft.com/office/drawing/2014/main" id="{CEC6B25A-6AA2-46A7-84BE-5C907CA51B02}"/>
+                <a16:creationId xmlns:a16="http://schemas.microsoft.com/office/drawing/2014/main" xmlns="" id="{CEC6B25A-6AA2-46A7-84BE-5C907CA51B02}"/>
               </a:ext>
             </a:extLst>
           </p:cNvPr>
@@ -22151,7 +21191,7 @@
           <p:cNvPr id="3" name="Picture Placeholder 2">
             <a:extLst>
               <a:ext uri="{FF2B5EF4-FFF2-40B4-BE49-F238E27FC236}">
-                <a16:creationId xmlns="" xmlns:a16="http://schemas.microsoft.com/office/drawing/2014/main" id="{B1B995BE-66C2-4379-885F-4BE069DA39E4}"/>
+                <a16:creationId xmlns:a16="http://schemas.microsoft.com/office/drawing/2014/main" xmlns="" id="{B1B995BE-66C2-4379-885F-4BE069DA39E4}"/>
               </a:ext>
             </a:extLst>
           </p:cNvPr>
@@ -22198,7 +21238,7 @@
           <p:cNvPr id="11" name="Picture Placeholder 2">
             <a:extLst>
               <a:ext uri="{FF2B5EF4-FFF2-40B4-BE49-F238E27FC236}">
-                <a16:creationId xmlns="" xmlns:a16="http://schemas.microsoft.com/office/drawing/2014/main" id="{9B56B6C6-9F3C-4E80-BBAD-280E697B895C}"/>
+                <a16:creationId xmlns:a16="http://schemas.microsoft.com/office/drawing/2014/main" xmlns="" id="{9B56B6C6-9F3C-4E80-BBAD-280E697B895C}"/>
               </a:ext>
             </a:extLst>
           </p:cNvPr>
@@ -22245,7 +21285,7 @@
           <p:cNvPr id="12" name="Picture Placeholder 2">
             <a:extLst>
               <a:ext uri="{FF2B5EF4-FFF2-40B4-BE49-F238E27FC236}">
-                <a16:creationId xmlns="" xmlns:a16="http://schemas.microsoft.com/office/drawing/2014/main" id="{54704160-1ED7-4B90-8963-0F887C73E94D}"/>
+                <a16:creationId xmlns:a16="http://schemas.microsoft.com/office/drawing/2014/main" xmlns="" id="{54704160-1ED7-4B90-8963-0F887C73E94D}"/>
               </a:ext>
             </a:extLst>
           </p:cNvPr>
@@ -22292,7 +21332,7 @@
           <p:cNvPr id="13" name="Picture Placeholder 2">
             <a:extLst>
               <a:ext uri="{FF2B5EF4-FFF2-40B4-BE49-F238E27FC236}">
-                <a16:creationId xmlns="" xmlns:a16="http://schemas.microsoft.com/office/drawing/2014/main" id="{36610597-6A76-4A06-82A5-A8FFC5BAEA0F}"/>
+                <a16:creationId xmlns:a16="http://schemas.microsoft.com/office/drawing/2014/main" xmlns="" id="{36610597-6A76-4A06-82A5-A8FFC5BAEA0F}"/>
               </a:ext>
             </a:extLst>
           </p:cNvPr>
@@ -22339,7 +21379,7 @@
           <p:cNvPr id="27" name="Content Placeholder 2">
             <a:extLst>
               <a:ext uri="{FF2B5EF4-FFF2-40B4-BE49-F238E27FC236}">
-                <a16:creationId xmlns="" xmlns:a16="http://schemas.microsoft.com/office/drawing/2014/main" id="{FF56D2E5-86E4-473A-A62F-B7029E5B2558}"/>
+                <a16:creationId xmlns:a16="http://schemas.microsoft.com/office/drawing/2014/main" xmlns="" id="{FF56D2E5-86E4-473A-A62F-B7029E5B2558}"/>
               </a:ext>
             </a:extLst>
           </p:cNvPr>
@@ -22396,7 +21436,7 @@
           <p:cNvPr id="28" name="Content Placeholder 2">
             <a:extLst>
               <a:ext uri="{FF2B5EF4-FFF2-40B4-BE49-F238E27FC236}">
-                <a16:creationId xmlns="" xmlns:a16="http://schemas.microsoft.com/office/drawing/2014/main" id="{93934E34-6CC7-492D-9515-EBEC72EFF4CB}"/>
+                <a16:creationId xmlns:a16="http://schemas.microsoft.com/office/drawing/2014/main" xmlns="" id="{93934E34-6CC7-492D-9515-EBEC72EFF4CB}"/>
               </a:ext>
             </a:extLst>
           </p:cNvPr>
@@ -22458,7 +21498,7 @@
           <p:cNvPr id="29" name="Content Placeholder 2">
             <a:extLst>
               <a:ext uri="{FF2B5EF4-FFF2-40B4-BE49-F238E27FC236}">
-                <a16:creationId xmlns="" xmlns:a16="http://schemas.microsoft.com/office/drawing/2014/main" id="{E4E27467-A1AA-4773-AAB5-A96267FBD712}"/>
+                <a16:creationId xmlns:a16="http://schemas.microsoft.com/office/drawing/2014/main" xmlns="" id="{E4E27467-A1AA-4773-AAB5-A96267FBD712}"/>
               </a:ext>
             </a:extLst>
           </p:cNvPr>
@@ -22515,7 +21555,7 @@
           <p:cNvPr id="30" name="Content Placeholder 2">
             <a:extLst>
               <a:ext uri="{FF2B5EF4-FFF2-40B4-BE49-F238E27FC236}">
-                <a16:creationId xmlns="" xmlns:a16="http://schemas.microsoft.com/office/drawing/2014/main" id="{6CABD5EB-4A8B-448B-8ED1-B8B420815B2D}"/>
+                <a16:creationId xmlns:a16="http://schemas.microsoft.com/office/drawing/2014/main" xmlns="" id="{6CABD5EB-4A8B-448B-8ED1-B8B420815B2D}"/>
               </a:ext>
             </a:extLst>
           </p:cNvPr>
@@ -22577,7 +21617,7 @@
           <p:cNvPr id="31" name="Content Placeholder 2">
             <a:extLst>
               <a:ext uri="{FF2B5EF4-FFF2-40B4-BE49-F238E27FC236}">
-                <a16:creationId xmlns="" xmlns:a16="http://schemas.microsoft.com/office/drawing/2014/main" id="{0D86883C-E501-47FF-AE1A-E9CE8B71B421}"/>
+                <a16:creationId xmlns:a16="http://schemas.microsoft.com/office/drawing/2014/main" xmlns="" id="{0D86883C-E501-47FF-AE1A-E9CE8B71B421}"/>
               </a:ext>
             </a:extLst>
           </p:cNvPr>
@@ -22634,7 +21674,7 @@
           <p:cNvPr id="32" name="Content Placeholder 2">
             <a:extLst>
               <a:ext uri="{FF2B5EF4-FFF2-40B4-BE49-F238E27FC236}">
-                <a16:creationId xmlns="" xmlns:a16="http://schemas.microsoft.com/office/drawing/2014/main" id="{3683A037-F698-4CC9-904D-F377D71F690F}"/>
+                <a16:creationId xmlns:a16="http://schemas.microsoft.com/office/drawing/2014/main" xmlns="" id="{3683A037-F698-4CC9-904D-F377D71F690F}"/>
               </a:ext>
             </a:extLst>
           </p:cNvPr>
@@ -22696,7 +21736,7 @@
           <p:cNvPr id="33" name="Content Placeholder 2">
             <a:extLst>
               <a:ext uri="{FF2B5EF4-FFF2-40B4-BE49-F238E27FC236}">
-                <a16:creationId xmlns="" xmlns:a16="http://schemas.microsoft.com/office/drawing/2014/main" id="{0A095594-2B82-44ED-8C9B-DA7C4D3D2872}"/>
+                <a16:creationId xmlns:a16="http://schemas.microsoft.com/office/drawing/2014/main" xmlns="" id="{0A095594-2B82-44ED-8C9B-DA7C4D3D2872}"/>
               </a:ext>
             </a:extLst>
           </p:cNvPr>
@@ -22753,7 +21793,7 @@
           <p:cNvPr id="34" name="Content Placeholder 2">
             <a:extLst>
               <a:ext uri="{FF2B5EF4-FFF2-40B4-BE49-F238E27FC236}">
-                <a16:creationId xmlns="" xmlns:a16="http://schemas.microsoft.com/office/drawing/2014/main" id="{54CDD46A-22ED-48F5-9B5F-13B1B5C4B320}"/>
+                <a16:creationId xmlns:a16="http://schemas.microsoft.com/office/drawing/2014/main" xmlns="" id="{54CDD46A-22ED-48F5-9B5F-13B1B5C4B320}"/>
               </a:ext>
             </a:extLst>
           </p:cNvPr>
@@ -22850,7 +21890,7 @@
           <p:cNvPr id="2" name="Title Placeholder 1">
             <a:extLst>
               <a:ext uri="{FF2B5EF4-FFF2-40B4-BE49-F238E27FC236}">
-                <a16:creationId xmlns="" xmlns:a16="http://schemas.microsoft.com/office/drawing/2014/main" id="{BCC4D7FA-B85E-4477-8C62-94955B340F14}"/>
+                <a16:creationId xmlns:a16="http://schemas.microsoft.com/office/drawing/2014/main" xmlns="" id="{BCC4D7FA-B85E-4477-8C62-94955B340F14}"/>
               </a:ext>
             </a:extLst>
           </p:cNvPr>
@@ -22889,7 +21929,7 @@
           <p:cNvPr id="3" name="Text Placeholder 2">
             <a:extLst>
               <a:ext uri="{FF2B5EF4-FFF2-40B4-BE49-F238E27FC236}">
-                <a16:creationId xmlns="" xmlns:a16="http://schemas.microsoft.com/office/drawing/2014/main" id="{1F1226BB-3E56-4E7F-8172-7EC03C9F0BCF}"/>
+                <a16:creationId xmlns:a16="http://schemas.microsoft.com/office/drawing/2014/main" xmlns="" id="{1F1226BB-3E56-4E7F-8172-7EC03C9F0BCF}"/>
               </a:ext>
             </a:extLst>
           </p:cNvPr>
@@ -22956,7 +21996,7 @@
           <p:cNvPr id="4" name="Date Placeholder 3">
             <a:extLst>
               <a:ext uri="{FF2B5EF4-FFF2-40B4-BE49-F238E27FC236}">
-                <a16:creationId xmlns="" xmlns:a16="http://schemas.microsoft.com/office/drawing/2014/main" id="{D95D08EF-72FB-4F19-9916-65815A9CA99C}"/>
+                <a16:creationId xmlns:a16="http://schemas.microsoft.com/office/drawing/2014/main" xmlns="" id="{D95D08EF-72FB-4F19-9916-65815A9CA99C}"/>
               </a:ext>
             </a:extLst>
           </p:cNvPr>
@@ -22992,7 +22032,7 @@
           <a:p>
             <a:fld id="{D951F27F-98F9-A147-8986-34441C7B752D}" type="datetime1">
               <a:rPr lang="en-US" noProof="0" smtClean="0"/>
-              <a:t>7/2/2019</a:t>
+              <a:t>7/5/2019</a:t>
             </a:fld>
             <a:endParaRPr lang="en-US" noProof="0" dirty="0"/>
           </a:p>
@@ -23003,7 +22043,7 @@
           <p:cNvPr id="5" name="Footer Placeholder 4">
             <a:extLst>
               <a:ext uri="{FF2B5EF4-FFF2-40B4-BE49-F238E27FC236}">
-                <a16:creationId xmlns="" xmlns:a16="http://schemas.microsoft.com/office/drawing/2014/main" id="{1365084D-BC85-4A55-BD80-93876AD10108}"/>
+                <a16:creationId xmlns:a16="http://schemas.microsoft.com/office/drawing/2014/main" xmlns="" id="{1365084D-BC85-4A55-BD80-93876AD10108}"/>
               </a:ext>
             </a:extLst>
           </p:cNvPr>
@@ -23046,7 +22086,7 @@
           <p:cNvPr id="6" name="Slide Number Placeholder 5">
             <a:extLst>
               <a:ext uri="{FF2B5EF4-FFF2-40B4-BE49-F238E27FC236}">
-                <a16:creationId xmlns="" xmlns:a16="http://schemas.microsoft.com/office/drawing/2014/main" id="{45FDEF23-A140-4DD6-A0D0-A86BD4DF3404}"/>
+                <a16:creationId xmlns:a16="http://schemas.microsoft.com/office/drawing/2014/main" xmlns="" id="{45FDEF23-A140-4DD6-A0D0-A86BD4DF3404}"/>
               </a:ext>
             </a:extLst>
           </p:cNvPr>
@@ -23449,7 +22489,7 @@
           <p:cNvPr id="2" name="Title 1">
             <a:extLst>
               <a:ext uri="{FF2B5EF4-FFF2-40B4-BE49-F238E27FC236}">
-                <a16:creationId xmlns="" xmlns:a16="http://schemas.microsoft.com/office/drawing/2014/main" id="{FBAB08B8-3DB3-4637-AE23-B8DB96D9FCEC}"/>
+                <a16:creationId xmlns:a16="http://schemas.microsoft.com/office/drawing/2014/main" xmlns="" id="{FBAB08B8-3DB3-4637-AE23-B8DB96D9FCEC}"/>
               </a:ext>
             </a:extLst>
           </p:cNvPr>
@@ -30657,13 +29697,7 @@
               <a:rPr lang="en-GB">
                 <a:latin typeface="Consolas" panose="020B0609020204030204" pitchFamily="49" charset="0"/>
               </a:rPr>
-              <a:t>a href</a:t>
-            </a:r>
-            <a:r>
-              <a:rPr lang="en-GB">
-                <a:latin typeface="Consolas" panose="020B0609020204030204" pitchFamily="49" charset="0"/>
-              </a:rPr>
-              <a:t>="#"&gt;</a:t>
+              <a:t>a href="#"&gt;</a:t>
             </a:r>
             <a:r>
               <a:rPr lang="en-GB" smtClean="0">
@@ -30704,13 +29738,7 @@
               <a:rPr lang="it-IT">
                 <a:latin typeface="Consolas" panose="020B0609020204030204" pitchFamily="49" charset="0"/>
               </a:rPr>
-              <a:t>		</a:t>
-            </a:r>
-            <a:r>
-              <a:rPr lang="it-IT">
-                <a:latin typeface="Consolas" panose="020B0609020204030204" pitchFamily="49" charset="0"/>
-              </a:rPr>
-              <a:t>    </a:t>
+              <a:t>		    </a:t>
             </a:r>
             <a:endParaRPr lang="it-IT" smtClean="0">
               <a:latin typeface="Consolas" panose="020B0609020204030204" pitchFamily="49" charset="0"/>
@@ -30763,17 +29791,8 @@
               <a:rPr lang="it-IT">
                 <a:latin typeface="Consolas" panose="020B0609020204030204" pitchFamily="49" charset="0"/>
               </a:rPr>
-              <a:t>		</a:t>
-            </a:r>
-            <a:r>
-              <a:rPr lang="it-IT">
-                <a:latin typeface="Consolas" panose="020B0609020204030204" pitchFamily="49" charset="0"/>
-              </a:rPr>
-              <a:t>    </a:t>
-            </a:r>
-            <a:endParaRPr lang="it-IT">
-              <a:latin typeface="Consolas" panose="020B0609020204030204" pitchFamily="49" charset="0"/>
-            </a:endParaRPr>
+              <a:t>		    </a:t>
+            </a:r>
           </a:p>
           <a:p>
             <a:r>
@@ -30792,13 +29811,7 @@
               <a:rPr lang="it-IT">
                 <a:latin typeface="Consolas" panose="020B0609020204030204" pitchFamily="49" charset="0"/>
               </a:rPr>
-              <a:t>&gt;&lt;a </a:t>
-            </a:r>
-            <a:r>
-              <a:rPr lang="it-IT">
-                <a:latin typeface="Consolas" panose="020B0609020204030204" pitchFamily="49" charset="0"/>
-              </a:rPr>
-              <a:t>href</a:t>
+              <a:t>&gt;&lt;a href</a:t>
             </a:r>
             <a:r>
               <a:rPr lang="it-IT" smtClean="0">
@@ -30828,13 +29841,7 @@
               <a:rPr lang="it-IT">
                 <a:latin typeface="Consolas" panose="020B0609020204030204" pitchFamily="49" charset="0"/>
               </a:rPr>
-              <a:t>		</a:t>
-            </a:r>
-            <a:r>
-              <a:rPr lang="it-IT">
-                <a:latin typeface="Consolas" panose="020B0609020204030204" pitchFamily="49" charset="0"/>
-              </a:rPr>
-              <a:t>    </a:t>
+              <a:t>		    </a:t>
             </a:r>
             <a:endParaRPr lang="it-IT" smtClean="0">
               <a:latin typeface="Consolas" panose="020B0609020204030204" pitchFamily="49" charset="0"/>
@@ -30857,13 +29864,7 @@
               <a:rPr lang="it-IT">
                 <a:latin typeface="Consolas" panose="020B0609020204030204" pitchFamily="49" charset="0"/>
               </a:rPr>
-              <a:t>&gt;&lt;a </a:t>
-            </a:r>
-            <a:r>
-              <a:rPr lang="it-IT">
-                <a:latin typeface="Consolas" panose="020B0609020204030204" pitchFamily="49" charset="0"/>
-              </a:rPr>
-              <a:t>href</a:t>
+              <a:t>&gt;&lt;a href</a:t>
             </a:r>
             <a:r>
               <a:rPr lang="it-IT" smtClean="0">
@@ -35324,7 +34325,7 @@
           <p:cNvPr id="2" name="Title 1">
             <a:extLst>
               <a:ext uri="{FF2B5EF4-FFF2-40B4-BE49-F238E27FC236}">
-                <a16:creationId xmlns="" xmlns:a16="http://schemas.microsoft.com/office/drawing/2014/main" id="{FBAB08B8-3DB3-4637-AE23-B8DB96D9FCEC}"/>
+                <a16:creationId xmlns:a16="http://schemas.microsoft.com/office/drawing/2014/main" xmlns="" id="{FBAB08B8-3DB3-4637-AE23-B8DB96D9FCEC}"/>
               </a:ext>
             </a:extLst>
           </p:cNvPr>
@@ -36121,11 +35122,7 @@
             </a:r>
             <a:r>
               <a:rPr lang="id-ID" sz="1800"/>
-              <a:t>isi </a:t>
-            </a:r>
-            <a:r>
-              <a:rPr lang="id-ID" sz="1800"/>
-              <a:t>properti</a:t>
+              <a:t>isi properti</a:t>
             </a:r>
             <a:r>
               <a:rPr lang="id-ID" sz="1800" i="1"/>
@@ -36153,11 +35150,7 @@
             </a:r>
             <a:r>
               <a:rPr lang="en-US" sz="1800"/>
-              <a:t> yang tidak memiliki halaman </a:t>
-            </a:r>
-            <a:r>
-              <a:rPr lang="en-US" sz="1800"/>
-              <a:t>DBpedia</a:t>
+              <a:t> yang tidak memiliki halaman DBpedia</a:t>
             </a:r>
             <a:r>
               <a:rPr lang="en-US" sz="1800" smtClean="0"/>
@@ -36722,51 +35715,6 @@
       </p:grpSpPr>
       <p:sp>
         <p:nvSpPr>
-          <p:cNvPr id="9" name="Rectangle 8"/>
-          <p:cNvSpPr/>
-          <p:nvPr/>
-        </p:nvSpPr>
-        <p:spPr>
-          <a:xfrm>
-            <a:off x="9131903" y="1725561"/>
-            <a:ext cx="1973631" cy="368710"/>
-          </a:xfrm>
-          <a:prstGeom prst="rect">
-            <a:avLst/>
-          </a:prstGeom>
-          <a:ln>
-            <a:solidFill>
-              <a:schemeClr val="bg1"/>
-            </a:solidFill>
-          </a:ln>
-        </p:spPr>
-        <p:style>
-          <a:lnRef idx="2">
-            <a:schemeClr val="accent1">
-              <a:shade val="50000"/>
-            </a:schemeClr>
-          </a:lnRef>
-          <a:fillRef idx="1">
-            <a:schemeClr val="accent1"/>
-          </a:fillRef>
-          <a:effectRef idx="0">
-            <a:schemeClr val="accent1"/>
-          </a:effectRef>
-          <a:fontRef idx="minor">
-            <a:schemeClr val="lt1"/>
-          </a:fontRef>
-        </p:style>
-        <p:txBody>
-          <a:bodyPr rtlCol="0" anchor="ctr"/>
-          <a:lstStyle/>
-          <a:p>
-            <a:pPr algn="ctr"/>
-            <a:endParaRPr lang="en-US"/>
-          </a:p>
-        </p:txBody>
-      </p:sp>
-      <p:sp>
-        <p:nvSpPr>
           <p:cNvPr id="6" name="Rectangle 5"/>
           <p:cNvSpPr/>
           <p:nvPr/>
@@ -36897,7 +35845,7 @@
         </p:nvSpPr>
         <p:spPr>
           <a:xfrm>
-            <a:off x="10486167" y="1740309"/>
+            <a:off x="10175977" y="1862857"/>
             <a:ext cx="811161" cy="1135625"/>
           </a:xfrm>
           <a:prstGeom prst="downArrow">
@@ -36942,7 +35890,7 @@
         </p:nvSpPr>
         <p:spPr>
           <a:xfrm>
-            <a:off x="9517870" y="2896308"/>
+            <a:off x="9244493" y="3191246"/>
             <a:ext cx="2674130" cy="923330"/>
           </a:xfrm>
           <a:prstGeom prst="rect">
@@ -37147,452 +36095,30 @@
           </a:p>
         </p:txBody>
       </p:sp>
-      <p:sp>
-        <p:nvSpPr>
-          <p:cNvPr id="4" name="Oval 3"/>
-          <p:cNvSpPr/>
+      <p:pic>
+        <p:nvPicPr>
+          <p:cNvPr id="7" name="Picture 6"/>
+          <p:cNvPicPr>
+            <a:picLocks noChangeAspect="1"/>
+          </p:cNvPicPr>
           <p:nvPr/>
-        </p:nvSpPr>
+        </p:nvPicPr>
+        <p:blipFill>
+          <a:blip r:embed="rId3"/>
+          <a:stretch>
+            <a:fillRect/>
+          </a:stretch>
+        </p:blipFill>
         <p:spPr>
           <a:xfrm>
-            <a:off x="2349218" y="2804384"/>
-            <a:ext cx="1934574" cy="1001333"/>
-          </a:xfrm>
-          <a:prstGeom prst="ellipse">
-            <a:avLst/>
-          </a:prstGeom>
-        </p:spPr>
-        <p:style>
-          <a:lnRef idx="3">
-            <a:schemeClr val="lt1"/>
-          </a:lnRef>
-          <a:fillRef idx="1">
-            <a:schemeClr val="accent5"/>
-          </a:fillRef>
-          <a:effectRef idx="1">
-            <a:schemeClr val="accent5"/>
-          </a:effectRef>
-          <a:fontRef idx="minor">
-            <a:schemeClr val="lt1"/>
-          </a:fontRef>
-        </p:style>
-        <p:txBody>
-          <a:bodyPr rtlCol="0" anchor="ctr"/>
-          <a:lstStyle/>
-          <a:p>
-            <a:pPr algn="ctr"/>
-            <a:r>
-              <a:rPr lang="en-US" sz="2400" smtClean="0"/>
-              <a:t>Soekarno</a:t>
-            </a:r>
-            <a:endParaRPr lang="en-US"/>
-          </a:p>
-        </p:txBody>
-      </p:sp>
-      <p:cxnSp>
-        <p:nvCxnSpPr>
-          <p:cNvPr id="10" name="Straight Arrow Connector 9"/>
-          <p:cNvCxnSpPr>
-            <a:stCxn id="4" idx="6"/>
-            <a:endCxn id="15" idx="2"/>
-          </p:cNvCxnSpPr>
-          <p:nvPr/>
-        </p:nvCxnSpPr>
-        <p:spPr>
-          <a:xfrm flipV="1">
-            <a:off x="4283792" y="3003879"/>
-            <a:ext cx="3192405" cy="301172"/>
-          </a:xfrm>
-          <a:prstGeom prst="straightConnector1">
-            <a:avLst/>
-          </a:prstGeom>
-          <a:ln>
-            <a:tailEnd type="triangle"/>
-          </a:ln>
-        </p:spPr>
-        <p:style>
-          <a:lnRef idx="1">
-            <a:schemeClr val="accent1"/>
-          </a:lnRef>
-          <a:fillRef idx="0">
-            <a:schemeClr val="accent1"/>
-          </a:fillRef>
-          <a:effectRef idx="0">
-            <a:schemeClr val="accent1"/>
-          </a:effectRef>
-          <a:fontRef idx="minor">
-            <a:schemeClr val="tx1"/>
-          </a:fontRef>
-        </p:style>
-      </p:cxnSp>
-      <p:sp>
-        <p:nvSpPr>
-          <p:cNvPr id="11" name="Rectangle 10"/>
-          <p:cNvSpPr/>
-          <p:nvPr/>
-        </p:nvSpPr>
-        <p:spPr>
-          <a:xfrm rot="21340905">
-            <a:off x="4919529" y="3027097"/>
-            <a:ext cx="1536460" cy="283333"/>
+            <a:off x="2678333" y="1818061"/>
+            <a:ext cx="6736274" cy="4256622"/>
           </a:xfrm>
           <a:prstGeom prst="rect">
             <a:avLst/>
           </a:prstGeom>
         </p:spPr>
-        <p:style>
-          <a:lnRef idx="2">
-            <a:schemeClr val="accent1">
-              <a:shade val="50000"/>
-            </a:schemeClr>
-          </a:lnRef>
-          <a:fillRef idx="1">
-            <a:schemeClr val="accent1"/>
-          </a:fillRef>
-          <a:effectRef idx="0">
-            <a:schemeClr val="accent1"/>
-          </a:effectRef>
-          <a:fontRef idx="minor">
-            <a:schemeClr val="lt1"/>
-          </a:fontRef>
-        </p:style>
-        <p:txBody>
-          <a:bodyPr rtlCol="0" anchor="ctr"/>
-          <a:lstStyle/>
-          <a:p>
-            <a:pPr algn="ctr"/>
-            <a:r>
-              <a:rPr lang="en-US" smtClean="0"/>
-              <a:t>hasSpouse</a:t>
-            </a:r>
-            <a:endParaRPr lang="en-US"/>
-          </a:p>
-        </p:txBody>
-      </p:sp>
-      <p:sp>
-        <p:nvSpPr>
-          <p:cNvPr id="15" name="Oval 14"/>
-          <p:cNvSpPr/>
-          <p:nvPr/>
-        </p:nvSpPr>
-        <p:spPr>
-          <a:xfrm>
-            <a:off x="7476197" y="2503212"/>
-            <a:ext cx="1934574" cy="1001333"/>
-          </a:xfrm>
-          <a:prstGeom prst="ellipse">
-            <a:avLst/>
-          </a:prstGeom>
-        </p:spPr>
-        <p:style>
-          <a:lnRef idx="3">
-            <a:schemeClr val="lt1"/>
-          </a:lnRef>
-          <a:fillRef idx="1">
-            <a:schemeClr val="accent5"/>
-          </a:fillRef>
-          <a:effectRef idx="1">
-            <a:schemeClr val="accent5"/>
-          </a:effectRef>
-          <a:fontRef idx="minor">
-            <a:schemeClr val="lt1"/>
-          </a:fontRef>
-        </p:style>
-        <p:txBody>
-          <a:bodyPr rtlCol="0" anchor="ctr"/>
-          <a:lstStyle/>
-          <a:p>
-            <a:pPr algn="ctr"/>
-            <a:r>
-              <a:rPr lang="en-US" sz="2000" smtClean="0"/>
-              <a:t>Fatmawati</a:t>
-            </a:r>
-            <a:endParaRPr lang="en-US" sz="1600"/>
-          </a:p>
-        </p:txBody>
-      </p:sp>
-      <p:sp>
-        <p:nvSpPr>
-          <p:cNvPr id="17" name="Oval 16"/>
-          <p:cNvSpPr/>
-          <p:nvPr/>
-        </p:nvSpPr>
-        <p:spPr>
-          <a:xfrm>
-            <a:off x="5645276" y="4817211"/>
-            <a:ext cx="2352503" cy="1001333"/>
-          </a:xfrm>
-          <a:prstGeom prst="ellipse">
-            <a:avLst/>
-          </a:prstGeom>
-        </p:spPr>
-        <p:style>
-          <a:lnRef idx="3">
-            <a:schemeClr val="lt1"/>
-          </a:lnRef>
-          <a:fillRef idx="1">
-            <a:schemeClr val="accent5"/>
-          </a:fillRef>
-          <a:effectRef idx="1">
-            <a:schemeClr val="accent5"/>
-          </a:effectRef>
-          <a:fontRef idx="minor">
-            <a:schemeClr val="lt1"/>
-          </a:fontRef>
-        </p:style>
-        <p:txBody>
-          <a:bodyPr rtlCol="0" anchor="ctr"/>
-          <a:lstStyle/>
-          <a:p>
-            <a:pPr algn="ctr"/>
-            <a:r>
-              <a:rPr lang="en-US" sz="2000" smtClean="0"/>
-              <a:t>Megawati Soekarnoputri</a:t>
-            </a:r>
-            <a:endParaRPr lang="en-US" sz="1600"/>
-          </a:p>
-        </p:txBody>
-      </p:sp>
-      <p:cxnSp>
-        <p:nvCxnSpPr>
-          <p:cNvPr id="22" name="Straight Arrow Connector 21"/>
-          <p:cNvCxnSpPr>
-            <a:stCxn id="4" idx="6"/>
-            <a:endCxn id="17" idx="0"/>
-          </p:cNvCxnSpPr>
-          <p:nvPr/>
-        </p:nvCxnSpPr>
-        <p:spPr>
-          <a:xfrm>
-            <a:off x="4283792" y="3305051"/>
-            <a:ext cx="2537736" cy="1512160"/>
-          </a:xfrm>
-          <a:prstGeom prst="straightConnector1">
-            <a:avLst/>
-          </a:prstGeom>
-          <a:ln>
-            <a:tailEnd type="triangle"/>
-          </a:ln>
-        </p:spPr>
-        <p:style>
-          <a:lnRef idx="1">
-            <a:schemeClr val="accent1"/>
-          </a:lnRef>
-          <a:fillRef idx="0">
-            <a:schemeClr val="accent1"/>
-          </a:fillRef>
-          <a:effectRef idx="0">
-            <a:schemeClr val="accent1"/>
-          </a:effectRef>
-          <a:fontRef idx="minor">
-            <a:schemeClr val="tx1"/>
-          </a:fontRef>
-        </p:style>
-      </p:cxnSp>
-      <p:sp>
-        <p:nvSpPr>
-          <p:cNvPr id="23" name="Rectangle 22"/>
-          <p:cNvSpPr/>
-          <p:nvPr/>
-        </p:nvSpPr>
-        <p:spPr>
-          <a:xfrm rot="1769320">
-            <a:off x="4784429" y="3951734"/>
-            <a:ext cx="1536460" cy="283333"/>
-          </a:xfrm>
-          <a:prstGeom prst="rect">
-            <a:avLst/>
-          </a:prstGeom>
-        </p:spPr>
-        <p:style>
-          <a:lnRef idx="2">
-            <a:schemeClr val="accent1">
-              <a:shade val="50000"/>
-            </a:schemeClr>
-          </a:lnRef>
-          <a:fillRef idx="1">
-            <a:schemeClr val="accent1"/>
-          </a:fillRef>
-          <a:effectRef idx="0">
-            <a:schemeClr val="accent1"/>
-          </a:effectRef>
-          <a:fontRef idx="minor">
-            <a:schemeClr val="lt1"/>
-          </a:fontRef>
-        </p:style>
-        <p:txBody>
-          <a:bodyPr rtlCol="0" anchor="ctr"/>
-          <a:lstStyle/>
-          <a:p>
-            <a:pPr algn="ctr"/>
-            <a:r>
-              <a:rPr lang="en-US" smtClean="0"/>
-              <a:t>hasChild</a:t>
-            </a:r>
-            <a:endParaRPr lang="en-US"/>
-          </a:p>
-        </p:txBody>
-      </p:sp>
-      <p:cxnSp>
-        <p:nvCxnSpPr>
-          <p:cNvPr id="26" name="Straight Arrow Connector 25"/>
-          <p:cNvCxnSpPr>
-            <a:stCxn id="17" idx="1"/>
-            <a:endCxn id="4" idx="5"/>
-          </p:cNvCxnSpPr>
-          <p:nvPr/>
-        </p:nvCxnSpPr>
-        <p:spPr>
-          <a:xfrm flipH="1" flipV="1">
-            <a:off x="4000480" y="3659075"/>
-            <a:ext cx="1989312" cy="1304778"/>
-          </a:xfrm>
-          <a:prstGeom prst="straightConnector1">
-            <a:avLst/>
-          </a:prstGeom>
-          <a:ln>
-            <a:tailEnd type="triangle"/>
-          </a:ln>
-        </p:spPr>
-        <p:style>
-          <a:lnRef idx="1">
-            <a:schemeClr val="accent1"/>
-          </a:lnRef>
-          <a:fillRef idx="0">
-            <a:schemeClr val="accent1"/>
-          </a:fillRef>
-          <a:effectRef idx="0">
-            <a:schemeClr val="accent1"/>
-          </a:effectRef>
-          <a:fontRef idx="minor">
-            <a:schemeClr val="tx1"/>
-          </a:fontRef>
-        </p:style>
-      </p:cxnSp>
-      <p:sp>
-        <p:nvSpPr>
-          <p:cNvPr id="30" name="Rectangle 29"/>
-          <p:cNvSpPr/>
-          <p:nvPr/>
-        </p:nvSpPr>
-        <p:spPr>
-          <a:xfrm rot="1979267">
-            <a:off x="4218913" y="4163061"/>
-            <a:ext cx="1536460" cy="283333"/>
-          </a:xfrm>
-          <a:prstGeom prst="rect">
-            <a:avLst/>
-          </a:prstGeom>
-        </p:spPr>
-        <p:style>
-          <a:lnRef idx="2">
-            <a:schemeClr val="accent1">
-              <a:shade val="50000"/>
-            </a:schemeClr>
-          </a:lnRef>
-          <a:fillRef idx="1">
-            <a:schemeClr val="accent1"/>
-          </a:fillRef>
-          <a:effectRef idx="0">
-            <a:schemeClr val="accent1"/>
-          </a:effectRef>
-          <a:fontRef idx="minor">
-            <a:schemeClr val="lt1"/>
-          </a:fontRef>
-        </p:style>
-        <p:txBody>
-          <a:bodyPr rtlCol="0" anchor="ctr"/>
-          <a:lstStyle/>
-          <a:p>
-            <a:pPr algn="ctr"/>
-            <a:r>
-              <a:rPr lang="en-US" smtClean="0"/>
-              <a:t>hasParent</a:t>
-            </a:r>
-            <a:endParaRPr lang="en-US"/>
-          </a:p>
-        </p:txBody>
-      </p:sp>
-      <p:cxnSp>
-        <p:nvCxnSpPr>
-          <p:cNvPr id="33" name="Straight Arrow Connector 32"/>
-          <p:cNvCxnSpPr>
-            <a:stCxn id="15" idx="1"/>
-            <a:endCxn id="4" idx="7"/>
-          </p:cNvCxnSpPr>
-          <p:nvPr/>
-        </p:nvCxnSpPr>
-        <p:spPr>
-          <a:xfrm flipH="1">
-            <a:off x="4000480" y="2649854"/>
-            <a:ext cx="3759029" cy="301172"/>
-          </a:xfrm>
-          <a:prstGeom prst="straightConnector1">
-            <a:avLst/>
-          </a:prstGeom>
-          <a:ln>
-            <a:tailEnd type="triangle"/>
-          </a:ln>
-        </p:spPr>
-        <p:style>
-          <a:lnRef idx="1">
-            <a:schemeClr val="accent1"/>
-          </a:lnRef>
-          <a:fillRef idx="0">
-            <a:schemeClr val="accent1"/>
-          </a:fillRef>
-          <a:effectRef idx="0">
-            <a:schemeClr val="accent1"/>
-          </a:effectRef>
-          <a:fontRef idx="minor">
-            <a:schemeClr val="tx1"/>
-          </a:fontRef>
-        </p:style>
-      </p:cxnSp>
-      <p:sp>
-        <p:nvSpPr>
-          <p:cNvPr id="38" name="Rectangle 37"/>
-          <p:cNvSpPr/>
-          <p:nvPr/>
-        </p:nvSpPr>
-        <p:spPr>
-          <a:xfrm rot="21340905">
-            <a:off x="4917679" y="2691850"/>
-            <a:ext cx="1536460" cy="283333"/>
-          </a:xfrm>
-          <a:prstGeom prst="rect">
-            <a:avLst/>
-          </a:prstGeom>
-        </p:spPr>
-        <p:style>
-          <a:lnRef idx="2">
-            <a:schemeClr val="accent1">
-              <a:shade val="50000"/>
-            </a:schemeClr>
-          </a:lnRef>
-          <a:fillRef idx="1">
-            <a:schemeClr val="accent1"/>
-          </a:fillRef>
-          <a:effectRef idx="0">
-            <a:schemeClr val="accent1"/>
-          </a:effectRef>
-          <a:fontRef idx="minor">
-            <a:schemeClr val="lt1"/>
-          </a:fontRef>
-        </p:style>
-        <p:txBody>
-          <a:bodyPr rtlCol="0" anchor="ctr"/>
-          <a:lstStyle/>
-          <a:p>
-            <a:pPr algn="ctr"/>
-            <a:r>
-              <a:rPr lang="en-US" smtClean="0"/>
-              <a:t>hasSpouse</a:t>
-            </a:r>
-            <a:endParaRPr lang="en-US"/>
-          </a:p>
-        </p:txBody>
-      </p:sp>
+      </p:pic>
     </p:spTree>
     <p:extLst>
       <p:ext uri="{BB962C8B-B14F-4D97-AF65-F5344CB8AC3E}">
@@ -37673,39 +36199,6 @@
       </p:sp>
       <p:sp>
         <p:nvSpPr>
-          <p:cNvPr id="2" name="Content Placeholder 1"/>
-          <p:cNvSpPr>
-            <a:spLocks noGrp="1"/>
-          </p:cNvSpPr>
-          <p:nvPr>
-            <p:ph idx="1"/>
-          </p:nvPr>
-        </p:nvSpPr>
-        <p:spPr>
-          <a:xfrm>
-            <a:off x="538960" y="1437005"/>
-            <a:ext cx="10824736" cy="5018734"/>
-          </a:xfrm>
-        </p:spPr>
-        <p:txBody>
-          <a:bodyPr/>
-          <a:lstStyle/>
-          <a:p>
-            <a:pPr marL="0" lvl="0" indent="0">
-              <a:buNone/>
-            </a:pPr>
-            <a:endParaRPr lang="en-US" sz="2800" dirty="0" smtClean="0"/>
-          </a:p>
-          <a:p>
-            <a:pPr marL="0" lvl="0" indent="0">
-              <a:buNone/>
-            </a:pPr>
-            <a:endParaRPr lang="en-US" sz="2800" dirty="0" smtClean="0"/>
-          </a:p>
-        </p:txBody>
-      </p:sp>
-      <p:sp>
-        <p:nvSpPr>
           <p:cNvPr id="3" name="Slide Number Placeholder 2"/>
           <p:cNvSpPr>
             <a:spLocks noGrp="1"/>
@@ -37725,696 +36218,6 @@
               <a:t>9</a:t>
             </a:fld>
             <a:endParaRPr lang="en-US" noProof="0" dirty="0"/>
-          </a:p>
-        </p:txBody>
-      </p:sp>
-      <p:sp>
-        <p:nvSpPr>
-          <p:cNvPr id="4" name="Oval 3"/>
-          <p:cNvSpPr/>
-          <p:nvPr/>
-        </p:nvSpPr>
-        <p:spPr>
-          <a:xfrm>
-            <a:off x="244500" y="2804384"/>
-            <a:ext cx="4039292" cy="1001333"/>
-          </a:xfrm>
-          <a:prstGeom prst="ellipse">
-            <a:avLst/>
-          </a:prstGeom>
-        </p:spPr>
-        <p:style>
-          <a:lnRef idx="3">
-            <a:schemeClr val="lt1"/>
-          </a:lnRef>
-          <a:fillRef idx="1">
-            <a:schemeClr val="accent5"/>
-          </a:fillRef>
-          <a:effectRef idx="1">
-            <a:schemeClr val="accent5"/>
-          </a:effectRef>
-          <a:fontRef idx="minor">
-            <a:schemeClr val="lt1"/>
-          </a:fontRef>
-        </p:style>
-        <p:txBody>
-          <a:bodyPr rtlCol="0" anchor="ctr"/>
-          <a:lstStyle/>
-          <a:p>
-            <a:pPr algn="ctr"/>
-            <a:r>
-              <a:rPr lang="en-US" sz="2400">
-                <a:solidFill>
-                  <a:schemeClr val="bg1"/>
-                </a:solidFill>
-              </a:rPr>
-              <a:t>http</a:t>
-            </a:r>
-            <a:r>
-              <a:rPr lang="en-US" sz="2400" smtClean="0">
-                <a:solidFill>
-                  <a:schemeClr val="bg1"/>
-                </a:solidFill>
-              </a:rPr>
-              <a:t>://id.dbpedia.org/resource/Soekarno</a:t>
-            </a:r>
-            <a:endParaRPr lang="en-US">
-              <a:solidFill>
-                <a:schemeClr val="bg1"/>
-              </a:solidFill>
-            </a:endParaRPr>
-          </a:p>
-        </p:txBody>
-      </p:sp>
-      <p:cxnSp>
-        <p:nvCxnSpPr>
-          <p:cNvPr id="10" name="Straight Arrow Connector 9"/>
-          <p:cNvCxnSpPr>
-            <a:stCxn id="4" idx="6"/>
-            <a:endCxn id="15" idx="2"/>
-          </p:cNvCxnSpPr>
-          <p:nvPr/>
-        </p:nvCxnSpPr>
-        <p:spPr>
-          <a:xfrm flipV="1">
-            <a:off x="4283792" y="3003879"/>
-            <a:ext cx="3192405" cy="301172"/>
-          </a:xfrm>
-          <a:prstGeom prst="straightConnector1">
-            <a:avLst/>
-          </a:prstGeom>
-          <a:ln>
-            <a:tailEnd type="triangle"/>
-          </a:ln>
-        </p:spPr>
-        <p:style>
-          <a:lnRef idx="1">
-            <a:schemeClr val="accent1"/>
-          </a:lnRef>
-          <a:fillRef idx="0">
-            <a:schemeClr val="accent1"/>
-          </a:fillRef>
-          <a:effectRef idx="0">
-            <a:schemeClr val="accent1"/>
-          </a:effectRef>
-          <a:fontRef idx="minor">
-            <a:schemeClr val="tx1"/>
-          </a:fontRef>
-        </p:style>
-      </p:cxnSp>
-      <p:sp>
-        <p:nvSpPr>
-          <p:cNvPr id="11" name="Rectangle 10"/>
-          <p:cNvSpPr/>
-          <p:nvPr/>
-        </p:nvSpPr>
-        <p:spPr>
-          <a:xfrm rot="21340905">
-            <a:off x="4919529" y="3027097"/>
-            <a:ext cx="1536460" cy="283333"/>
-          </a:xfrm>
-          <a:prstGeom prst="rect">
-            <a:avLst/>
-          </a:prstGeom>
-        </p:spPr>
-        <p:style>
-          <a:lnRef idx="2">
-            <a:schemeClr val="accent1">
-              <a:shade val="50000"/>
-            </a:schemeClr>
-          </a:lnRef>
-          <a:fillRef idx="1">
-            <a:schemeClr val="accent1"/>
-          </a:fillRef>
-          <a:effectRef idx="0">
-            <a:schemeClr val="accent1"/>
-          </a:effectRef>
-          <a:fontRef idx="minor">
-            <a:schemeClr val="lt1"/>
-          </a:fontRef>
-        </p:style>
-        <p:txBody>
-          <a:bodyPr rtlCol="0" anchor="ctr"/>
-          <a:lstStyle/>
-          <a:p>
-            <a:pPr algn="ctr"/>
-            <a:r>
-              <a:rPr lang="en-US" smtClean="0"/>
-              <a:t>hasSpouse</a:t>
-            </a:r>
-            <a:endParaRPr lang="en-US"/>
-          </a:p>
-        </p:txBody>
-      </p:sp>
-      <p:sp>
-        <p:nvSpPr>
-          <p:cNvPr id="15" name="Oval 14"/>
-          <p:cNvSpPr/>
-          <p:nvPr/>
-        </p:nvSpPr>
-        <p:spPr>
-          <a:xfrm>
-            <a:off x="7476197" y="2503212"/>
-            <a:ext cx="3506600" cy="1001333"/>
-          </a:xfrm>
-          <a:prstGeom prst="ellipse">
-            <a:avLst/>
-          </a:prstGeom>
-        </p:spPr>
-        <p:style>
-          <a:lnRef idx="3">
-            <a:schemeClr val="lt1"/>
-          </a:lnRef>
-          <a:fillRef idx="1">
-            <a:schemeClr val="accent5"/>
-          </a:fillRef>
-          <a:effectRef idx="1">
-            <a:schemeClr val="accent5"/>
-          </a:effectRef>
-          <a:fontRef idx="minor">
-            <a:schemeClr val="lt1"/>
-          </a:fontRef>
-        </p:style>
-        <p:txBody>
-          <a:bodyPr rtlCol="0" anchor="ctr"/>
-          <a:lstStyle/>
-          <a:p>
-            <a:pPr algn="ctr"/>
-            <a:r>
-              <a:rPr lang="en-US" sz="2000">
-                <a:solidFill>
-                  <a:schemeClr val="bg1"/>
-                </a:solidFill>
-              </a:rPr>
-              <a:t>http</a:t>
-            </a:r>
-            <a:r>
-              <a:rPr lang="en-US" sz="2000">
-                <a:solidFill>
-                  <a:schemeClr val="bg1"/>
-                </a:solidFill>
-              </a:rPr>
-              <a:t>://</a:t>
-            </a:r>
-            <a:r>
-              <a:rPr lang="en-US" sz="2000" smtClean="0">
-                <a:solidFill>
-                  <a:schemeClr val="bg1"/>
-                </a:solidFill>
-              </a:rPr>
-              <a:t>id.dbpedia.org/resource/Fatmawati</a:t>
-            </a:r>
-            <a:endParaRPr lang="en-US" sz="2000">
-              <a:solidFill>
-                <a:schemeClr val="bg1"/>
-              </a:solidFill>
-            </a:endParaRPr>
-          </a:p>
-        </p:txBody>
-      </p:sp>
-      <p:sp>
-        <p:nvSpPr>
-          <p:cNvPr id="17" name="Oval 16"/>
-          <p:cNvSpPr/>
-          <p:nvPr/>
-        </p:nvSpPr>
-        <p:spPr>
-          <a:xfrm>
-            <a:off x="5645277" y="4817211"/>
-            <a:ext cx="5108582" cy="1001333"/>
-          </a:xfrm>
-          <a:prstGeom prst="ellipse">
-            <a:avLst/>
-          </a:prstGeom>
-        </p:spPr>
-        <p:style>
-          <a:lnRef idx="3">
-            <a:schemeClr val="lt1"/>
-          </a:lnRef>
-          <a:fillRef idx="1">
-            <a:schemeClr val="accent5"/>
-          </a:fillRef>
-          <a:effectRef idx="1">
-            <a:schemeClr val="accent5"/>
-          </a:effectRef>
-          <a:fontRef idx="minor">
-            <a:schemeClr val="lt1"/>
-          </a:fontRef>
-        </p:style>
-        <p:txBody>
-          <a:bodyPr rtlCol="0" anchor="ctr"/>
-          <a:lstStyle/>
-          <a:p>
-            <a:pPr algn="ctr"/>
-            <a:r>
-              <a:rPr lang="en-US" sz="2000">
-                <a:solidFill>
-                  <a:schemeClr val="bg1"/>
-                </a:solidFill>
-              </a:rPr>
-              <a:t>http</a:t>
-            </a:r>
-            <a:r>
-              <a:rPr lang="en-US" sz="2000">
-                <a:solidFill>
-                  <a:schemeClr val="bg1"/>
-                </a:solidFill>
-              </a:rPr>
-              <a:t>://</a:t>
-            </a:r>
-            <a:r>
-              <a:rPr lang="en-US" sz="2000" smtClean="0">
-                <a:solidFill>
-                  <a:schemeClr val="bg1"/>
-                </a:solidFill>
-              </a:rPr>
-              <a:t>id.dbpedia.org/resource/Megawati_Soekarnoputri</a:t>
-            </a:r>
-            <a:endParaRPr lang="en-US" sz="2000">
-              <a:solidFill>
-                <a:schemeClr val="bg1"/>
-              </a:solidFill>
-            </a:endParaRPr>
-          </a:p>
-        </p:txBody>
-      </p:sp>
-      <p:cxnSp>
-        <p:nvCxnSpPr>
-          <p:cNvPr id="22" name="Straight Arrow Connector 21"/>
-          <p:cNvCxnSpPr>
-            <a:stCxn id="4" idx="6"/>
-            <a:endCxn id="17" idx="0"/>
-          </p:cNvCxnSpPr>
-          <p:nvPr/>
-        </p:nvCxnSpPr>
-        <p:spPr>
-          <a:xfrm>
-            <a:off x="4283792" y="3305051"/>
-            <a:ext cx="3915776" cy="1512160"/>
-          </a:xfrm>
-          <a:prstGeom prst="straightConnector1">
-            <a:avLst/>
-          </a:prstGeom>
-          <a:ln>
-            <a:tailEnd type="triangle"/>
-          </a:ln>
-        </p:spPr>
-        <p:style>
-          <a:lnRef idx="1">
-            <a:schemeClr val="accent1"/>
-          </a:lnRef>
-          <a:fillRef idx="0">
-            <a:schemeClr val="accent1"/>
-          </a:fillRef>
-          <a:effectRef idx="0">
-            <a:schemeClr val="accent1"/>
-          </a:effectRef>
-          <a:fontRef idx="minor">
-            <a:schemeClr val="tx1"/>
-          </a:fontRef>
-        </p:style>
-      </p:cxnSp>
-      <p:sp>
-        <p:nvSpPr>
-          <p:cNvPr id="23" name="Rectangle 22"/>
-          <p:cNvSpPr/>
-          <p:nvPr/>
-        </p:nvSpPr>
-        <p:spPr>
-          <a:xfrm rot="1244857">
-            <a:off x="5563445" y="3979716"/>
-            <a:ext cx="1536460" cy="283333"/>
-          </a:xfrm>
-          <a:prstGeom prst="rect">
-            <a:avLst/>
-          </a:prstGeom>
-        </p:spPr>
-        <p:style>
-          <a:lnRef idx="2">
-            <a:schemeClr val="accent1">
-              <a:shade val="50000"/>
-            </a:schemeClr>
-          </a:lnRef>
-          <a:fillRef idx="1">
-            <a:schemeClr val="accent1"/>
-          </a:fillRef>
-          <a:effectRef idx="0">
-            <a:schemeClr val="accent1"/>
-          </a:effectRef>
-          <a:fontRef idx="minor">
-            <a:schemeClr val="lt1"/>
-          </a:fontRef>
-        </p:style>
-        <p:txBody>
-          <a:bodyPr rtlCol="0" anchor="ctr"/>
-          <a:lstStyle/>
-          <a:p>
-            <a:pPr algn="ctr"/>
-            <a:r>
-              <a:rPr lang="en-US" smtClean="0"/>
-              <a:t>hasChild</a:t>
-            </a:r>
-            <a:endParaRPr lang="en-US"/>
-          </a:p>
-        </p:txBody>
-      </p:sp>
-      <p:cxnSp>
-        <p:nvCxnSpPr>
-          <p:cNvPr id="26" name="Straight Arrow Connector 25"/>
-          <p:cNvCxnSpPr>
-            <a:stCxn id="17" idx="1"/>
-            <a:endCxn id="4" idx="5"/>
-          </p:cNvCxnSpPr>
-          <p:nvPr/>
-        </p:nvCxnSpPr>
-        <p:spPr>
-          <a:xfrm flipH="1" flipV="1">
-            <a:off x="3692251" y="3659075"/>
-            <a:ext cx="2701161" cy="1304778"/>
-          </a:xfrm>
-          <a:prstGeom prst="straightConnector1">
-            <a:avLst/>
-          </a:prstGeom>
-          <a:ln>
-            <a:tailEnd type="triangle"/>
-          </a:ln>
-        </p:spPr>
-        <p:style>
-          <a:lnRef idx="1">
-            <a:schemeClr val="accent1"/>
-          </a:lnRef>
-          <a:fillRef idx="0">
-            <a:schemeClr val="accent1"/>
-          </a:fillRef>
-          <a:effectRef idx="0">
-            <a:schemeClr val="accent1"/>
-          </a:effectRef>
-          <a:fontRef idx="minor">
-            <a:schemeClr val="tx1"/>
-          </a:fontRef>
-        </p:style>
-      </p:cxnSp>
-      <p:sp>
-        <p:nvSpPr>
-          <p:cNvPr id="30" name="Rectangle 29"/>
-          <p:cNvSpPr/>
-          <p:nvPr/>
-        </p:nvSpPr>
-        <p:spPr>
-          <a:xfrm rot="1517976">
-            <a:off x="4218913" y="4163061"/>
-            <a:ext cx="1536460" cy="283333"/>
-          </a:xfrm>
-          <a:prstGeom prst="rect">
-            <a:avLst/>
-          </a:prstGeom>
-        </p:spPr>
-        <p:style>
-          <a:lnRef idx="2">
-            <a:schemeClr val="accent1">
-              <a:shade val="50000"/>
-            </a:schemeClr>
-          </a:lnRef>
-          <a:fillRef idx="1">
-            <a:schemeClr val="accent1"/>
-          </a:fillRef>
-          <a:effectRef idx="0">
-            <a:schemeClr val="accent1"/>
-          </a:effectRef>
-          <a:fontRef idx="minor">
-            <a:schemeClr val="lt1"/>
-          </a:fontRef>
-        </p:style>
-        <p:txBody>
-          <a:bodyPr rtlCol="0" anchor="ctr"/>
-          <a:lstStyle/>
-          <a:p>
-            <a:pPr algn="ctr"/>
-            <a:r>
-              <a:rPr lang="en-US" smtClean="0"/>
-              <a:t>hasParent</a:t>
-            </a:r>
-            <a:endParaRPr lang="en-US"/>
-          </a:p>
-        </p:txBody>
-      </p:sp>
-      <p:cxnSp>
-        <p:nvCxnSpPr>
-          <p:cNvPr id="33" name="Straight Arrow Connector 32"/>
-          <p:cNvCxnSpPr>
-            <a:stCxn id="15" idx="1"/>
-            <a:endCxn id="4" idx="7"/>
-          </p:cNvCxnSpPr>
-          <p:nvPr/>
-        </p:nvCxnSpPr>
-        <p:spPr>
-          <a:xfrm flipH="1">
-            <a:off x="3692251" y="2649854"/>
-            <a:ext cx="4297476" cy="301172"/>
-          </a:xfrm>
-          <a:prstGeom prst="straightConnector1">
-            <a:avLst/>
-          </a:prstGeom>
-          <a:ln>
-            <a:tailEnd type="triangle"/>
-          </a:ln>
-        </p:spPr>
-        <p:style>
-          <a:lnRef idx="1">
-            <a:schemeClr val="accent1"/>
-          </a:lnRef>
-          <a:fillRef idx="0">
-            <a:schemeClr val="accent1"/>
-          </a:fillRef>
-          <a:effectRef idx="0">
-            <a:schemeClr val="accent1"/>
-          </a:effectRef>
-          <a:fontRef idx="minor">
-            <a:schemeClr val="tx1"/>
-          </a:fontRef>
-        </p:style>
-      </p:cxnSp>
-      <p:sp>
-        <p:nvSpPr>
-          <p:cNvPr id="38" name="Rectangle 37"/>
-          <p:cNvSpPr/>
-          <p:nvPr/>
-        </p:nvSpPr>
-        <p:spPr>
-          <a:xfrm rot="21340905">
-            <a:off x="4917679" y="2691850"/>
-            <a:ext cx="1536460" cy="283333"/>
-          </a:xfrm>
-          <a:prstGeom prst="rect">
-            <a:avLst/>
-          </a:prstGeom>
-        </p:spPr>
-        <p:style>
-          <a:lnRef idx="2">
-            <a:schemeClr val="accent1">
-              <a:shade val="50000"/>
-            </a:schemeClr>
-          </a:lnRef>
-          <a:fillRef idx="1">
-            <a:schemeClr val="accent1"/>
-          </a:fillRef>
-          <a:effectRef idx="0">
-            <a:schemeClr val="accent1"/>
-          </a:effectRef>
-          <a:fontRef idx="minor">
-            <a:schemeClr val="lt1"/>
-          </a:fontRef>
-        </p:style>
-        <p:txBody>
-          <a:bodyPr rtlCol="0" anchor="ctr"/>
-          <a:lstStyle/>
-          <a:p>
-            <a:pPr algn="ctr"/>
-            <a:r>
-              <a:rPr lang="en-US" smtClean="0"/>
-              <a:t>hasSpouse</a:t>
-            </a:r>
-            <a:endParaRPr lang="en-US"/>
-          </a:p>
-        </p:txBody>
-      </p:sp>
-      <p:sp>
-        <p:nvSpPr>
-          <p:cNvPr id="24" name="Rounded Rectangle 23"/>
-          <p:cNvSpPr/>
-          <p:nvPr/>
-        </p:nvSpPr>
-        <p:spPr>
-          <a:xfrm>
-            <a:off x="1037394" y="2327324"/>
-            <a:ext cx="2148072" cy="301172"/>
-          </a:xfrm>
-          <a:prstGeom prst="roundRect">
-            <a:avLst/>
-          </a:prstGeom>
-          <a:solidFill>
-            <a:srgbClr val="92D050"/>
-          </a:solidFill>
-          <a:ln>
-            <a:solidFill>
-              <a:srgbClr val="00B050"/>
-            </a:solidFill>
-          </a:ln>
-        </p:spPr>
-        <p:style>
-          <a:lnRef idx="2">
-            <a:schemeClr val="accent1">
-              <a:shade val="50000"/>
-            </a:schemeClr>
-          </a:lnRef>
-          <a:fillRef idx="1">
-            <a:schemeClr val="accent1"/>
-          </a:fillRef>
-          <a:effectRef idx="0">
-            <a:schemeClr val="accent1"/>
-          </a:effectRef>
-          <a:fontRef idx="minor">
-            <a:schemeClr val="lt1"/>
-          </a:fontRef>
-        </p:style>
-        <p:txBody>
-          <a:bodyPr rtlCol="0" anchor="ctr"/>
-          <a:lstStyle/>
-          <a:p>
-            <a:pPr algn="ctr"/>
-            <a:r>
-              <a:rPr lang="en-US" smtClean="0">
-                <a:solidFill>
-                  <a:schemeClr val="tx1"/>
-                </a:solidFill>
-              </a:rPr>
-              <a:t>Label : “Soekarno”</a:t>
-            </a:r>
-            <a:endParaRPr lang="en-US">
-              <a:solidFill>
-                <a:schemeClr val="tx1"/>
-              </a:solidFill>
-            </a:endParaRPr>
-          </a:p>
-        </p:txBody>
-      </p:sp>
-      <p:sp>
-        <p:nvSpPr>
-          <p:cNvPr id="29" name="Rounded Rectangle 28"/>
-          <p:cNvSpPr/>
-          <p:nvPr/>
-        </p:nvSpPr>
-        <p:spPr>
-          <a:xfrm>
-            <a:off x="8155461" y="2055398"/>
-            <a:ext cx="2148072" cy="301172"/>
-          </a:xfrm>
-          <a:prstGeom prst="roundRect">
-            <a:avLst/>
-          </a:prstGeom>
-          <a:solidFill>
-            <a:srgbClr val="92D050"/>
-          </a:solidFill>
-          <a:ln>
-            <a:solidFill>
-              <a:srgbClr val="00B050"/>
-            </a:solidFill>
-          </a:ln>
-        </p:spPr>
-        <p:style>
-          <a:lnRef idx="2">
-            <a:schemeClr val="accent1">
-              <a:shade val="50000"/>
-            </a:schemeClr>
-          </a:lnRef>
-          <a:fillRef idx="1">
-            <a:schemeClr val="accent1"/>
-          </a:fillRef>
-          <a:effectRef idx="0">
-            <a:schemeClr val="accent1"/>
-          </a:effectRef>
-          <a:fontRef idx="minor">
-            <a:schemeClr val="lt1"/>
-          </a:fontRef>
-        </p:style>
-        <p:txBody>
-          <a:bodyPr rtlCol="0" anchor="ctr"/>
-          <a:lstStyle/>
-          <a:p>
-            <a:pPr algn="ctr"/>
-            <a:r>
-              <a:rPr lang="en-US" smtClean="0">
-                <a:solidFill>
-                  <a:schemeClr val="tx1"/>
-                </a:solidFill>
-              </a:rPr>
-              <a:t>Label : “Fatmawati”</a:t>
-            </a:r>
-            <a:endParaRPr lang="en-US">
-              <a:solidFill>
-                <a:schemeClr val="tx1"/>
-              </a:solidFill>
-            </a:endParaRPr>
-          </a:p>
-        </p:txBody>
-      </p:sp>
-      <p:sp>
-        <p:nvSpPr>
-          <p:cNvPr id="31" name="Rounded Rectangle 30"/>
-          <p:cNvSpPr/>
-          <p:nvPr/>
-        </p:nvSpPr>
-        <p:spPr>
-          <a:xfrm>
-            <a:off x="6384356" y="5920192"/>
-            <a:ext cx="3542210" cy="340945"/>
-          </a:xfrm>
-          <a:prstGeom prst="roundRect">
-            <a:avLst/>
-          </a:prstGeom>
-          <a:solidFill>
-            <a:srgbClr val="92D050"/>
-          </a:solidFill>
-          <a:ln>
-            <a:solidFill>
-              <a:srgbClr val="00B050"/>
-            </a:solidFill>
-          </a:ln>
-        </p:spPr>
-        <p:style>
-          <a:lnRef idx="2">
-            <a:schemeClr val="accent1">
-              <a:shade val="50000"/>
-            </a:schemeClr>
-          </a:lnRef>
-          <a:fillRef idx="1">
-            <a:schemeClr val="accent1"/>
-          </a:fillRef>
-          <a:effectRef idx="0">
-            <a:schemeClr val="accent1"/>
-          </a:effectRef>
-          <a:fontRef idx="minor">
-            <a:schemeClr val="lt1"/>
-          </a:fontRef>
-        </p:style>
-        <p:txBody>
-          <a:bodyPr rtlCol="0" anchor="ctr"/>
-          <a:lstStyle/>
-          <a:p>
-            <a:pPr algn="ctr"/>
-            <a:r>
-              <a:rPr lang="en-US" smtClean="0">
-                <a:solidFill>
-                  <a:schemeClr val="tx1"/>
-                </a:solidFill>
-              </a:rPr>
-              <a:t>Label : “Megawati Soekarnoputri”</a:t>
-            </a:r>
-            <a:endParaRPr lang="en-US">
-              <a:solidFill>
-                <a:schemeClr val="tx1"/>
-              </a:solidFill>
-            </a:endParaRPr>
           </a:p>
         </p:txBody>
       </p:sp>
@@ -38467,6 +36270,146 @@
           </a:p>
         </p:txBody>
       </p:sp>
+      <p:pic>
+        <p:nvPicPr>
+          <p:cNvPr id="7" name="Picture 6"/>
+          <p:cNvPicPr>
+            <a:picLocks noChangeAspect="1"/>
+          </p:cNvPicPr>
+          <p:nvPr/>
+        </p:nvPicPr>
+        <p:blipFill>
+          <a:blip r:embed="rId3"/>
+          <a:stretch>
+            <a:fillRect/>
+          </a:stretch>
+        </p:blipFill>
+        <p:spPr>
+          <a:xfrm>
+            <a:off x="61912" y="1562100"/>
+            <a:ext cx="12068175" cy="3733800"/>
+          </a:xfrm>
+          <a:prstGeom prst="rect">
+            <a:avLst/>
+          </a:prstGeom>
+        </p:spPr>
+      </p:pic>
+      <p:sp>
+        <p:nvSpPr>
+          <p:cNvPr id="8" name="TextBox 7"/>
+          <p:cNvSpPr txBox="1"/>
+          <p:nvPr/>
+        </p:nvSpPr>
+        <p:spPr>
+          <a:xfrm>
+            <a:off x="6834433" y="4232635"/>
+            <a:ext cx="4930219" cy="1477328"/>
+          </a:xfrm>
+          <a:prstGeom prst="rect">
+            <a:avLst/>
+          </a:prstGeom>
+          <a:ln w="76200">
+            <a:solidFill>
+              <a:schemeClr val="tx1"/>
+            </a:solidFill>
+          </a:ln>
+        </p:spPr>
+        <p:style>
+          <a:lnRef idx="2">
+            <a:schemeClr val="accent6"/>
+          </a:lnRef>
+          <a:fillRef idx="1">
+            <a:schemeClr val="lt1"/>
+          </a:fillRef>
+          <a:effectRef idx="0">
+            <a:schemeClr val="accent6"/>
+          </a:effectRef>
+          <a:fontRef idx="minor">
+            <a:schemeClr val="dk1"/>
+          </a:fontRef>
+        </p:style>
+        <p:txBody>
+          <a:bodyPr wrap="square" rtlCol="0">
+            <a:spAutoFit/>
+          </a:bodyPr>
+          <a:lstStyle/>
+          <a:p>
+            <a:r>
+              <a:rPr lang="en-US" smtClean="0"/>
+              <a:t>Keterangan : </a:t>
+            </a:r>
+          </a:p>
+          <a:p>
+            <a:endParaRPr lang="en-US"/>
+          </a:p>
+          <a:p>
+            <a:r>
+              <a:rPr lang="en-US" smtClean="0"/>
+              <a:t>		= Data Property</a:t>
+            </a:r>
+          </a:p>
+          <a:p>
+            <a:endParaRPr lang="en-US" smtClean="0"/>
+          </a:p>
+          <a:p>
+            <a:r>
+              <a:rPr lang="en-US"/>
+              <a:t>	</a:t>
+            </a:r>
+            <a:r>
+              <a:rPr lang="en-US" smtClean="0"/>
+              <a:t>	= Object Property</a:t>
+            </a:r>
+          </a:p>
+        </p:txBody>
+      </p:sp>
+      <p:pic>
+        <p:nvPicPr>
+          <p:cNvPr id="12" name="Picture 11"/>
+          <p:cNvPicPr>
+            <a:picLocks noChangeAspect="1"/>
+          </p:cNvPicPr>
+          <p:nvPr/>
+        </p:nvPicPr>
+        <p:blipFill>
+          <a:blip r:embed="rId4"/>
+          <a:stretch>
+            <a:fillRect/>
+          </a:stretch>
+        </p:blipFill>
+        <p:spPr>
+          <a:xfrm>
+            <a:off x="7225879" y="4724477"/>
+            <a:ext cx="1323975" cy="542925"/>
+          </a:xfrm>
+          <a:prstGeom prst="rect">
+            <a:avLst/>
+          </a:prstGeom>
+        </p:spPr>
+      </p:pic>
+      <p:pic>
+        <p:nvPicPr>
+          <p:cNvPr id="13" name="Picture 12"/>
+          <p:cNvPicPr>
+            <a:picLocks noChangeAspect="1"/>
+          </p:cNvPicPr>
+          <p:nvPr/>
+        </p:nvPicPr>
+        <p:blipFill rotWithShape="1">
+          <a:blip r:embed="rId5"/>
+          <a:srcRect l="33078" t="21395"/>
+          <a:stretch/>
+        </p:blipFill>
+        <p:spPr>
+          <a:xfrm>
+            <a:off x="7086843" y="5378101"/>
+            <a:ext cx="1602045" cy="249661"/>
+          </a:xfrm>
+          <a:prstGeom prst="rect">
+            <a:avLst/>
+          </a:prstGeom>
+        </p:spPr>
+      </p:pic>
     </p:spTree>
     <p:extLst>
       <p:ext uri="{BB962C8B-B14F-4D97-AF65-F5344CB8AC3E}">
@@ -39272,6 +37215,14 @@
 </file>
 
 <file path=customXml/item1.xml><?xml version="1.0" encoding="utf-8"?>
+<p:properties xmlns:p="http://schemas.microsoft.com/office/2006/metadata/properties" xmlns:xsi="http://www.w3.org/2001/XMLSchema-instance" xmlns:pc="http://schemas.microsoft.com/office/infopath/2007/PartnerControls">
+  <documentManagement>
+    <MediaServiceKeyPoints xmlns="71af3243-3dd4-4a8d-8c0d-dd76da1f02a5" xsi:nil="true"/>
+  </documentManagement>
+</p:properties>
+</file>
+
+<file path=customXml/item2.xml><?xml version="1.0" encoding="utf-8"?>
 <ct:contentTypeSchema xmlns:ct="http://schemas.microsoft.com/office/2006/metadata/contentType" xmlns:ma="http://schemas.microsoft.com/office/2006/metadata/properties/metaAttributes" ct:_="" ma:_="" ma:contentTypeName="Document" ma:contentTypeID="0x01010079F111ED35F8CC479449609E8A0923A6" ma:contentTypeVersion="11" ma:contentTypeDescription="Create a new document." ma:contentTypeScope="" ma:versionID="9677210f24a1be23c92c90fd886aa0aa">
   <xsd:schema xmlns:xsd="http://www.w3.org/2001/XMLSchema" xmlns:xs="http://www.w3.org/2001/XMLSchema" xmlns:p="http://schemas.microsoft.com/office/2006/metadata/properties" xmlns:ns2="71af3243-3dd4-4a8d-8c0d-dd76da1f02a5" xmlns:ns3="16c05727-aa75-4e4a-9b5f-8a80a1165891" targetNamespace="http://schemas.microsoft.com/office/2006/metadata/properties" ma:root="true" ma:fieldsID="60e05723c5c1908df1a1a4ebf11d344e" ns2:_="" ns3:_="">
     <xsd:import namespace="71af3243-3dd4-4a8d-8c0d-dd76da1f02a5"/>
@@ -39482,14 +37433,6 @@
 </ct:contentTypeSchema>
 </file>
 
-<file path=customXml/item2.xml><?xml version="1.0" encoding="utf-8"?>
-<p:properties xmlns:p="http://schemas.microsoft.com/office/2006/metadata/properties" xmlns:xsi="http://www.w3.org/2001/XMLSchema-instance" xmlns:pc="http://schemas.microsoft.com/office/infopath/2007/PartnerControls">
-  <documentManagement>
-    <MediaServiceKeyPoints xmlns="71af3243-3dd4-4a8d-8c0d-dd76da1f02a5" xsi:nil="true"/>
-  </documentManagement>
-</p:properties>
-</file>
-
 <file path=customXml/item3.xml><?xml version="1.0" encoding="utf-8"?>
 <?mso-contentType ?>
 <FormTemplates xmlns="http://schemas.microsoft.com/sharepoint/v3/contenttype/forms">
@@ -39500,6 +37443,23 @@
 </file>
 
 <file path=customXml/itemProps1.xml><?xml version="1.0" encoding="utf-8"?>
+<ds:datastoreItem xmlns:ds="http://schemas.openxmlformats.org/officeDocument/2006/customXml" ds:itemID="{CEA9B47F-3DD8-4645-81DC-B88780643C07}">
+  <ds:schemaRefs>
+    <ds:schemaRef ds:uri="16c05727-aa75-4e4a-9b5f-8a80a1165891"/>
+    <ds:schemaRef ds:uri="http://schemas.openxmlformats.org/package/2006/metadata/core-properties"/>
+    <ds:schemaRef ds:uri="http://purl.org/dc/elements/1.1/"/>
+    <ds:schemaRef ds:uri="http://purl.org/dc/terms/"/>
+    <ds:schemaRef ds:uri="71af3243-3dd4-4a8d-8c0d-dd76da1f02a5"/>
+    <ds:schemaRef ds:uri="http://purl.org/dc/dcmitype/"/>
+    <ds:schemaRef ds:uri="http://schemas.microsoft.com/office/2006/documentManagement/types"/>
+    <ds:schemaRef ds:uri="http://schemas.microsoft.com/office/infopath/2007/PartnerControls"/>
+    <ds:schemaRef ds:uri="http://schemas.microsoft.com/office/2006/metadata/properties"/>
+    <ds:schemaRef ds:uri="http://www.w3.org/XML/1998/namespace"/>
+  </ds:schemaRefs>
+</ds:datastoreItem>
+</file>
+
+<file path=customXml/itemProps2.xml><?xml version="1.0" encoding="utf-8"?>
 <ds:datastoreItem xmlns:ds="http://schemas.openxmlformats.org/officeDocument/2006/customXml" ds:itemID="{631071E6-22AE-499A-B09C-BF21CF5F7483}">
   <ds:schemaRefs>
     <ds:schemaRef ds:uri="http://schemas.microsoft.com/office/2006/metadata/contentType"/>
@@ -39518,23 +37478,6 @@
 </ds:datastoreItem>
 </file>
 
-<file path=customXml/itemProps2.xml><?xml version="1.0" encoding="utf-8"?>
-<ds:datastoreItem xmlns:ds="http://schemas.openxmlformats.org/officeDocument/2006/customXml" ds:itemID="{CEA9B47F-3DD8-4645-81DC-B88780643C07}">
-  <ds:schemaRefs>
-    <ds:schemaRef ds:uri="16c05727-aa75-4e4a-9b5f-8a80a1165891"/>
-    <ds:schemaRef ds:uri="http://schemas.openxmlformats.org/package/2006/metadata/core-properties"/>
-    <ds:schemaRef ds:uri="http://purl.org/dc/elements/1.1/"/>
-    <ds:schemaRef ds:uri="http://purl.org/dc/terms/"/>
-    <ds:schemaRef ds:uri="71af3243-3dd4-4a8d-8c0d-dd76da1f02a5"/>
-    <ds:schemaRef ds:uri="http://purl.org/dc/dcmitype/"/>
-    <ds:schemaRef ds:uri="http://schemas.microsoft.com/office/2006/documentManagement/types"/>
-    <ds:schemaRef ds:uri="http://schemas.microsoft.com/office/infopath/2007/PartnerControls"/>
-    <ds:schemaRef ds:uri="http://schemas.microsoft.com/office/2006/metadata/properties"/>
-    <ds:schemaRef ds:uri="http://www.w3.org/XML/1998/namespace"/>
-  </ds:schemaRefs>
-</ds:datastoreItem>
-</file>
-
 <file path=customXml/itemProps3.xml><?xml version="1.0" encoding="utf-8"?>
 <ds:datastoreItem xmlns:ds="http://schemas.openxmlformats.org/officeDocument/2006/customXml" ds:itemID="{B0C07E3D-60A7-4F4E-8208-D9CCD01982CB}">
   <ds:schemaRefs>

</xml_diff>